<commit_message>
Updated intro slides, still need a schedule
</commit_message>
<xml_diff>
--- a/admin/intro_slides/hackathon_intro_slides.pptx
+++ b/admin/intro_slides/hackathon_intro_slides.pptx
@@ -1,27 +1,27 @@
 
 <file path=ppt/presentation.xml><?xml version="1.0" encoding="utf-8"?>
-<p:presentation xmlns:a="http://schemas.openxmlformats.org/drawingml/2006/main" xmlns:r="http://schemas.openxmlformats.org/officeDocument/2006/relationships" xmlns:p="http://schemas.openxmlformats.org/presentationml/2006/main" xmlns:m="http://schemas.openxmlformats.org/officeDocument/2006/math" xmlns:a14="http://schemas.microsoft.com/office/drawing/2010/main">
+<p:presentation xmlns:a="http://schemas.openxmlformats.org/drawingml/2006/main" xmlns:r="http://schemas.openxmlformats.org/officeDocument/2006/relationships" xmlns:p="http://schemas.openxmlformats.org/presentationml/2006/main">
   <p:sldMasterIdLst>
-    <p:sldMasterId id="2147483648" r:id="rId5"/>
+    <p:sldMasterId id="2147483648" r:id="rId1"/>
   </p:sldMasterIdLst>
   <p:notesMasterIdLst>
-    <p:notesMasterId r:id="rId7"/>
+    <p:notesMasterId r:id="rId16"/>
   </p:notesMasterIdLst>
   <p:sldIdLst>
-    <p:sldId id="256" r:id="rId8"/>
-    <p:sldId id="257" r:id="rId9"/>
-    <p:sldId id="258" r:id="rId10"/>
-    <p:sldId id="259" r:id="rId11"/>
-    <p:sldId id="260" r:id="rId12"/>
-    <p:sldId id="261" r:id="rId13"/>
-    <p:sldId id="262" r:id="rId14"/>
-    <p:sldId id="263" r:id="rId15"/>
-    <p:sldId id="264" r:id="rId16"/>
-    <p:sldId id="265" r:id="rId17"/>
-    <p:sldId id="266" r:id="rId18"/>
-    <p:sldId id="267" r:id="rId19"/>
-    <p:sldId id="268" r:id="rId20"/>
-    <p:sldId id="269" r:id="rId21"/>
+    <p:sldId id="256" r:id="rId2"/>
+    <p:sldId id="257" r:id="rId3"/>
+    <p:sldId id="258" r:id="rId4"/>
+    <p:sldId id="259" r:id="rId5"/>
+    <p:sldId id="260" r:id="rId6"/>
+    <p:sldId id="261" r:id="rId7"/>
+    <p:sldId id="262" r:id="rId8"/>
+    <p:sldId id="263" r:id="rId9"/>
+    <p:sldId id="264" r:id="rId10"/>
+    <p:sldId id="265" r:id="rId11"/>
+    <p:sldId id="266" r:id="rId12"/>
+    <p:sldId id="267" r:id="rId13"/>
+    <p:sldId id="268" r:id="rId14"/>
+    <p:sldId id="269" r:id="rId15"/>
   </p:sldIdLst>
   <p:sldSz cx="13004800" cy="9753600"/>
   <p:notesSz cx="6858000" cy="9144000"/>
@@ -41,7 +41,7 @@
       <a:buFontTx/>
       <a:buNone/>
       <a:tabLst/>
-      <a:defRPr b="0" baseline="0" cap="none" i="0" spc="0" strike="noStrike" sz="1800" u="none" kumimoji="0" normalizeH="0">
+      <a:defRPr kumimoji="0" sz="1800" b="0" i="0" u="none" strike="noStrike" cap="none" spc="0" normalizeH="0" baseline="0">
         <a:ln>
           <a:noFill/>
         </a:ln>
@@ -67,7 +67,7 @@
       <a:buFontTx/>
       <a:buNone/>
       <a:tabLst/>
-      <a:defRPr b="1" baseline="0" cap="none" i="0" spc="0" strike="noStrike" sz="2400" u="none" kumimoji="0" normalizeH="0">
+      <a:defRPr kumimoji="0" sz="2400" b="1" i="0" u="none" strike="noStrike" cap="none" spc="0" normalizeH="0" baseline="0">
         <a:ln>
           <a:noFill/>
         </a:ln>
@@ -97,7 +97,7 @@
       <a:buFontTx/>
       <a:buNone/>
       <a:tabLst/>
-      <a:defRPr b="1" baseline="0" cap="none" i="0" spc="0" strike="noStrike" sz="2400" u="none" kumimoji="0" normalizeH="0">
+      <a:defRPr kumimoji="0" sz="2400" b="1" i="0" u="none" strike="noStrike" cap="none" spc="0" normalizeH="0" baseline="0">
         <a:ln>
           <a:noFill/>
         </a:ln>
@@ -127,7 +127,7 @@
       <a:buFontTx/>
       <a:buNone/>
       <a:tabLst/>
-      <a:defRPr b="1" baseline="0" cap="none" i="0" spc="0" strike="noStrike" sz="2400" u="none" kumimoji="0" normalizeH="0">
+      <a:defRPr kumimoji="0" sz="2400" b="1" i="0" u="none" strike="noStrike" cap="none" spc="0" normalizeH="0" baseline="0">
         <a:ln>
           <a:noFill/>
         </a:ln>
@@ -157,7 +157,7 @@
       <a:buFontTx/>
       <a:buNone/>
       <a:tabLst/>
-      <a:defRPr b="1" baseline="0" cap="none" i="0" spc="0" strike="noStrike" sz="2400" u="none" kumimoji="0" normalizeH="0">
+      <a:defRPr kumimoji="0" sz="2400" b="1" i="0" u="none" strike="noStrike" cap="none" spc="0" normalizeH="0" baseline="0">
         <a:ln>
           <a:noFill/>
         </a:ln>
@@ -187,7 +187,7 @@
       <a:buFontTx/>
       <a:buNone/>
       <a:tabLst/>
-      <a:defRPr b="1" baseline="0" cap="none" i="0" spc="0" strike="noStrike" sz="2400" u="none" kumimoji="0" normalizeH="0">
+      <a:defRPr kumimoji="0" sz="2400" b="1" i="0" u="none" strike="noStrike" cap="none" spc="0" normalizeH="0" baseline="0">
         <a:ln>
           <a:noFill/>
         </a:ln>
@@ -217,7 +217,7 @@
       <a:buFontTx/>
       <a:buNone/>
       <a:tabLst/>
-      <a:defRPr b="1" baseline="0" cap="none" i="0" spc="0" strike="noStrike" sz="2400" u="none" kumimoji="0" normalizeH="0">
+      <a:defRPr kumimoji="0" sz="2400" b="1" i="0" u="none" strike="noStrike" cap="none" spc="0" normalizeH="0" baseline="0">
         <a:ln>
           <a:noFill/>
         </a:ln>
@@ -247,7 +247,7 @@
       <a:buFontTx/>
       <a:buNone/>
       <a:tabLst/>
-      <a:defRPr b="1" baseline="0" cap="none" i="0" spc="0" strike="noStrike" sz="2400" u="none" kumimoji="0" normalizeH="0">
+      <a:defRPr kumimoji="0" sz="2400" b="1" i="0" u="none" strike="noStrike" cap="none" spc="0" normalizeH="0" baseline="0">
         <a:ln>
           <a:noFill/>
         </a:ln>
@@ -277,7 +277,7 @@
       <a:buFontTx/>
       <a:buNone/>
       <a:tabLst/>
-      <a:defRPr b="1" baseline="0" cap="none" i="0" spc="0" strike="noStrike" sz="2400" u="none" kumimoji="0" normalizeH="0">
+      <a:defRPr kumimoji="0" sz="2400" b="1" i="0" u="none" strike="noStrike" cap="none" spc="0" normalizeH="0" baseline="0">
         <a:ln>
           <a:noFill/>
         </a:ln>
@@ -307,7 +307,7 @@
       <a:buFontTx/>
       <a:buNone/>
       <a:tabLst/>
-      <a:defRPr b="1" baseline="0" cap="none" i="0" spc="0" strike="noStrike" sz="2400" u="none" kumimoji="0" normalizeH="0">
+      <a:defRPr kumimoji="0" sz="2400" b="1" i="0" u="none" strike="noStrike" cap="none" spc="0" normalizeH="0" baseline="0">
         <a:ln>
           <a:noFill/>
         </a:ln>
@@ -326,13 +326,14 @@
 </p:presentation>
 </file>
 
-<file path=ppt/commentAuthors.xml><?xml version="1.0" encoding="utf-8"?>
-<p:cmAuthorLst xmlns:a="http://schemas.openxmlformats.org/drawingml/2006/main" xmlns:r="http://schemas.openxmlformats.org/officeDocument/2006/relationships" xmlns:p="http://schemas.openxmlformats.org/presentationml/2006/main" xmlns:m="http://schemas.openxmlformats.org/officeDocument/2006/math" xmlns:a14="http://schemas.microsoft.com/office/drawing/2010/main"/>
-</file>
-
 <file path=ppt/notesMasters/notesMaster1.xml><?xml version="1.0" encoding="utf-8"?>
-<p:notesMaster xmlns:a="http://schemas.openxmlformats.org/drawingml/2006/main" xmlns:r="http://schemas.openxmlformats.org/officeDocument/2006/relationships" xmlns:p="http://schemas.openxmlformats.org/presentationml/2006/main" xmlns:m="http://schemas.openxmlformats.org/officeDocument/2006/math" xmlns:a14="http://schemas.microsoft.com/office/drawing/2010/main">
+<p:notesMaster xmlns:a="http://schemas.openxmlformats.org/drawingml/2006/main" xmlns:r="http://schemas.openxmlformats.org/officeDocument/2006/relationships" xmlns:p="http://schemas.openxmlformats.org/presentationml/2006/main">
   <p:cSld>
+    <p:bg>
+      <p:bgRef idx="1001">
+        <a:schemeClr val="bg1"/>
+      </p:bgRef>
+    </p:bg>
     <p:spTree>
       <p:nvGrpSpPr>
         <p:cNvPr id="1" name=""/>
@@ -350,7 +351,9 @@
       <p:sp>
         <p:nvSpPr>
           <p:cNvPr id="116" name="Shape 116"/>
-          <p:cNvSpPr/>
+          <p:cNvSpPr>
+            <a:spLocks noGrp="1" noRot="1" noChangeAspect="1"/>
+          </p:cNvSpPr>
           <p:nvPr>
             <p:ph type="sldImg"/>
           </p:nvPr>
@@ -368,14 +371,16 @@
           <a:bodyPr/>
           <a:lstStyle/>
           <a:p>
-            <a:pPr/>
+            <a:endParaRPr/>
           </a:p>
         </p:txBody>
       </p:sp>
       <p:sp>
         <p:nvSpPr>
           <p:cNvPr id="117" name="Shape 117"/>
-          <p:cNvSpPr/>
+          <p:cNvSpPr>
+            <a:spLocks noGrp="1"/>
+          </p:cNvSpPr>
           <p:nvPr>
             <p:ph type="body" sz="quarter" idx="1"/>
           </p:nvPr>
@@ -393,7 +398,7 @@
           <a:bodyPr/>
           <a:lstStyle/>
           <a:p>
-            <a:pPr/>
+            <a:endParaRPr/>
           </a:p>
         </p:txBody>
       </p:sp>
@@ -505,7 +510,7 @@
 </file>
 
 <file path=ppt/slideLayouts/slideLayout1.xml><?xml version="1.0" encoding="utf-8"?>
-<p:sldLayout xmlns:a="http://schemas.openxmlformats.org/drawingml/2006/main" xmlns:r="http://schemas.openxmlformats.org/officeDocument/2006/relationships" xmlns:p="http://schemas.openxmlformats.org/presentationml/2006/main" xmlns:m="http://schemas.openxmlformats.org/officeDocument/2006/math" xmlns:a14="http://schemas.microsoft.com/office/drawing/2010/main" type="title" showMasterSp="1" showMasterPhAnim="1">
+<p:sldLayout xmlns:a="http://schemas.openxmlformats.org/drawingml/2006/main" xmlns:r="http://schemas.openxmlformats.org/officeDocument/2006/relationships" xmlns:p="http://schemas.openxmlformats.org/presentationml/2006/main" type="title">
   <p:cSld name="Title &amp; Subtitle">
     <p:spTree>
       <p:nvGrpSpPr>
@@ -524,7 +529,9 @@
       <p:sp>
         <p:nvSpPr>
           <p:cNvPr id="11" name="Title Text"/>
-          <p:cNvSpPr txBox="1"/>
+          <p:cNvSpPr txBox="1">
+            <a:spLocks noGrp="1"/>
+          </p:cNvSpPr>
           <p:nvPr>
             <p:ph type="title"/>
           </p:nvPr>
@@ -542,7 +549,6 @@
           <a:bodyPr anchor="b"/>
           <a:lstStyle/>
           <a:p>
-            <a:pPr/>
             <a:r>
               <a:t>Title Text</a:t>
             </a:r>
@@ -552,7 +558,9 @@
       <p:sp>
         <p:nvSpPr>
           <p:cNvPr id="12" name="Body Level One…"/>
-          <p:cNvSpPr txBox="1"/>
+          <p:cNvSpPr txBox="1">
+            <a:spLocks noGrp="1"/>
+          </p:cNvSpPr>
           <p:nvPr>
             <p:ph type="body" sz="quarter" idx="1"/>
           </p:nvPr>
@@ -611,7 +619,6 @@
             </a:lvl5pPr>
           </a:lstStyle>
           <a:p>
-            <a:pPr/>
             <a:r>
               <a:t>Body Level One</a:t>
             </a:r>
@@ -645,7 +652,9 @@
       <p:sp>
         <p:nvSpPr>
           <p:cNvPr id="13" name="Slide Number"/>
-          <p:cNvSpPr txBox="1"/>
+          <p:cNvSpPr txBox="1">
+            <a:spLocks noGrp="1"/>
+          </p:cNvSpPr>
           <p:nvPr>
             <p:ph type="sldNum" sz="quarter" idx="2"/>
           </p:nvPr>
@@ -668,8 +677,10 @@
             </a:lvl1pPr>
           </a:lstStyle>
           <a:p>
-            <a:pPr/>
-            <a:fld id="{86CB4B4D-7CA3-9044-876B-883B54F8677D}" type="slidenum"/>
+            <a:fld id="{86CB4B4D-7CA3-9044-876B-883B54F8677D}" type="slidenum">
+              <a:t>‹#›</a:t>
+            </a:fld>
+            <a:endParaRPr/>
           </a:p>
         </p:txBody>
       </p:sp>
@@ -678,12 +689,12 @@
   <p:clrMapOvr>
     <a:masterClrMapping/>
   </p:clrMapOvr>
-  <p:transition xmlns:p14="http://schemas.microsoft.com/office/powerpoint/2010/main" spd="med" advClick="1"/>
+  <p:transition spd="med"/>
 </p:sldLayout>
 </file>
 
 <file path=ppt/slideLayouts/slideLayout10.xml><?xml version="1.0" encoding="utf-8"?>
-<p:sldLayout xmlns:a="http://schemas.openxmlformats.org/drawingml/2006/main" xmlns:r="http://schemas.openxmlformats.org/officeDocument/2006/relationships" xmlns:p="http://schemas.openxmlformats.org/presentationml/2006/main" xmlns:m="http://schemas.openxmlformats.org/officeDocument/2006/math" xmlns:a14="http://schemas.microsoft.com/office/drawing/2010/main" type="tx" showMasterSp="1" showMasterPhAnim="1">
+<p:sldLayout xmlns:a="http://schemas.openxmlformats.org/drawingml/2006/main" xmlns:r="http://schemas.openxmlformats.org/officeDocument/2006/relationships" xmlns:p="http://schemas.openxmlformats.org/presentationml/2006/main" type="tx">
   <p:cSld name="Quote">
     <p:spTree>
       <p:nvGrpSpPr>
@@ -702,7 +713,9 @@
       <p:sp>
         <p:nvSpPr>
           <p:cNvPr id="93" name="–Johnny Appleseed"/>
-          <p:cNvSpPr txBox="1"/>
+          <p:cNvSpPr txBox="1">
+            <a:spLocks noGrp="1"/>
+          </p:cNvSpPr>
           <p:nvPr>
             <p:ph type="body" sz="quarter" idx="13"/>
           </p:nvPr>
@@ -727,11 +740,10 @@
               </a:spcBef>
               <a:buSzTx/>
               <a:buNone/>
-              <a:defRPr i="1" sz="2400"/>
+              <a:defRPr sz="2400" i="1"/>
             </a:lvl1pPr>
           </a:lstStyle>
           <a:p>
-            <a:pPr/>
             <a:r>
               <a:t>–Johnny Appleseed</a:t>
             </a:r>
@@ -741,7 +753,9 @@
       <p:sp>
         <p:nvSpPr>
           <p:cNvPr id="94" name="“Type a quote here.”"/>
-          <p:cNvSpPr txBox="1"/>
+          <p:cNvSpPr txBox="1">
+            <a:spLocks noGrp="1"/>
+          </p:cNvSpPr>
           <p:nvPr>
             <p:ph type="body" sz="quarter" idx="14"/>
           </p:nvPr>
@@ -775,7 +789,6 @@
             </a:lvl1pPr>
           </a:lstStyle>
           <a:p>
-            <a:pPr/>
             <a:r>
               <a:t>“Type a quote here.” </a:t>
             </a:r>
@@ -785,7 +798,9 @@
       <p:sp>
         <p:nvSpPr>
           <p:cNvPr id="95" name="Slide Number"/>
-          <p:cNvSpPr txBox="1"/>
+          <p:cNvSpPr txBox="1">
+            <a:spLocks noGrp="1"/>
+          </p:cNvSpPr>
           <p:nvPr>
             <p:ph type="sldNum" sz="quarter" idx="2"/>
           </p:nvPr>
@@ -799,8 +814,10 @@
           <a:bodyPr/>
           <a:lstStyle/>
           <a:p>
-            <a:pPr/>
-            <a:fld id="{86CB4B4D-7CA3-9044-876B-883B54F8677D}" type="slidenum"/>
+            <a:fld id="{86CB4B4D-7CA3-9044-876B-883B54F8677D}" type="slidenum">
+              <a:t>‹#›</a:t>
+            </a:fld>
+            <a:endParaRPr/>
           </a:p>
         </p:txBody>
       </p:sp>
@@ -809,12 +826,12 @@
   <p:clrMapOvr>
     <a:masterClrMapping/>
   </p:clrMapOvr>
-  <p:transition xmlns:p14="http://schemas.microsoft.com/office/powerpoint/2010/main" spd="med" advClick="1"/>
+  <p:transition spd="med"/>
 </p:sldLayout>
 </file>
 
 <file path=ppt/slideLayouts/slideLayout11.xml><?xml version="1.0" encoding="utf-8"?>
-<p:sldLayout xmlns:a="http://schemas.openxmlformats.org/drawingml/2006/main" xmlns:r="http://schemas.openxmlformats.org/officeDocument/2006/relationships" xmlns:p="http://schemas.openxmlformats.org/presentationml/2006/main" xmlns:m="http://schemas.openxmlformats.org/officeDocument/2006/math" xmlns:a14="http://schemas.microsoft.com/office/drawing/2010/main" type="tx" showMasterSp="1" showMasterPhAnim="1">
+<p:sldLayout xmlns:a="http://schemas.openxmlformats.org/drawingml/2006/main" xmlns:r="http://schemas.openxmlformats.org/officeDocument/2006/relationships" xmlns:p="http://schemas.openxmlformats.org/presentationml/2006/main" type="tx">
   <p:cSld name="Photo">
     <p:spTree>
       <p:nvGrpSpPr>
@@ -833,7 +850,9 @@
       <p:sp>
         <p:nvSpPr>
           <p:cNvPr id="102" name="Image"/>
-          <p:cNvSpPr/>
+          <p:cNvSpPr>
+            <a:spLocks noGrp="1"/>
+          </p:cNvSpPr>
           <p:nvPr>
             <p:ph type="pic" idx="13"/>
           </p:nvPr>
@@ -853,14 +872,16 @@
           </a:bodyPr>
           <a:lstStyle/>
           <a:p>
-            <a:pPr/>
+            <a:endParaRPr/>
           </a:p>
         </p:txBody>
       </p:sp>
       <p:sp>
         <p:nvSpPr>
           <p:cNvPr id="103" name="Slide Number"/>
-          <p:cNvSpPr txBox="1"/>
+          <p:cNvSpPr txBox="1">
+            <a:spLocks noGrp="1"/>
+          </p:cNvSpPr>
           <p:nvPr>
             <p:ph type="sldNum" sz="quarter" idx="2"/>
           </p:nvPr>
@@ -874,8 +895,10 @@
           <a:bodyPr/>
           <a:lstStyle/>
           <a:p>
-            <a:pPr/>
-            <a:fld id="{86CB4B4D-7CA3-9044-876B-883B54F8677D}" type="slidenum"/>
+            <a:fld id="{86CB4B4D-7CA3-9044-876B-883B54F8677D}" type="slidenum">
+              <a:t>‹#›</a:t>
+            </a:fld>
+            <a:endParaRPr/>
           </a:p>
         </p:txBody>
       </p:sp>
@@ -884,12 +907,12 @@
   <p:clrMapOvr>
     <a:masterClrMapping/>
   </p:clrMapOvr>
-  <p:transition xmlns:p14="http://schemas.microsoft.com/office/powerpoint/2010/main" spd="med" advClick="1"/>
+  <p:transition spd="med"/>
 </p:sldLayout>
 </file>
 
 <file path=ppt/slideLayouts/slideLayout12.xml><?xml version="1.0" encoding="utf-8"?>
-<p:sldLayout xmlns:a="http://schemas.openxmlformats.org/drawingml/2006/main" xmlns:r="http://schemas.openxmlformats.org/officeDocument/2006/relationships" xmlns:p="http://schemas.openxmlformats.org/presentationml/2006/main" xmlns:m="http://schemas.openxmlformats.org/officeDocument/2006/math" xmlns:a14="http://schemas.microsoft.com/office/drawing/2010/main" type="tx" showMasterSp="1" showMasterPhAnim="1">
+<p:sldLayout xmlns:a="http://schemas.openxmlformats.org/drawingml/2006/main" xmlns:r="http://schemas.openxmlformats.org/officeDocument/2006/relationships" xmlns:p="http://schemas.openxmlformats.org/presentationml/2006/main" type="tx">
   <p:cSld name="Blank">
     <p:spTree>
       <p:nvGrpSpPr>
@@ -908,7 +931,9 @@
       <p:sp>
         <p:nvSpPr>
           <p:cNvPr id="110" name="Slide Number"/>
-          <p:cNvSpPr txBox="1"/>
+          <p:cNvSpPr txBox="1">
+            <a:spLocks noGrp="1"/>
+          </p:cNvSpPr>
           <p:nvPr>
             <p:ph type="sldNum" sz="quarter" idx="2"/>
           </p:nvPr>
@@ -922,8 +947,10 @@
           <a:bodyPr/>
           <a:lstStyle/>
           <a:p>
-            <a:pPr/>
-            <a:fld id="{86CB4B4D-7CA3-9044-876B-883B54F8677D}" type="slidenum"/>
+            <a:fld id="{86CB4B4D-7CA3-9044-876B-883B54F8677D}" type="slidenum">
+              <a:t>‹#›</a:t>
+            </a:fld>
+            <a:endParaRPr/>
           </a:p>
         </p:txBody>
       </p:sp>
@@ -932,12 +959,12 @@
   <p:clrMapOvr>
     <a:masterClrMapping/>
   </p:clrMapOvr>
-  <p:transition xmlns:p14="http://schemas.microsoft.com/office/powerpoint/2010/main" spd="med" advClick="1"/>
+  <p:transition spd="med"/>
 </p:sldLayout>
 </file>
 
 <file path=ppt/slideLayouts/slideLayout2.xml><?xml version="1.0" encoding="utf-8"?>
-<p:sldLayout xmlns:a="http://schemas.openxmlformats.org/drawingml/2006/main" xmlns:r="http://schemas.openxmlformats.org/officeDocument/2006/relationships" xmlns:p="http://schemas.openxmlformats.org/presentationml/2006/main" xmlns:m="http://schemas.openxmlformats.org/officeDocument/2006/math" xmlns:a14="http://schemas.microsoft.com/office/drawing/2010/main" type="tx" showMasterSp="1" showMasterPhAnim="1">
+<p:sldLayout xmlns:a="http://schemas.openxmlformats.org/drawingml/2006/main" xmlns:r="http://schemas.openxmlformats.org/officeDocument/2006/relationships" xmlns:p="http://schemas.openxmlformats.org/presentationml/2006/main" type="tx">
   <p:cSld name="Photo - Horizontal">
     <p:spTree>
       <p:nvGrpSpPr>
@@ -956,7 +983,9 @@
       <p:sp>
         <p:nvSpPr>
           <p:cNvPr id="20" name="Image"/>
-          <p:cNvSpPr/>
+          <p:cNvSpPr>
+            <a:spLocks noGrp="1"/>
+          </p:cNvSpPr>
           <p:nvPr>
             <p:ph type="pic" idx="13"/>
           </p:nvPr>
@@ -976,14 +1005,16 @@
           </a:bodyPr>
           <a:lstStyle/>
           <a:p>
-            <a:pPr/>
+            <a:endParaRPr/>
           </a:p>
         </p:txBody>
       </p:sp>
       <p:sp>
         <p:nvSpPr>
           <p:cNvPr id="21" name="Title Text"/>
-          <p:cNvSpPr txBox="1"/>
+          <p:cNvSpPr txBox="1">
+            <a:spLocks noGrp="1"/>
+          </p:cNvSpPr>
           <p:nvPr>
             <p:ph type="title"/>
           </p:nvPr>
@@ -1001,7 +1032,6 @@
           <a:bodyPr anchor="b"/>
           <a:lstStyle/>
           <a:p>
-            <a:pPr/>
             <a:r>
               <a:t>Title Text</a:t>
             </a:r>
@@ -1011,7 +1041,9 @@
       <p:sp>
         <p:nvSpPr>
           <p:cNvPr id="22" name="Body Level One…"/>
-          <p:cNvSpPr txBox="1"/>
+          <p:cNvSpPr txBox="1">
+            <a:spLocks noGrp="1"/>
+          </p:cNvSpPr>
           <p:nvPr>
             <p:ph type="body" sz="quarter" idx="1"/>
           </p:nvPr>
@@ -1070,7 +1102,6 @@
             </a:lvl5pPr>
           </a:lstStyle>
           <a:p>
-            <a:pPr/>
             <a:r>
               <a:t>Body Level One</a:t>
             </a:r>
@@ -1104,7 +1135,9 @@
       <p:sp>
         <p:nvSpPr>
           <p:cNvPr id="23" name="Slide Number"/>
-          <p:cNvSpPr txBox="1"/>
+          <p:cNvSpPr txBox="1">
+            <a:spLocks noGrp="1"/>
+          </p:cNvSpPr>
           <p:nvPr>
             <p:ph type="sldNum" sz="quarter" idx="2"/>
           </p:nvPr>
@@ -1118,8 +1151,10 @@
           <a:bodyPr/>
           <a:lstStyle/>
           <a:p>
-            <a:pPr/>
-            <a:fld id="{86CB4B4D-7CA3-9044-876B-883B54F8677D}" type="slidenum"/>
+            <a:fld id="{86CB4B4D-7CA3-9044-876B-883B54F8677D}" type="slidenum">
+              <a:t>‹#›</a:t>
+            </a:fld>
+            <a:endParaRPr/>
           </a:p>
         </p:txBody>
       </p:sp>
@@ -1128,12 +1163,12 @@
   <p:clrMapOvr>
     <a:masterClrMapping/>
   </p:clrMapOvr>
-  <p:transition xmlns:p14="http://schemas.microsoft.com/office/powerpoint/2010/main" spd="med" advClick="1"/>
+  <p:transition spd="med"/>
 </p:sldLayout>
 </file>
 
 <file path=ppt/slideLayouts/slideLayout3.xml><?xml version="1.0" encoding="utf-8"?>
-<p:sldLayout xmlns:a="http://schemas.openxmlformats.org/drawingml/2006/main" xmlns:r="http://schemas.openxmlformats.org/officeDocument/2006/relationships" xmlns:p="http://schemas.openxmlformats.org/presentationml/2006/main" xmlns:m="http://schemas.openxmlformats.org/officeDocument/2006/math" xmlns:a14="http://schemas.microsoft.com/office/drawing/2010/main" type="tx" showMasterSp="1" showMasterPhAnim="1">
+<p:sldLayout xmlns:a="http://schemas.openxmlformats.org/drawingml/2006/main" xmlns:r="http://schemas.openxmlformats.org/officeDocument/2006/relationships" xmlns:p="http://schemas.openxmlformats.org/presentationml/2006/main" type="tx">
   <p:cSld name="Title - Center">
     <p:spTree>
       <p:nvGrpSpPr>
@@ -1152,7 +1187,9 @@
       <p:sp>
         <p:nvSpPr>
           <p:cNvPr id="30" name="Title Text"/>
-          <p:cNvSpPr txBox="1"/>
+          <p:cNvSpPr txBox="1">
+            <a:spLocks noGrp="1"/>
+          </p:cNvSpPr>
           <p:nvPr>
             <p:ph type="title"/>
           </p:nvPr>
@@ -1170,7 +1207,6 @@
           <a:bodyPr/>
           <a:lstStyle/>
           <a:p>
-            <a:pPr/>
             <a:r>
               <a:t>Title Text</a:t>
             </a:r>
@@ -1180,7 +1216,9 @@
       <p:sp>
         <p:nvSpPr>
           <p:cNvPr id="31" name="Slide Number"/>
-          <p:cNvSpPr txBox="1"/>
+          <p:cNvSpPr txBox="1">
+            <a:spLocks noGrp="1"/>
+          </p:cNvSpPr>
           <p:nvPr>
             <p:ph type="sldNum" sz="quarter" idx="2"/>
           </p:nvPr>
@@ -1194,8 +1232,10 @@
           <a:bodyPr/>
           <a:lstStyle/>
           <a:p>
-            <a:pPr/>
-            <a:fld id="{86CB4B4D-7CA3-9044-876B-883B54F8677D}" type="slidenum"/>
+            <a:fld id="{86CB4B4D-7CA3-9044-876B-883B54F8677D}" type="slidenum">
+              <a:t>‹#›</a:t>
+            </a:fld>
+            <a:endParaRPr/>
           </a:p>
         </p:txBody>
       </p:sp>
@@ -1204,12 +1244,12 @@
   <p:clrMapOvr>
     <a:masterClrMapping/>
   </p:clrMapOvr>
-  <p:transition xmlns:p14="http://schemas.microsoft.com/office/powerpoint/2010/main" spd="med" advClick="1"/>
+  <p:transition spd="med"/>
 </p:sldLayout>
 </file>
 
 <file path=ppt/slideLayouts/slideLayout4.xml><?xml version="1.0" encoding="utf-8"?>
-<p:sldLayout xmlns:a="http://schemas.openxmlformats.org/drawingml/2006/main" xmlns:r="http://schemas.openxmlformats.org/officeDocument/2006/relationships" xmlns:p="http://schemas.openxmlformats.org/presentationml/2006/main" xmlns:m="http://schemas.openxmlformats.org/officeDocument/2006/math" xmlns:a14="http://schemas.microsoft.com/office/drawing/2010/main" type="tx" showMasterSp="1" showMasterPhAnim="1">
+<p:sldLayout xmlns:a="http://schemas.openxmlformats.org/drawingml/2006/main" xmlns:r="http://schemas.openxmlformats.org/officeDocument/2006/relationships" xmlns:p="http://schemas.openxmlformats.org/presentationml/2006/main" type="tx">
   <p:cSld name="Photo - Vertical">
     <p:spTree>
       <p:nvGrpSpPr>
@@ -1228,7 +1268,9 @@
       <p:sp>
         <p:nvSpPr>
           <p:cNvPr id="38" name="Image"/>
-          <p:cNvSpPr/>
+          <p:cNvSpPr>
+            <a:spLocks noGrp="1"/>
+          </p:cNvSpPr>
           <p:nvPr>
             <p:ph type="pic" idx="13"/>
           </p:nvPr>
@@ -1248,14 +1290,16 @@
           </a:bodyPr>
           <a:lstStyle/>
           <a:p>
-            <a:pPr/>
+            <a:endParaRPr/>
           </a:p>
         </p:txBody>
       </p:sp>
       <p:sp>
         <p:nvSpPr>
           <p:cNvPr id="39" name="Title Text"/>
-          <p:cNvSpPr txBox="1"/>
+          <p:cNvSpPr txBox="1">
+            <a:spLocks noGrp="1"/>
+          </p:cNvSpPr>
           <p:nvPr>
             <p:ph type="title"/>
           </p:nvPr>
@@ -1277,7 +1321,6 @@
             </a:lvl1pPr>
           </a:lstStyle>
           <a:p>
-            <a:pPr/>
             <a:r>
               <a:t>Title Text</a:t>
             </a:r>
@@ -1287,7 +1330,9 @@
       <p:sp>
         <p:nvSpPr>
           <p:cNvPr id="40" name="Body Level One…"/>
-          <p:cNvSpPr txBox="1"/>
+          <p:cNvSpPr txBox="1">
+            <a:spLocks noGrp="1"/>
+          </p:cNvSpPr>
           <p:nvPr>
             <p:ph type="body" sz="quarter" idx="1"/>
           </p:nvPr>
@@ -1346,7 +1391,6 @@
             </a:lvl5pPr>
           </a:lstStyle>
           <a:p>
-            <a:pPr/>
             <a:r>
               <a:t>Body Level One</a:t>
             </a:r>
@@ -1380,7 +1424,9 @@
       <p:sp>
         <p:nvSpPr>
           <p:cNvPr id="41" name="Slide Number"/>
-          <p:cNvSpPr txBox="1"/>
+          <p:cNvSpPr txBox="1">
+            <a:spLocks noGrp="1"/>
+          </p:cNvSpPr>
           <p:nvPr>
             <p:ph type="sldNum" sz="quarter" idx="2"/>
           </p:nvPr>
@@ -1394,8 +1440,10 @@
           <a:bodyPr/>
           <a:lstStyle/>
           <a:p>
-            <a:pPr/>
-            <a:fld id="{86CB4B4D-7CA3-9044-876B-883B54F8677D}" type="slidenum"/>
+            <a:fld id="{86CB4B4D-7CA3-9044-876B-883B54F8677D}" type="slidenum">
+              <a:t>‹#›</a:t>
+            </a:fld>
+            <a:endParaRPr/>
           </a:p>
         </p:txBody>
       </p:sp>
@@ -1404,12 +1452,12 @@
   <p:clrMapOvr>
     <a:masterClrMapping/>
   </p:clrMapOvr>
-  <p:transition xmlns:p14="http://schemas.microsoft.com/office/powerpoint/2010/main" spd="med" advClick="1"/>
+  <p:transition spd="med"/>
 </p:sldLayout>
 </file>
 
 <file path=ppt/slideLayouts/slideLayout5.xml><?xml version="1.0" encoding="utf-8"?>
-<p:sldLayout xmlns:a="http://schemas.openxmlformats.org/drawingml/2006/main" xmlns:r="http://schemas.openxmlformats.org/officeDocument/2006/relationships" xmlns:p="http://schemas.openxmlformats.org/presentationml/2006/main" xmlns:m="http://schemas.openxmlformats.org/officeDocument/2006/math" xmlns:a14="http://schemas.microsoft.com/office/drawing/2010/main" type="tx" showMasterSp="1" showMasterPhAnim="1">
+<p:sldLayout xmlns:a="http://schemas.openxmlformats.org/drawingml/2006/main" xmlns:r="http://schemas.openxmlformats.org/officeDocument/2006/relationships" xmlns:p="http://schemas.openxmlformats.org/presentationml/2006/main" type="tx">
   <p:cSld name="Title - Top">
     <p:spTree>
       <p:nvGrpSpPr>
@@ -1428,7 +1476,9 @@
       <p:sp>
         <p:nvSpPr>
           <p:cNvPr id="48" name="Title Text"/>
-          <p:cNvSpPr txBox="1"/>
+          <p:cNvSpPr txBox="1">
+            <a:spLocks noGrp="1"/>
+          </p:cNvSpPr>
           <p:nvPr>
             <p:ph type="title"/>
           </p:nvPr>
@@ -1442,7 +1492,6 @@
           <a:bodyPr/>
           <a:lstStyle/>
           <a:p>
-            <a:pPr/>
             <a:r>
               <a:t>Title Text</a:t>
             </a:r>
@@ -1452,7 +1501,9 @@
       <p:sp>
         <p:nvSpPr>
           <p:cNvPr id="49" name="Slide Number"/>
-          <p:cNvSpPr txBox="1"/>
+          <p:cNvSpPr txBox="1">
+            <a:spLocks noGrp="1"/>
+          </p:cNvSpPr>
           <p:nvPr>
             <p:ph type="sldNum" sz="quarter" idx="2"/>
           </p:nvPr>
@@ -1466,8 +1517,10 @@
           <a:bodyPr/>
           <a:lstStyle/>
           <a:p>
-            <a:pPr/>
-            <a:fld id="{86CB4B4D-7CA3-9044-876B-883B54F8677D}" type="slidenum"/>
+            <a:fld id="{86CB4B4D-7CA3-9044-876B-883B54F8677D}" type="slidenum">
+              <a:t>‹#›</a:t>
+            </a:fld>
+            <a:endParaRPr/>
           </a:p>
         </p:txBody>
       </p:sp>
@@ -1476,12 +1529,12 @@
   <p:clrMapOvr>
     <a:masterClrMapping/>
   </p:clrMapOvr>
-  <p:transition xmlns:p14="http://schemas.microsoft.com/office/powerpoint/2010/main" spd="med" advClick="1"/>
+  <p:transition spd="med"/>
 </p:sldLayout>
 </file>
 
 <file path=ppt/slideLayouts/slideLayout6.xml><?xml version="1.0" encoding="utf-8"?>
-<p:sldLayout xmlns:a="http://schemas.openxmlformats.org/drawingml/2006/main" xmlns:r="http://schemas.openxmlformats.org/officeDocument/2006/relationships" xmlns:p="http://schemas.openxmlformats.org/presentationml/2006/main" xmlns:m="http://schemas.openxmlformats.org/officeDocument/2006/math" xmlns:a14="http://schemas.microsoft.com/office/drawing/2010/main" type="tx" showMasterSp="1" showMasterPhAnim="1">
+<p:sldLayout xmlns:a="http://schemas.openxmlformats.org/drawingml/2006/main" xmlns:r="http://schemas.openxmlformats.org/officeDocument/2006/relationships" xmlns:p="http://schemas.openxmlformats.org/presentationml/2006/main" type="tx">
   <p:cSld name="Title &amp; Bullets">
     <p:spTree>
       <p:nvGrpSpPr>
@@ -1500,7 +1553,9 @@
       <p:sp>
         <p:nvSpPr>
           <p:cNvPr id="56" name="Title Text"/>
-          <p:cNvSpPr txBox="1"/>
+          <p:cNvSpPr txBox="1">
+            <a:spLocks noGrp="1"/>
+          </p:cNvSpPr>
           <p:nvPr>
             <p:ph type="title"/>
           </p:nvPr>
@@ -1514,7 +1569,6 @@
           <a:bodyPr/>
           <a:lstStyle/>
           <a:p>
-            <a:pPr/>
             <a:r>
               <a:t>Title Text</a:t>
             </a:r>
@@ -1524,7 +1578,9 @@
       <p:sp>
         <p:nvSpPr>
           <p:cNvPr id="57" name="Body Level One…"/>
-          <p:cNvSpPr txBox="1"/>
+          <p:cNvSpPr txBox="1">
+            <a:spLocks noGrp="1"/>
+          </p:cNvSpPr>
           <p:nvPr>
             <p:ph type="body" idx="1"/>
           </p:nvPr>
@@ -1538,7 +1594,6 @@
           <a:bodyPr/>
           <a:lstStyle/>
           <a:p>
-            <a:pPr/>
             <a:r>
               <a:t>Body Level One</a:t>
             </a:r>
@@ -1572,7 +1627,9 @@
       <p:sp>
         <p:nvSpPr>
           <p:cNvPr id="58" name="Slide Number"/>
-          <p:cNvSpPr txBox="1"/>
+          <p:cNvSpPr txBox="1">
+            <a:spLocks noGrp="1"/>
+          </p:cNvSpPr>
           <p:nvPr>
             <p:ph type="sldNum" sz="quarter" idx="2"/>
           </p:nvPr>
@@ -1586,8 +1643,10 @@
           <a:bodyPr/>
           <a:lstStyle/>
           <a:p>
-            <a:pPr/>
-            <a:fld id="{86CB4B4D-7CA3-9044-876B-883B54F8677D}" type="slidenum"/>
+            <a:fld id="{86CB4B4D-7CA3-9044-876B-883B54F8677D}" type="slidenum">
+              <a:t>‹#›</a:t>
+            </a:fld>
+            <a:endParaRPr/>
           </a:p>
         </p:txBody>
       </p:sp>
@@ -1596,12 +1655,12 @@
   <p:clrMapOvr>
     <a:masterClrMapping/>
   </p:clrMapOvr>
-  <p:transition xmlns:p14="http://schemas.microsoft.com/office/powerpoint/2010/main" spd="med" advClick="1"/>
+  <p:transition spd="med"/>
 </p:sldLayout>
 </file>
 
 <file path=ppt/slideLayouts/slideLayout7.xml><?xml version="1.0" encoding="utf-8"?>
-<p:sldLayout xmlns:a="http://schemas.openxmlformats.org/drawingml/2006/main" xmlns:r="http://schemas.openxmlformats.org/officeDocument/2006/relationships" xmlns:p="http://schemas.openxmlformats.org/presentationml/2006/main" xmlns:m="http://schemas.openxmlformats.org/officeDocument/2006/math" xmlns:a14="http://schemas.microsoft.com/office/drawing/2010/main" type="tx" showMasterSp="1" showMasterPhAnim="1">
+<p:sldLayout xmlns:a="http://schemas.openxmlformats.org/drawingml/2006/main" xmlns:r="http://schemas.openxmlformats.org/officeDocument/2006/relationships" xmlns:p="http://schemas.openxmlformats.org/presentationml/2006/main" type="tx">
   <p:cSld name="Title, Bullets &amp; Photo">
     <p:spTree>
       <p:nvGrpSpPr>
@@ -1620,7 +1679,9 @@
       <p:sp>
         <p:nvSpPr>
           <p:cNvPr id="65" name="Image"/>
-          <p:cNvSpPr/>
+          <p:cNvSpPr>
+            <a:spLocks noGrp="1"/>
+          </p:cNvSpPr>
           <p:nvPr>
             <p:ph type="pic" idx="13"/>
           </p:nvPr>
@@ -1640,14 +1701,16 @@
           </a:bodyPr>
           <a:lstStyle/>
           <a:p>
-            <a:pPr/>
+            <a:endParaRPr/>
           </a:p>
         </p:txBody>
       </p:sp>
       <p:sp>
         <p:nvSpPr>
           <p:cNvPr id="66" name="Title Text"/>
-          <p:cNvSpPr txBox="1"/>
+          <p:cNvSpPr txBox="1">
+            <a:spLocks noGrp="1"/>
+          </p:cNvSpPr>
           <p:nvPr>
             <p:ph type="title"/>
           </p:nvPr>
@@ -1661,7 +1724,6 @@
           <a:bodyPr/>
           <a:lstStyle/>
           <a:p>
-            <a:pPr/>
             <a:r>
               <a:t>Title Text</a:t>
             </a:r>
@@ -1671,7 +1733,9 @@
       <p:sp>
         <p:nvSpPr>
           <p:cNvPr id="67" name="Body Level One…"/>
-          <p:cNvSpPr txBox="1"/>
+          <p:cNvSpPr txBox="1">
+            <a:spLocks noGrp="1"/>
+          </p:cNvSpPr>
           <p:nvPr>
             <p:ph type="body" sz="half" idx="1"/>
           </p:nvPr>
@@ -1720,7 +1784,6 @@
             </a:lvl5pPr>
           </a:lstStyle>
           <a:p>
-            <a:pPr/>
             <a:r>
               <a:t>Body Level One</a:t>
             </a:r>
@@ -1754,7 +1817,9 @@
       <p:sp>
         <p:nvSpPr>
           <p:cNvPr id="68" name="Slide Number"/>
-          <p:cNvSpPr txBox="1"/>
+          <p:cNvSpPr txBox="1">
+            <a:spLocks noGrp="1"/>
+          </p:cNvSpPr>
           <p:nvPr>
             <p:ph type="sldNum" sz="quarter" idx="2"/>
           </p:nvPr>
@@ -1781,8 +1846,10 @@
             </a:lvl1pPr>
           </a:lstStyle>
           <a:p>
-            <a:pPr/>
-            <a:fld id="{86CB4B4D-7CA3-9044-876B-883B54F8677D}" type="slidenum"/>
+            <a:fld id="{86CB4B4D-7CA3-9044-876B-883B54F8677D}" type="slidenum">
+              <a:t>‹#›</a:t>
+            </a:fld>
+            <a:endParaRPr/>
           </a:p>
         </p:txBody>
       </p:sp>
@@ -1791,12 +1858,12 @@
   <p:clrMapOvr>
     <a:masterClrMapping/>
   </p:clrMapOvr>
-  <p:transition xmlns:p14="http://schemas.microsoft.com/office/powerpoint/2010/main" spd="med" advClick="1"/>
+  <p:transition spd="med"/>
 </p:sldLayout>
 </file>
 
 <file path=ppt/slideLayouts/slideLayout8.xml><?xml version="1.0" encoding="utf-8"?>
-<p:sldLayout xmlns:a="http://schemas.openxmlformats.org/drawingml/2006/main" xmlns:r="http://schemas.openxmlformats.org/officeDocument/2006/relationships" xmlns:p="http://schemas.openxmlformats.org/presentationml/2006/main" xmlns:m="http://schemas.openxmlformats.org/officeDocument/2006/math" xmlns:a14="http://schemas.microsoft.com/office/drawing/2010/main" type="tx" showMasterSp="1" showMasterPhAnim="1">
+<p:sldLayout xmlns:a="http://schemas.openxmlformats.org/drawingml/2006/main" xmlns:r="http://schemas.openxmlformats.org/officeDocument/2006/relationships" xmlns:p="http://schemas.openxmlformats.org/presentationml/2006/main" type="tx">
   <p:cSld name="Bullets">
     <p:spTree>
       <p:nvGrpSpPr>
@@ -1815,7 +1882,9 @@
       <p:sp>
         <p:nvSpPr>
           <p:cNvPr id="75" name="Body Level One…"/>
-          <p:cNvSpPr txBox="1"/>
+          <p:cNvSpPr txBox="1">
+            <a:spLocks noGrp="1"/>
+          </p:cNvSpPr>
           <p:nvPr>
             <p:ph type="body" idx="1"/>
           </p:nvPr>
@@ -1833,7 +1902,6 @@
           <a:bodyPr/>
           <a:lstStyle/>
           <a:p>
-            <a:pPr/>
             <a:r>
               <a:t>Body Level One</a:t>
             </a:r>
@@ -1867,7 +1935,9 @@
       <p:sp>
         <p:nvSpPr>
           <p:cNvPr id="76" name="Slide Number"/>
-          <p:cNvSpPr txBox="1"/>
+          <p:cNvSpPr txBox="1">
+            <a:spLocks noGrp="1"/>
+          </p:cNvSpPr>
           <p:nvPr>
             <p:ph type="sldNum" sz="quarter" idx="2"/>
           </p:nvPr>
@@ -1881,8 +1951,10 @@
           <a:bodyPr/>
           <a:lstStyle/>
           <a:p>
-            <a:pPr/>
-            <a:fld id="{86CB4B4D-7CA3-9044-876B-883B54F8677D}" type="slidenum"/>
+            <a:fld id="{86CB4B4D-7CA3-9044-876B-883B54F8677D}" type="slidenum">
+              <a:t>‹#›</a:t>
+            </a:fld>
+            <a:endParaRPr/>
           </a:p>
         </p:txBody>
       </p:sp>
@@ -1891,12 +1963,12 @@
   <p:clrMapOvr>
     <a:masterClrMapping/>
   </p:clrMapOvr>
-  <p:transition xmlns:p14="http://schemas.microsoft.com/office/powerpoint/2010/main" spd="med" advClick="1"/>
+  <p:transition spd="med"/>
 </p:sldLayout>
 </file>
 
 <file path=ppt/slideLayouts/slideLayout9.xml><?xml version="1.0" encoding="utf-8"?>
-<p:sldLayout xmlns:a="http://schemas.openxmlformats.org/drawingml/2006/main" xmlns:r="http://schemas.openxmlformats.org/officeDocument/2006/relationships" xmlns:p="http://schemas.openxmlformats.org/presentationml/2006/main" xmlns:m="http://schemas.openxmlformats.org/officeDocument/2006/math" xmlns:a14="http://schemas.microsoft.com/office/drawing/2010/main" type="tx" showMasterSp="1" showMasterPhAnim="1">
+<p:sldLayout xmlns:a="http://schemas.openxmlformats.org/drawingml/2006/main" xmlns:r="http://schemas.openxmlformats.org/officeDocument/2006/relationships" xmlns:p="http://schemas.openxmlformats.org/presentationml/2006/main" type="tx">
   <p:cSld name="Photo - 3 Up">
     <p:spTree>
       <p:nvGrpSpPr>
@@ -1915,7 +1987,9 @@
       <p:sp>
         <p:nvSpPr>
           <p:cNvPr id="83" name="Image"/>
-          <p:cNvSpPr/>
+          <p:cNvSpPr>
+            <a:spLocks noGrp="1"/>
+          </p:cNvSpPr>
           <p:nvPr>
             <p:ph type="pic" sz="quarter" idx="13"/>
           </p:nvPr>
@@ -1935,14 +2009,16 @@
           </a:bodyPr>
           <a:lstStyle/>
           <a:p>
-            <a:pPr/>
+            <a:endParaRPr/>
           </a:p>
         </p:txBody>
       </p:sp>
       <p:sp>
         <p:nvSpPr>
           <p:cNvPr id="84" name="Image"/>
-          <p:cNvSpPr/>
+          <p:cNvSpPr>
+            <a:spLocks noGrp="1"/>
+          </p:cNvSpPr>
           <p:nvPr>
             <p:ph type="pic" sz="quarter" idx="14"/>
           </p:nvPr>
@@ -1962,14 +2038,16 @@
           </a:bodyPr>
           <a:lstStyle/>
           <a:p>
-            <a:pPr/>
+            <a:endParaRPr/>
           </a:p>
         </p:txBody>
       </p:sp>
       <p:sp>
         <p:nvSpPr>
           <p:cNvPr id="85" name="Image"/>
-          <p:cNvSpPr/>
+          <p:cNvSpPr>
+            <a:spLocks noGrp="1"/>
+          </p:cNvSpPr>
           <p:nvPr>
             <p:ph type="pic" idx="15"/>
           </p:nvPr>
@@ -1989,14 +2067,16 @@
           </a:bodyPr>
           <a:lstStyle/>
           <a:p>
-            <a:pPr/>
+            <a:endParaRPr/>
           </a:p>
         </p:txBody>
       </p:sp>
       <p:sp>
         <p:nvSpPr>
           <p:cNvPr id="86" name="Slide Number"/>
-          <p:cNvSpPr txBox="1"/>
+          <p:cNvSpPr txBox="1">
+            <a:spLocks noGrp="1"/>
+          </p:cNvSpPr>
           <p:nvPr>
             <p:ph type="sldNum" sz="quarter" idx="2"/>
           </p:nvPr>
@@ -2010,8 +2090,10 @@
           <a:bodyPr/>
           <a:lstStyle/>
           <a:p>
-            <a:pPr/>
-            <a:fld id="{86CB4B4D-7CA3-9044-876B-883B54F8677D}" type="slidenum"/>
+            <a:fld id="{86CB4B4D-7CA3-9044-876B-883B54F8677D}" type="slidenum">
+              <a:t>‹#›</a:t>
+            </a:fld>
+            <a:endParaRPr/>
           </a:p>
         </p:txBody>
       </p:sp>
@@ -2020,18 +2102,19 @@
   <p:clrMapOvr>
     <a:masterClrMapping/>
   </p:clrMapOvr>
-  <p:transition xmlns:p14="http://schemas.microsoft.com/office/powerpoint/2010/main" spd="med" advClick="1"/>
+  <p:transition spd="med"/>
 </p:sldLayout>
 </file>
 
 <file path=ppt/slideMasters/slideMaster1.xml><?xml version="1.0" encoding="utf-8"?>
-<p:sldMaster xmlns:a="http://schemas.openxmlformats.org/drawingml/2006/main" xmlns:r="http://schemas.openxmlformats.org/officeDocument/2006/relationships" xmlns:p="http://schemas.openxmlformats.org/presentationml/2006/main" xmlns:m="http://schemas.openxmlformats.org/officeDocument/2006/math" xmlns:a14="http://schemas.microsoft.com/office/drawing/2010/main">
+<p:sldMaster xmlns:a="http://schemas.openxmlformats.org/drawingml/2006/main" xmlns:r="http://schemas.openxmlformats.org/officeDocument/2006/relationships" xmlns:p="http://schemas.openxmlformats.org/presentationml/2006/main">
   <p:cSld>
     <p:bg>
       <p:bgPr>
         <a:solidFill>
           <a:srgbClr val="FFFFFF"/>
         </a:solidFill>
+        <a:effectLst/>
       </p:bgPr>
     </p:bg>
     <p:spTree>
@@ -2051,7 +2134,9 @@
       <p:sp>
         <p:nvSpPr>
           <p:cNvPr id="2" name="Title Text"/>
-          <p:cNvSpPr txBox="1"/>
+          <p:cNvSpPr txBox="1">
+            <a:spLocks noGrp="1"/>
+          </p:cNvSpPr>
           <p:nvPr>
             <p:ph type="title"/>
           </p:nvPr>
@@ -2069,17 +2154,16 @@
           </a:ln>
           <a:extLst>
             <a:ext uri="{C572A759-6A51-4108-AA02-DFA0A04FC94B}">
-              <ma14:wrappingTextBoxFlag xmlns:ma14="http://schemas.microsoft.com/office/mac/drawingml/2011/main" val="1"/>
+              <ma14:wrappingTextBoxFlag xmlns:ma14="http://schemas.microsoft.com/office/mac/drawingml/2011/main" xmlns:a14="http://schemas.microsoft.com/office/drawing/2010/main" xmlns:m="http://schemas.openxmlformats.org/officeDocument/2006/math" xmlns="" val="1"/>
             </a:ext>
           </a:extLst>
         </p:spPr>
         <p:txBody>
           <a:bodyPr lIns="50800" tIns="50800" rIns="50800" bIns="50800" anchor="ctr">
-            <a:normAutofit fontScale="100000" lnSpcReduction="0"/>
+            <a:normAutofit/>
           </a:bodyPr>
           <a:lstStyle/>
           <a:p>
-            <a:pPr/>
             <a:r>
               <a:t>Title Text</a:t>
             </a:r>
@@ -2089,7 +2173,9 @@
       <p:sp>
         <p:nvSpPr>
           <p:cNvPr id="3" name="Body Level One…"/>
-          <p:cNvSpPr txBox="1"/>
+          <p:cNvSpPr txBox="1">
+            <a:spLocks noGrp="1"/>
+          </p:cNvSpPr>
           <p:nvPr>
             <p:ph type="body" idx="1"/>
           </p:nvPr>
@@ -2107,17 +2193,16 @@
           </a:ln>
           <a:extLst>
             <a:ext uri="{C572A759-6A51-4108-AA02-DFA0A04FC94B}">
-              <ma14:wrappingTextBoxFlag xmlns:ma14="http://schemas.microsoft.com/office/mac/drawingml/2011/main" val="1"/>
+              <ma14:wrappingTextBoxFlag xmlns:ma14="http://schemas.microsoft.com/office/mac/drawingml/2011/main" xmlns:a14="http://schemas.microsoft.com/office/drawing/2010/main" xmlns:m="http://schemas.openxmlformats.org/officeDocument/2006/math" xmlns="" val="1"/>
             </a:ext>
           </a:extLst>
         </p:spPr>
         <p:txBody>
           <a:bodyPr lIns="50800" tIns="50800" rIns="50800" bIns="50800" anchor="ctr">
-            <a:normAutofit fontScale="100000" lnSpcReduction="0"/>
+            <a:normAutofit/>
           </a:bodyPr>
           <a:lstStyle/>
           <a:p>
-            <a:pPr/>
             <a:r>
               <a:t>Body Level One</a:t>
             </a:r>
@@ -2151,7 +2236,9 @@
       <p:sp>
         <p:nvSpPr>
           <p:cNvPr id="4" name="Slide Number"/>
-          <p:cNvSpPr txBox="1"/>
+          <p:cNvSpPr txBox="1">
+            <a:spLocks noGrp="1"/>
+          </p:cNvSpPr>
           <p:nvPr>
             <p:ph type="sldNum" sz="quarter" idx="2"/>
           </p:nvPr>
@@ -2174,7 +2261,7 @@
           </a:bodyPr>
           <a:lstStyle>
             <a:lvl1pPr>
-              <a:defRPr b="0" sz="1600">
+              <a:defRPr sz="1600" b="0">
                 <a:latin typeface="Helvetica Neue Light"/>
                 <a:ea typeface="Helvetica Neue Light"/>
                 <a:cs typeface="Helvetica Neue Light"/>
@@ -2183,8 +2270,10 @@
             </a:lvl1pPr>
           </a:lstStyle>
           <a:p>
-            <a:pPr/>
-            <a:fld id="{86CB4B4D-7CA3-9044-876B-883B54F8677D}" type="slidenum"/>
+            <a:fld id="{86CB4B4D-7CA3-9044-876B-883B54F8677D}" type="slidenum">
+              <a:t>‹#›</a:t>
+            </a:fld>
+            <a:endParaRPr/>
           </a:p>
         </p:txBody>
       </p:sp>
@@ -2192,20 +2281,20 @@
   </p:cSld>
   <p:clrMap bg1="lt1" tx1="dk1" bg2="lt2" tx2="dk2" accent1="accent1" accent2="accent2" accent3="accent3" accent4="accent4" accent5="accent5" accent6="accent6" hlink="hlink" folHlink="folHlink"/>
   <p:sldLayoutIdLst>
-    <p:sldLayoutId id="2147483649" r:id="rId2"/>
-    <p:sldLayoutId id="2147483650" r:id="rId3"/>
-    <p:sldLayoutId id="2147483651" r:id="rId4"/>
-    <p:sldLayoutId id="2147483652" r:id="rId5"/>
-    <p:sldLayoutId id="2147483653" r:id="rId6"/>
-    <p:sldLayoutId id="2147483654" r:id="rId7"/>
-    <p:sldLayoutId id="2147483655" r:id="rId8"/>
-    <p:sldLayoutId id="2147483656" r:id="rId9"/>
-    <p:sldLayoutId id="2147483657" r:id="rId10"/>
-    <p:sldLayoutId id="2147483658" r:id="rId11"/>
-    <p:sldLayoutId id="2147483659" r:id="rId12"/>
-    <p:sldLayoutId id="2147483660" r:id="rId13"/>
+    <p:sldLayoutId id="2147483649" r:id="rId1"/>
+    <p:sldLayoutId id="2147483650" r:id="rId2"/>
+    <p:sldLayoutId id="2147483651" r:id="rId3"/>
+    <p:sldLayoutId id="2147483652" r:id="rId4"/>
+    <p:sldLayoutId id="2147483653" r:id="rId5"/>
+    <p:sldLayoutId id="2147483654" r:id="rId6"/>
+    <p:sldLayoutId id="2147483655" r:id="rId7"/>
+    <p:sldLayoutId id="2147483656" r:id="rId8"/>
+    <p:sldLayoutId id="2147483657" r:id="rId9"/>
+    <p:sldLayoutId id="2147483658" r:id="rId10"/>
+    <p:sldLayoutId id="2147483659" r:id="rId11"/>
+    <p:sldLayoutId id="2147483660" r:id="rId12"/>
   </p:sldLayoutIdLst>
-  <p:transition xmlns:p14="http://schemas.microsoft.com/office/powerpoint/2010/main" spd="med" advClick="1"/>
+  <p:transition spd="med"/>
   <p:txStyles>
     <p:titleStyle>
       <a:lvl1pPr marL="0" marR="0" indent="0" algn="ctr" defTabSz="584200" rtl="0" latinLnBrk="0">
@@ -2223,7 +2312,7 @@
         <a:buFontTx/>
         <a:buNone/>
         <a:tabLst/>
-        <a:defRPr b="0" baseline="0" cap="none" i="0" spc="0" strike="noStrike" sz="8000" u="none">
+        <a:defRPr sz="8000" b="0" i="0" u="none" strike="noStrike" cap="none" spc="0" baseline="0">
           <a:solidFill>
             <a:srgbClr val="000000"/>
           </a:solidFill>
@@ -2249,7 +2338,7 @@
         <a:buFontTx/>
         <a:buNone/>
         <a:tabLst/>
-        <a:defRPr b="0" baseline="0" cap="none" i="0" spc="0" strike="noStrike" sz="8000" u="none">
+        <a:defRPr sz="8000" b="0" i="0" u="none" strike="noStrike" cap="none" spc="0" baseline="0">
           <a:solidFill>
             <a:srgbClr val="000000"/>
           </a:solidFill>
@@ -2275,7 +2364,7 @@
         <a:buFontTx/>
         <a:buNone/>
         <a:tabLst/>
-        <a:defRPr b="0" baseline="0" cap="none" i="0" spc="0" strike="noStrike" sz="8000" u="none">
+        <a:defRPr sz="8000" b="0" i="0" u="none" strike="noStrike" cap="none" spc="0" baseline="0">
           <a:solidFill>
             <a:srgbClr val="000000"/>
           </a:solidFill>
@@ -2301,7 +2390,7 @@
         <a:buFontTx/>
         <a:buNone/>
         <a:tabLst/>
-        <a:defRPr b="0" baseline="0" cap="none" i="0" spc="0" strike="noStrike" sz="8000" u="none">
+        <a:defRPr sz="8000" b="0" i="0" u="none" strike="noStrike" cap="none" spc="0" baseline="0">
           <a:solidFill>
             <a:srgbClr val="000000"/>
           </a:solidFill>
@@ -2327,7 +2416,7 @@
         <a:buFontTx/>
         <a:buNone/>
         <a:tabLst/>
-        <a:defRPr b="0" baseline="0" cap="none" i="0" spc="0" strike="noStrike" sz="8000" u="none">
+        <a:defRPr sz="8000" b="0" i="0" u="none" strike="noStrike" cap="none" spc="0" baseline="0">
           <a:solidFill>
             <a:srgbClr val="000000"/>
           </a:solidFill>
@@ -2353,7 +2442,7 @@
         <a:buFontTx/>
         <a:buNone/>
         <a:tabLst/>
-        <a:defRPr b="0" baseline="0" cap="none" i="0" spc="0" strike="noStrike" sz="8000" u="none">
+        <a:defRPr sz="8000" b="0" i="0" u="none" strike="noStrike" cap="none" spc="0" baseline="0">
           <a:solidFill>
             <a:srgbClr val="000000"/>
           </a:solidFill>
@@ -2379,7 +2468,7 @@
         <a:buFontTx/>
         <a:buNone/>
         <a:tabLst/>
-        <a:defRPr b="0" baseline="0" cap="none" i="0" spc="0" strike="noStrike" sz="8000" u="none">
+        <a:defRPr sz="8000" b="0" i="0" u="none" strike="noStrike" cap="none" spc="0" baseline="0">
           <a:solidFill>
             <a:srgbClr val="000000"/>
           </a:solidFill>
@@ -2405,7 +2494,7 @@
         <a:buFontTx/>
         <a:buNone/>
         <a:tabLst/>
-        <a:defRPr b="0" baseline="0" cap="none" i="0" spc="0" strike="noStrike" sz="8000" u="none">
+        <a:defRPr sz="8000" b="0" i="0" u="none" strike="noStrike" cap="none" spc="0" baseline="0">
           <a:solidFill>
             <a:srgbClr val="000000"/>
           </a:solidFill>
@@ -2431,7 +2520,7 @@
         <a:buFontTx/>
         <a:buNone/>
         <a:tabLst/>
-        <a:defRPr b="0" baseline="0" cap="none" i="0" spc="0" strike="noStrike" sz="8000" u="none">
+        <a:defRPr sz="8000" b="0" i="0" u="none" strike="noStrike" cap="none" spc="0" baseline="0">
           <a:solidFill>
             <a:srgbClr val="000000"/>
           </a:solidFill>
@@ -2459,7 +2548,7 @@
         <a:buFontTx/>
         <a:buChar char="•"/>
         <a:tabLst/>
-        <a:defRPr b="0" baseline="0" cap="none" i="0" spc="0" strike="noStrike" sz="3200" u="none">
+        <a:defRPr sz="3200" b="0" i="0" u="none" strike="noStrike" cap="none" spc="0" baseline="0">
           <a:solidFill>
             <a:srgbClr val="000000"/>
           </a:solidFill>
@@ -2485,7 +2574,7 @@
         <a:buFontTx/>
         <a:buChar char="•"/>
         <a:tabLst/>
-        <a:defRPr b="0" baseline="0" cap="none" i="0" spc="0" strike="noStrike" sz="3200" u="none">
+        <a:defRPr sz="3200" b="0" i="0" u="none" strike="noStrike" cap="none" spc="0" baseline="0">
           <a:solidFill>
             <a:srgbClr val="000000"/>
           </a:solidFill>
@@ -2511,7 +2600,7 @@
         <a:buFontTx/>
         <a:buChar char="•"/>
         <a:tabLst/>
-        <a:defRPr b="0" baseline="0" cap="none" i="0" spc="0" strike="noStrike" sz="3200" u="none">
+        <a:defRPr sz="3200" b="0" i="0" u="none" strike="noStrike" cap="none" spc="0" baseline="0">
           <a:solidFill>
             <a:srgbClr val="000000"/>
           </a:solidFill>
@@ -2537,7 +2626,7 @@
         <a:buFontTx/>
         <a:buChar char="•"/>
         <a:tabLst/>
-        <a:defRPr b="0" baseline="0" cap="none" i="0" spc="0" strike="noStrike" sz="3200" u="none">
+        <a:defRPr sz="3200" b="0" i="0" u="none" strike="noStrike" cap="none" spc="0" baseline="0">
           <a:solidFill>
             <a:srgbClr val="000000"/>
           </a:solidFill>
@@ -2563,7 +2652,7 @@
         <a:buFontTx/>
         <a:buChar char="•"/>
         <a:tabLst/>
-        <a:defRPr b="0" baseline="0" cap="none" i="0" spc="0" strike="noStrike" sz="3200" u="none">
+        <a:defRPr sz="3200" b="0" i="0" u="none" strike="noStrike" cap="none" spc="0" baseline="0">
           <a:solidFill>
             <a:srgbClr val="000000"/>
           </a:solidFill>
@@ -2589,7 +2678,7 @@
         <a:buFontTx/>
         <a:buChar char="•"/>
         <a:tabLst/>
-        <a:defRPr b="0" baseline="0" cap="none" i="0" spc="0" strike="noStrike" sz="3200" u="none">
+        <a:defRPr sz="3200" b="0" i="0" u="none" strike="noStrike" cap="none" spc="0" baseline="0">
           <a:solidFill>
             <a:srgbClr val="000000"/>
           </a:solidFill>
@@ -2615,7 +2704,7 @@
         <a:buFontTx/>
         <a:buChar char="•"/>
         <a:tabLst/>
-        <a:defRPr b="0" baseline="0" cap="none" i="0" spc="0" strike="noStrike" sz="3200" u="none">
+        <a:defRPr sz="3200" b="0" i="0" u="none" strike="noStrike" cap="none" spc="0" baseline="0">
           <a:solidFill>
             <a:srgbClr val="000000"/>
           </a:solidFill>
@@ -2641,7 +2730,7 @@
         <a:buFontTx/>
         <a:buChar char="•"/>
         <a:tabLst/>
-        <a:defRPr b="0" baseline="0" cap="none" i="0" spc="0" strike="noStrike" sz="3200" u="none">
+        <a:defRPr sz="3200" b="0" i="0" u="none" strike="noStrike" cap="none" spc="0" baseline="0">
           <a:solidFill>
             <a:srgbClr val="000000"/>
           </a:solidFill>
@@ -2667,7 +2756,7 @@
         <a:buFontTx/>
         <a:buChar char="•"/>
         <a:tabLst/>
-        <a:defRPr b="0" baseline="0" cap="none" i="0" spc="0" strike="noStrike" sz="3200" u="none">
+        <a:defRPr sz="3200" b="0" i="0" u="none" strike="noStrike" cap="none" spc="0" baseline="0">
           <a:solidFill>
             <a:srgbClr val="000000"/>
           </a:solidFill>
@@ -2695,7 +2784,7 @@
         <a:buFontTx/>
         <a:buNone/>
         <a:tabLst/>
-        <a:defRPr b="0" baseline="0" cap="none" i="0" spc="0" strike="noStrike" sz="1600" u="none">
+        <a:defRPr sz="1600" b="0" i="0" u="none" strike="noStrike" cap="none" spc="0" baseline="0">
           <a:solidFill>
             <a:schemeClr val="tx1"/>
           </a:solidFill>
@@ -2721,7 +2810,7 @@
         <a:buFontTx/>
         <a:buNone/>
         <a:tabLst/>
-        <a:defRPr b="0" baseline="0" cap="none" i="0" spc="0" strike="noStrike" sz="1600" u="none">
+        <a:defRPr sz="1600" b="0" i="0" u="none" strike="noStrike" cap="none" spc="0" baseline="0">
           <a:solidFill>
             <a:schemeClr val="tx1"/>
           </a:solidFill>
@@ -2747,7 +2836,7 @@
         <a:buFontTx/>
         <a:buNone/>
         <a:tabLst/>
-        <a:defRPr b="0" baseline="0" cap="none" i="0" spc="0" strike="noStrike" sz="1600" u="none">
+        <a:defRPr sz="1600" b="0" i="0" u="none" strike="noStrike" cap="none" spc="0" baseline="0">
           <a:solidFill>
             <a:schemeClr val="tx1"/>
           </a:solidFill>
@@ -2773,7 +2862,7 @@
         <a:buFontTx/>
         <a:buNone/>
         <a:tabLst/>
-        <a:defRPr b="0" baseline="0" cap="none" i="0" spc="0" strike="noStrike" sz="1600" u="none">
+        <a:defRPr sz="1600" b="0" i="0" u="none" strike="noStrike" cap="none" spc="0" baseline="0">
           <a:solidFill>
             <a:schemeClr val="tx1"/>
           </a:solidFill>
@@ -2799,7 +2888,7 @@
         <a:buFontTx/>
         <a:buNone/>
         <a:tabLst/>
-        <a:defRPr b="0" baseline="0" cap="none" i="0" spc="0" strike="noStrike" sz="1600" u="none">
+        <a:defRPr sz="1600" b="0" i="0" u="none" strike="noStrike" cap="none" spc="0" baseline="0">
           <a:solidFill>
             <a:schemeClr val="tx1"/>
           </a:solidFill>
@@ -2825,7 +2914,7 @@
         <a:buFontTx/>
         <a:buNone/>
         <a:tabLst/>
-        <a:defRPr b="0" baseline="0" cap="none" i="0" spc="0" strike="noStrike" sz="1600" u="none">
+        <a:defRPr sz="1600" b="0" i="0" u="none" strike="noStrike" cap="none" spc="0" baseline="0">
           <a:solidFill>
             <a:schemeClr val="tx1"/>
           </a:solidFill>
@@ -2851,7 +2940,7 @@
         <a:buFontTx/>
         <a:buNone/>
         <a:tabLst/>
-        <a:defRPr b="0" baseline="0" cap="none" i="0" spc="0" strike="noStrike" sz="1600" u="none">
+        <a:defRPr sz="1600" b="0" i="0" u="none" strike="noStrike" cap="none" spc="0" baseline="0">
           <a:solidFill>
             <a:schemeClr val="tx1"/>
           </a:solidFill>
@@ -2877,7 +2966,7 @@
         <a:buFontTx/>
         <a:buNone/>
         <a:tabLst/>
-        <a:defRPr b="0" baseline="0" cap="none" i="0" spc="0" strike="noStrike" sz="1600" u="none">
+        <a:defRPr sz="1600" b="0" i="0" u="none" strike="noStrike" cap="none" spc="0" baseline="0">
           <a:solidFill>
             <a:schemeClr val="tx1"/>
           </a:solidFill>
@@ -2903,7 +2992,7 @@
         <a:buFontTx/>
         <a:buNone/>
         <a:tabLst/>
-        <a:defRPr b="0" baseline="0" cap="none" i="0" spc="0" strike="noStrike" sz="1600" u="none">
+        <a:defRPr sz="1600" b="0" i="0" u="none" strike="noStrike" cap="none" spc="0" baseline="0">
           <a:solidFill>
             <a:schemeClr val="tx1"/>
           </a:solidFill>
@@ -2920,7 +3009,7 @@
 </file>
 
 <file path=ppt/slides/slide1.xml><?xml version="1.0" encoding="utf-8"?>
-<p:sld xmlns:a="http://schemas.openxmlformats.org/drawingml/2006/main" xmlns:r="http://schemas.openxmlformats.org/officeDocument/2006/relationships" xmlns:p="http://schemas.openxmlformats.org/presentationml/2006/main" xmlns:m="http://schemas.openxmlformats.org/officeDocument/2006/math" xmlns:a14="http://schemas.microsoft.com/office/drawing/2010/main" showMasterSp="1" showMasterPhAnim="1">
+<p:sld xmlns:a="http://schemas.openxmlformats.org/drawingml/2006/main" xmlns:r="http://schemas.openxmlformats.org/officeDocument/2006/relationships" xmlns:p="http://schemas.openxmlformats.org/presentationml/2006/main">
   <p:cSld>
     <p:spTree>
       <p:nvGrpSpPr>
@@ -2939,7 +3028,9 @@
       <p:sp>
         <p:nvSpPr>
           <p:cNvPr id="119" name="OCRUG  Hackathon Nov 2019"/>
-          <p:cNvSpPr txBox="1"/>
+          <p:cNvSpPr txBox="1">
+            <a:spLocks noGrp="1"/>
+          </p:cNvSpPr>
           <p:nvPr>
             <p:ph type="ctrTitle"/>
           </p:nvPr>
@@ -2954,16 +3045,25 @@
           </a:prstGeom>
         </p:spPr>
         <p:txBody>
-          <a:bodyPr/>
+          <a:bodyPr>
+            <a:normAutofit fontScale="90000"/>
+          </a:bodyPr>
           <a:lstStyle/>
           <a:p>
-            <a:pPr/>
-            <a:r>
-              <a:t>OCRUG </a:t>
-            </a:r>
-            <a:br/>
-            <a:r>
-              <a:t>Hackathon Nov 2019</a:t>
+            <a:r>
+              <a:rPr lang="en-US" dirty="0"/>
+              <a:t>Southern California R User Group</a:t>
+            </a:r>
+            <a:r>
+              <a:rPr dirty="0"/>
+              <a:t> </a:t>
+            </a:r>
+            <a:br>
+              <a:rPr dirty="0"/>
+            </a:br>
+            <a:r>
+              <a:rPr dirty="0"/>
+              <a:t>Hackathon</a:t>
             </a:r>
           </a:p>
         </p:txBody>
@@ -2971,7 +3071,9 @@
       <p:sp>
         <p:nvSpPr>
           <p:cNvPr id="120" name="November 9 — 10, 2019 Paul Merage Business School • University of California, Irvine"/>
-          <p:cNvSpPr txBox="1"/>
+          <p:cNvSpPr txBox="1">
+            <a:spLocks noGrp="1"/>
+          </p:cNvSpPr>
           <p:nvPr>
             <p:ph type="subTitle" sz="quarter" idx="1"/>
           </p:nvPr>
@@ -2993,10 +3095,30 @@
               <a:defRPr sz="2960"/>
             </a:pPr>
             <a:r>
-              <a:t>November 9 — 10, 2019</a:t>
-            </a:r>
-            <a:br/>
-            <a:r>
+              <a:rPr lang="en-US" dirty="0"/>
+              <a:t>April 2</a:t>
+            </a:r>
+            <a:r>
+              <a:rPr dirty="0"/>
+              <a:t> — </a:t>
+            </a:r>
+            <a:r>
+              <a:rPr lang="en-US" dirty="0"/>
+              <a:t>3</a:t>
+            </a:r>
+            <a:r>
+              <a:rPr dirty="0"/>
+              <a:t>, 20</a:t>
+            </a:r>
+            <a:r>
+              <a:rPr lang="en-US" dirty="0"/>
+              <a:t>22</a:t>
+            </a:r>
+            <a:br>
+              <a:rPr dirty="0"/>
+            </a:br>
+            <a:r>
+              <a:rPr dirty="0"/>
               <a:t>Paul Merage Business School • University of California, Irvine</a:t>
             </a:r>
           </a:p>
@@ -3004,7 +3126,13 @@
       </p:sp>
       <p:pic>
         <p:nvPicPr>
-          <p:cNvPr id="121" name="logo_ocrug_blue_grey.png" descr="logo_ocrug_blue_grey.png"/>
+          <p:cNvPr id="3" name="Picture 2" descr="A picture containing text, display, sign, picture frame&#10;&#10;Description automatically generated">
+            <a:extLst>
+              <a:ext uri="{FF2B5EF4-FFF2-40B4-BE49-F238E27FC236}">
+                <a16:creationId xmlns:a16="http://schemas.microsoft.com/office/drawing/2014/main" id="{5E487F48-EBD7-CB40-9BE6-ED2D39831352}"/>
+              </a:ext>
+            </a:extLst>
+          </p:cNvPr>
           <p:cNvPicPr>
             <a:picLocks noChangeAspect="1"/>
           </p:cNvPicPr>
@@ -3012,7 +3140,11 @@
         </p:nvPicPr>
         <p:blipFill>
           <a:blip r:embed="rId2">
-            <a:extLst/>
+            <a:extLst>
+              <a:ext uri="{28A0092B-C50C-407E-A947-70E740481C1C}">
+                <a14:useLocalDpi xmlns:a14="http://schemas.microsoft.com/office/drawing/2010/main" val="0"/>
+              </a:ext>
+            </a:extLst>
           </a:blip>
           <a:stretch>
             <a:fillRect/>
@@ -3020,64 +3152,25 @@
         </p:blipFill>
         <p:spPr>
           <a:xfrm>
-            <a:off x="3736481" y="5314047"/>
-            <a:ext cx="5531838" cy="3302001"/>
+            <a:off x="4522724" y="5041900"/>
+            <a:ext cx="3959352" cy="4571562"/>
           </a:xfrm>
           <a:prstGeom prst="rect">
             <a:avLst/>
           </a:prstGeom>
-          <a:ln w="12700">
-            <a:miter lim="400000"/>
-          </a:ln>
         </p:spPr>
       </p:pic>
-      <p:sp>
-        <p:nvSpPr>
-          <p:cNvPr id="122" name="Twitter: oc_rug"/>
-          <p:cNvSpPr txBox="1"/>
-          <p:nvPr/>
-        </p:nvSpPr>
-        <p:spPr>
-          <a:xfrm>
-            <a:off x="5367324" y="8888195"/>
-            <a:ext cx="2270152" cy="461060"/>
-          </a:xfrm>
-          <a:prstGeom prst="rect">
-            <a:avLst/>
-          </a:prstGeom>
-          <a:ln w="12700">
-            <a:miter lim="400000"/>
-          </a:ln>
-          <a:extLst>
-            <a:ext uri="{C572A759-6A51-4108-AA02-DFA0A04FC94B}">
-              <ma14:wrappingTextBoxFlag xmlns:ma14="http://schemas.microsoft.com/office/mac/drawingml/2011/main" val="1"/>
-            </a:ext>
-          </a:extLst>
-        </p:spPr>
-        <p:txBody>
-          <a:bodyPr wrap="none" lIns="50800" tIns="50800" rIns="50800" bIns="50800" anchor="ctr">
-            <a:spAutoFit/>
-          </a:bodyPr>
-          <a:lstStyle/>
-          <a:p>
-            <a:pPr/>
-            <a:r>
-              <a:t>Twitter: oc_rug</a:t>
-            </a:r>
-          </a:p>
-        </p:txBody>
-      </p:sp>
     </p:spTree>
   </p:cSld>
   <p:clrMapOvr>
     <a:masterClrMapping/>
   </p:clrMapOvr>
-  <p:transition xmlns:p14="http://schemas.microsoft.com/office/powerpoint/2010/main" spd="med" advClick="1"/>
+  <p:transition spd="med"/>
 </p:sld>
 </file>
 
 <file path=ppt/slides/slide10.xml><?xml version="1.0" encoding="utf-8"?>
-<p:sld xmlns:a="http://schemas.openxmlformats.org/drawingml/2006/main" xmlns:r="http://schemas.openxmlformats.org/officeDocument/2006/relationships" xmlns:p="http://schemas.openxmlformats.org/presentationml/2006/main" xmlns:m="http://schemas.openxmlformats.org/officeDocument/2006/math" xmlns:a14="http://schemas.microsoft.com/office/drawing/2010/main" showMasterSp="1" showMasterPhAnim="1">
+<p:sld xmlns:a="http://schemas.openxmlformats.org/drawingml/2006/main" xmlns:r="http://schemas.openxmlformats.org/officeDocument/2006/relationships" xmlns:p="http://schemas.openxmlformats.org/presentationml/2006/main">
   <p:cSld>
     <p:spTree>
       <p:nvGrpSpPr>
@@ -3096,7 +3189,9 @@
       <p:sp>
         <p:nvSpPr>
           <p:cNvPr id="152" name="Logistics"/>
-          <p:cNvSpPr txBox="1"/>
+          <p:cNvSpPr txBox="1">
+            <a:spLocks noGrp="1"/>
+          </p:cNvSpPr>
           <p:nvPr>
             <p:ph type="title"/>
           </p:nvPr>
@@ -3110,7 +3205,6 @@
           <a:bodyPr/>
           <a:lstStyle/>
           <a:p>
-            <a:pPr/>
             <a:r>
               <a:t>Logistics</a:t>
             </a:r>
@@ -3120,7 +3214,9 @@
       <p:sp>
         <p:nvSpPr>
           <p:cNvPr id="153" name="Pull the latest Hackathon GIT repo before starting.…"/>
-          <p:cNvSpPr txBox="1"/>
+          <p:cNvSpPr txBox="1">
+            <a:spLocks noGrp="1"/>
+          </p:cNvSpPr>
           <p:nvPr>
             <p:ph type="body" idx="1"/>
           </p:nvPr>
@@ -3217,12 +3313,12 @@
   <p:clrMapOvr>
     <a:masterClrMapping/>
   </p:clrMapOvr>
-  <p:transition xmlns:p14="http://schemas.microsoft.com/office/powerpoint/2010/main" spd="med" advClick="1"/>
+  <p:transition spd="med"/>
 </p:sld>
 </file>
 
 <file path=ppt/slides/slide11.xml><?xml version="1.0" encoding="utf-8"?>
-<p:sld xmlns:a="http://schemas.openxmlformats.org/drawingml/2006/main" xmlns:r="http://schemas.openxmlformats.org/officeDocument/2006/relationships" xmlns:p="http://schemas.openxmlformats.org/presentationml/2006/main" xmlns:m="http://schemas.openxmlformats.org/officeDocument/2006/math" xmlns:a14="http://schemas.microsoft.com/office/drawing/2010/main" showMasterSp="1" showMasterPhAnim="1">
+<p:sld xmlns:a="http://schemas.openxmlformats.org/drawingml/2006/main" xmlns:r="http://schemas.openxmlformats.org/officeDocument/2006/relationships" xmlns:p="http://schemas.openxmlformats.org/presentationml/2006/main">
   <p:cSld>
     <p:spTree>
       <p:nvGrpSpPr>
@@ -3241,7 +3337,9 @@
       <p:sp>
         <p:nvSpPr>
           <p:cNvPr id="155" name="The PacMan Rule"/>
-          <p:cNvSpPr txBox="1"/>
+          <p:cNvSpPr txBox="1">
+            <a:spLocks noGrp="1"/>
+          </p:cNvSpPr>
           <p:nvPr>
             <p:ph type="title"/>
           </p:nvPr>
@@ -3255,7 +3353,6 @@
           <a:bodyPr/>
           <a:lstStyle/>
           <a:p>
-            <a:pPr/>
             <a:r>
               <a:t>The PacMan Rule</a:t>
             </a:r>
@@ -3271,9 +3368,7 @@
           <p:nvPr/>
         </p:nvPicPr>
         <p:blipFill>
-          <a:blip r:embed="rId2">
-            <a:extLst/>
-          </a:blip>
+          <a:blip r:embed="rId2"/>
           <a:stretch>
             <a:fillRect/>
           </a:stretch>
@@ -3310,7 +3405,7 @@
           </a:ln>
           <a:extLst>
             <a:ext uri="{C572A759-6A51-4108-AA02-DFA0A04FC94B}">
-              <ma14:wrappingTextBoxFlag xmlns:ma14="http://schemas.microsoft.com/office/mac/drawingml/2011/main" val="1"/>
+              <ma14:wrappingTextBoxFlag xmlns:ma14="http://schemas.microsoft.com/office/mac/drawingml/2011/main" xmlns:a14="http://schemas.microsoft.com/office/drawing/2010/main" xmlns:m="http://schemas.openxmlformats.org/officeDocument/2006/math" xmlns="" val="1"/>
             </a:ext>
           </a:extLst>
         </p:spPr>
@@ -3320,11 +3415,10 @@
           </a:bodyPr>
           <a:lstStyle>
             <a:lvl1pPr>
-              <a:defRPr b="0" i="1" sz="2800"/>
+              <a:defRPr sz="2800" b="0" i="1"/>
             </a:lvl1pPr>
           </a:lstStyle>
           <a:p>
-            <a:pPr/>
             <a:r>
               <a:t>When standing as a group of people, always leave room for 1 person to join your group.</a:t>
             </a:r>
@@ -3350,7 +3444,7 @@
           </a:ln>
           <a:extLst>
             <a:ext uri="{C572A759-6A51-4108-AA02-DFA0A04FC94B}">
-              <ma14:wrappingTextBoxFlag xmlns:ma14="http://schemas.microsoft.com/office/mac/drawingml/2011/main" val="1"/>
+              <ma14:wrappingTextBoxFlag xmlns:ma14="http://schemas.microsoft.com/office/mac/drawingml/2011/main" xmlns:a14="http://schemas.microsoft.com/office/drawing/2010/main" xmlns:m="http://schemas.openxmlformats.org/officeDocument/2006/math" xmlns="" val="1"/>
             </a:ext>
           </a:extLst>
         </p:spPr>
@@ -3364,7 +3458,6 @@
             </a:lvl1pPr>
           </a:lstStyle>
           <a:p>
-            <a:pPr/>
             <a:r>
               <a:t>Leave some space here</a:t>
             </a:r>
@@ -3398,7 +3491,7 @@
           <a:lstStyle/>
           <a:p>
             <a:pPr>
-              <a:defRPr b="0" sz="2200">
+              <a:defRPr sz="2200" b="0">
                 <a:solidFill>
                   <a:srgbClr val="FFFFFF"/>
                 </a:solidFill>
@@ -3408,6 +3501,7 @@
                 <a:sym typeface="Helvetica Neue Medium"/>
               </a:defRPr>
             </a:pPr>
+            <a:endParaRPr/>
           </a:p>
         </p:txBody>
       </p:sp>
@@ -3416,12 +3510,12 @@
   <p:clrMapOvr>
     <a:masterClrMapping/>
   </p:clrMapOvr>
-  <p:transition xmlns:p14="http://schemas.microsoft.com/office/powerpoint/2010/main" spd="med" advClick="1"/>
+  <p:transition spd="med"/>
 </p:sld>
 </file>
 
 <file path=ppt/slides/slide12.xml><?xml version="1.0" encoding="utf-8"?>
-<p:sld xmlns:a="http://schemas.openxmlformats.org/drawingml/2006/main" xmlns:r="http://schemas.openxmlformats.org/officeDocument/2006/relationships" xmlns:p="http://schemas.openxmlformats.org/presentationml/2006/main" xmlns:m="http://schemas.openxmlformats.org/officeDocument/2006/math" xmlns:a14="http://schemas.microsoft.com/office/drawing/2010/main" showMasterSp="1" showMasterPhAnim="1">
+<p:sld xmlns:a="http://schemas.openxmlformats.org/drawingml/2006/main" xmlns:r="http://schemas.openxmlformats.org/officeDocument/2006/relationships" xmlns:p="http://schemas.openxmlformats.org/presentationml/2006/main">
   <p:cSld>
     <p:spTree>
       <p:nvGrpSpPr>
@@ -3440,7 +3534,9 @@
       <p:sp>
         <p:nvSpPr>
           <p:cNvPr id="161" name="Thanks to our Sponsors!"/>
-          <p:cNvSpPr txBox="1"/>
+          <p:cNvSpPr txBox="1">
+            <a:spLocks noGrp="1"/>
+          </p:cNvSpPr>
           <p:nvPr>
             <p:ph type="title"/>
           </p:nvPr>
@@ -3458,7 +3554,6 @@
             </a:lvl1pPr>
           </a:lstStyle>
           <a:p>
-            <a:pPr/>
             <a:r>
               <a:t>Thanks to our Sponsors!</a:t>
             </a:r>
@@ -3474,9 +3569,7 @@
           <p:nvPr/>
         </p:nvPicPr>
         <p:blipFill>
-          <a:blip r:embed="rId2">
-            <a:extLst/>
-          </a:blip>
+          <a:blip r:embed="rId2"/>
           <a:stretch>
             <a:fillRect/>
           </a:stretch>
@@ -3503,9 +3596,7 @@
           <p:nvPr/>
         </p:nvPicPr>
         <p:blipFill>
-          <a:blip r:embed="rId3">
-            <a:extLst/>
-          </a:blip>
+          <a:blip r:embed="rId3"/>
           <a:stretch>
             <a:fillRect/>
           </a:stretch>
@@ -3532,46 +3623,15 @@
           <p:nvPr/>
         </p:nvPicPr>
         <p:blipFill>
-          <a:blip r:embed="rId4">
-            <a:extLst/>
-          </a:blip>
+          <a:blip r:embed="rId4"/>
           <a:stretch>
             <a:fillRect/>
           </a:stretch>
         </p:blipFill>
         <p:spPr>
           <a:xfrm>
-            <a:off x="7523210" y="5027712"/>
+            <a:off x="7847436" y="5747534"/>
             <a:ext cx="4049361" cy="1425376"/>
-          </a:xfrm>
-          <a:prstGeom prst="rect">
-            <a:avLst/>
-          </a:prstGeom>
-          <a:ln w="12700">
-            <a:miter lim="400000"/>
-          </a:ln>
-        </p:spPr>
-      </p:pic>
-      <p:pic>
-        <p:nvPicPr>
-          <p:cNvPr id="165" name="DataScienceGo-gray.png" descr="DataScienceGo-gray.png"/>
-          <p:cNvPicPr>
-            <a:picLocks noChangeAspect="1"/>
-          </p:cNvPicPr>
-          <p:nvPr/>
-        </p:nvPicPr>
-        <p:blipFill>
-          <a:blip r:embed="rId5">
-            <a:extLst/>
-          </a:blip>
-          <a:stretch>
-            <a:fillRect/>
-          </a:stretch>
-        </p:blipFill>
-        <p:spPr>
-          <a:xfrm>
-            <a:off x="618499" y="5405847"/>
-            <a:ext cx="6033750" cy="1652025"/>
           </a:xfrm>
           <a:prstGeom prst="rect">
             <a:avLst/>
@@ -3590,16 +3650,14 @@
           <p:nvPr/>
         </p:nvPicPr>
         <p:blipFill>
-          <a:blip r:embed="rId6">
-            <a:extLst/>
-          </a:blip>
+          <a:blip r:embed="rId5"/>
           <a:stretch>
             <a:fillRect/>
           </a:stretch>
         </p:blipFill>
         <p:spPr>
           <a:xfrm>
-            <a:off x="3400325" y="7172910"/>
+            <a:off x="742950" y="5747534"/>
             <a:ext cx="6471792" cy="1727889"/>
           </a:xfrm>
           <a:prstGeom prst="rect">
@@ -3615,12 +3673,12 @@
   <p:clrMapOvr>
     <a:masterClrMapping/>
   </p:clrMapOvr>
-  <p:transition xmlns:p14="http://schemas.microsoft.com/office/powerpoint/2010/main" spd="med" advClick="1"/>
+  <p:transition spd="med"/>
 </p:sld>
 </file>
 
 <file path=ppt/slides/slide13.xml><?xml version="1.0" encoding="utf-8"?>
-<p:sld xmlns:a="http://schemas.openxmlformats.org/drawingml/2006/main" xmlns:r="http://schemas.openxmlformats.org/officeDocument/2006/relationships" xmlns:p="http://schemas.openxmlformats.org/presentationml/2006/main" xmlns:m="http://schemas.openxmlformats.org/officeDocument/2006/math" xmlns:a14="http://schemas.microsoft.com/office/drawing/2010/main" showMasterSp="1" showMasterPhAnim="1">
+<p:sld xmlns:a="http://schemas.openxmlformats.org/drawingml/2006/main" xmlns:r="http://schemas.openxmlformats.org/officeDocument/2006/relationships" xmlns:p="http://schemas.openxmlformats.org/presentationml/2006/main">
   <p:cSld>
     <p:spTree>
       <p:nvGrpSpPr>
@@ -3639,7 +3697,9 @@
       <p:sp>
         <p:nvSpPr>
           <p:cNvPr id="168" name="Thanks to our Volunteers!!!"/>
-          <p:cNvSpPr txBox="1"/>
+          <p:cNvSpPr txBox="1">
+            <a:spLocks noGrp="1"/>
+          </p:cNvSpPr>
           <p:nvPr>
             <p:ph type="title"/>
           </p:nvPr>
@@ -3657,7 +3717,6 @@
             </a:lvl1pPr>
           </a:lstStyle>
           <a:p>
-            <a:pPr/>
             <a:r>
               <a:t>Thanks to our Volunteers!!!</a:t>
             </a:r>
@@ -3683,7 +3742,7 @@
           </a:ln>
           <a:extLst>
             <a:ext uri="{C572A759-6A51-4108-AA02-DFA0A04FC94B}">
-              <ma14:wrappingTextBoxFlag xmlns:ma14="http://schemas.microsoft.com/office/mac/drawingml/2011/main" val="1"/>
+              <ma14:wrappingTextBoxFlag xmlns:ma14="http://schemas.microsoft.com/office/mac/drawingml/2011/main" xmlns:a14="http://schemas.microsoft.com/office/drawing/2010/main" xmlns:m="http://schemas.openxmlformats.org/officeDocument/2006/math" xmlns="" val="1"/>
             </a:ext>
           </a:extLst>
         </p:spPr>
@@ -3697,7 +3756,6 @@
             </a:lvl1pPr>
           </a:lstStyle>
           <a:p>
-            <a:pPr/>
             <a:r>
               <a:t>👏</a:t>
             </a:r>
@@ -3709,12 +3767,12 @@
   <p:clrMapOvr>
     <a:masterClrMapping/>
   </p:clrMapOvr>
-  <p:transition xmlns:p14="http://schemas.microsoft.com/office/powerpoint/2010/main" spd="med" advClick="1"/>
+  <p:transition spd="med"/>
 </p:sld>
 </file>
 
 <file path=ppt/slides/slide14.xml><?xml version="1.0" encoding="utf-8"?>
-<p:sld xmlns:a="http://schemas.openxmlformats.org/drawingml/2006/main" xmlns:r="http://schemas.openxmlformats.org/officeDocument/2006/relationships" xmlns:p="http://schemas.openxmlformats.org/presentationml/2006/main" xmlns:m="http://schemas.openxmlformats.org/officeDocument/2006/math" xmlns:a14="http://schemas.microsoft.com/office/drawing/2010/main" showMasterSp="1" showMasterPhAnim="1">
+<p:sld xmlns:a="http://schemas.openxmlformats.org/drawingml/2006/main" xmlns:r="http://schemas.openxmlformats.org/officeDocument/2006/relationships" xmlns:p="http://schemas.openxmlformats.org/presentationml/2006/main">
   <p:cSld>
     <p:spTree>
       <p:nvGrpSpPr>
@@ -3733,7 +3791,9 @@
       <p:sp>
         <p:nvSpPr>
           <p:cNvPr id="171" name="Questions?"/>
-          <p:cNvSpPr txBox="1"/>
+          <p:cNvSpPr txBox="1">
+            <a:spLocks noGrp="1"/>
+          </p:cNvSpPr>
           <p:nvPr>
             <p:ph type="title"/>
           </p:nvPr>
@@ -3747,7 +3807,6 @@
           <a:bodyPr/>
           <a:lstStyle/>
           <a:p>
-            <a:pPr/>
             <a:r>
               <a:t>Questions?</a:t>
             </a:r>
@@ -3762,8 +3821,8 @@
         </p:nvSpPr>
         <p:spPr>
           <a:xfrm>
-            <a:off x="4033824" y="9053295"/>
-            <a:ext cx="2270152" cy="461060"/>
+            <a:off x="5117570" y="9047863"/>
+            <a:ext cx="102656" cy="471924"/>
           </a:xfrm>
           <a:prstGeom prst="rect">
             <a:avLst/>
@@ -3773,7 +3832,7 @@
           </a:ln>
           <a:extLst>
             <a:ext uri="{C572A759-6A51-4108-AA02-DFA0A04FC94B}">
-              <ma14:wrappingTextBoxFlag xmlns:ma14="http://schemas.microsoft.com/office/mac/drawingml/2011/main" val="1"/>
+              <ma14:wrappingTextBoxFlag xmlns:ma14="http://schemas.microsoft.com/office/mac/drawingml/2011/main" xmlns:a14="http://schemas.microsoft.com/office/drawing/2010/main" xmlns:m="http://schemas.openxmlformats.org/officeDocument/2006/math" xmlns="" val="1"/>
             </a:ext>
           </a:extLst>
         </p:spPr>
@@ -3783,10 +3842,7 @@
           </a:bodyPr>
           <a:lstStyle/>
           <a:p>
-            <a:pPr/>
-            <a:r>
-              <a:t>Twitter: oc_rug</a:t>
-            </a:r>
+            <a:endParaRPr dirty="0"/>
           </a:p>
         </p:txBody>
       </p:sp>
@@ -3798,8 +3854,8 @@
         </p:nvSpPr>
         <p:spPr>
           <a:xfrm>
-            <a:off x="6751319" y="9053295"/>
-            <a:ext cx="5471161" cy="461060"/>
+            <a:off x="9435571" y="9047863"/>
+            <a:ext cx="102656" cy="471924"/>
           </a:xfrm>
           <a:prstGeom prst="rect">
             <a:avLst/>
@@ -3809,7 +3865,7 @@
           </a:ln>
           <a:extLst>
             <a:ext uri="{C572A759-6A51-4108-AA02-DFA0A04FC94B}">
-              <ma14:wrappingTextBoxFlag xmlns:ma14="http://schemas.microsoft.com/office/mac/drawingml/2011/main" val="1"/>
+              <ma14:wrappingTextBoxFlag xmlns:ma14="http://schemas.microsoft.com/office/mac/drawingml/2011/main" xmlns:a14="http://schemas.microsoft.com/office/drawing/2010/main" xmlns:m="http://schemas.openxmlformats.org/officeDocument/2006/math" xmlns="" val="1"/>
             </a:ext>
           </a:extLst>
         </p:spPr>
@@ -3823,10 +3879,7 @@
             </a:lvl1pPr>
           </a:lstStyle>
           <a:p>
-            <a:pPr/>
-            <a:r>
-              <a:t>Tweet about our event with #OCRUG</a:t>
-            </a:r>
+            <a:endParaRPr dirty="0"/>
           </a:p>
         </p:txBody>
       </p:sp>
@@ -3835,12 +3888,12 @@
   <p:clrMapOvr>
     <a:masterClrMapping/>
   </p:clrMapOvr>
-  <p:transition xmlns:p14="http://schemas.microsoft.com/office/powerpoint/2010/main" spd="med" advClick="1"/>
+  <p:transition spd="med"/>
 </p:sld>
 </file>
 
 <file path=ppt/slides/slide2.xml><?xml version="1.0" encoding="utf-8"?>
-<p:sld xmlns:a="http://schemas.openxmlformats.org/drawingml/2006/main" xmlns:r="http://schemas.openxmlformats.org/officeDocument/2006/relationships" xmlns:p="http://schemas.openxmlformats.org/presentationml/2006/main" xmlns:m="http://schemas.openxmlformats.org/officeDocument/2006/math" xmlns:a14="http://schemas.microsoft.com/office/drawing/2010/main" showMasterSp="1" showMasterPhAnim="1">
+<p:sld xmlns:a="http://schemas.openxmlformats.org/drawingml/2006/main" xmlns:r="http://schemas.openxmlformats.org/officeDocument/2006/relationships" xmlns:p="http://schemas.openxmlformats.org/presentationml/2006/main">
   <p:cSld>
     <p:spTree>
       <p:nvGrpSpPr>
@@ -3859,7 +3912,9 @@
       <p:sp>
         <p:nvSpPr>
           <p:cNvPr id="124" name="Goals of the Hackathon"/>
-          <p:cNvSpPr txBox="1"/>
+          <p:cNvSpPr txBox="1">
+            <a:spLocks noGrp="1"/>
+          </p:cNvSpPr>
           <p:nvPr>
             <p:ph type="title"/>
           </p:nvPr>
@@ -3877,7 +3932,6 @@
             </a:lvl1pPr>
           </a:lstStyle>
           <a:p>
-            <a:pPr/>
             <a:r>
               <a:t>Goals of the Hackathon</a:t>
             </a:r>
@@ -3887,7 +3941,9 @@
       <p:sp>
         <p:nvSpPr>
           <p:cNvPr id="125" name="The focus is on education &amp; teamwork…"/>
-          <p:cNvSpPr txBox="1"/>
+          <p:cNvSpPr txBox="1">
+            <a:spLocks noGrp="1"/>
+          </p:cNvSpPr>
           <p:nvPr>
             <p:ph type="body" idx="1"/>
           </p:nvPr>
@@ -3956,7 +4012,7 @@
             </a:r>
           </a:p>
           <a:p>
-            <a:pPr lvl="1" marL="800100" indent="-400050" defTabSz="525779">
+            <a:pPr marL="800100" lvl="1" indent="-400050" defTabSz="525779">
               <a:spcBef>
                 <a:spcPts val="1000"/>
               </a:spcBef>
@@ -3967,7 +4023,7 @@
             </a:r>
           </a:p>
           <a:p>
-            <a:pPr lvl="1" marL="800100" indent="-400050" defTabSz="525779">
+            <a:pPr marL="800100" lvl="1" indent="-400050" defTabSz="525779">
               <a:spcBef>
                 <a:spcPts val="1000"/>
               </a:spcBef>
@@ -3978,7 +4034,7 @@
             </a:r>
           </a:p>
           <a:p>
-            <a:pPr lvl="1" marL="800100" indent="-400050" defTabSz="525779">
+            <a:pPr marL="800100" lvl="1" indent="-400050" defTabSz="525779">
               <a:spcBef>
                 <a:spcPts val="1000"/>
               </a:spcBef>
@@ -3995,12 +4051,12 @@
   <p:clrMapOvr>
     <a:masterClrMapping/>
   </p:clrMapOvr>
-  <p:transition xmlns:p14="http://schemas.microsoft.com/office/powerpoint/2010/main" spd="med" advClick="1"/>
+  <p:transition spd="med"/>
 </p:sld>
 </file>
 
 <file path=ppt/slides/slide3.xml><?xml version="1.0" encoding="utf-8"?>
-<p:sld xmlns:a="http://schemas.openxmlformats.org/drawingml/2006/main" xmlns:r="http://schemas.openxmlformats.org/officeDocument/2006/relationships" xmlns:p="http://schemas.openxmlformats.org/presentationml/2006/main" xmlns:m="http://schemas.openxmlformats.org/officeDocument/2006/math" xmlns:a14="http://schemas.microsoft.com/office/drawing/2010/main" showMasterSp="1" showMasterPhAnim="1">
+<p:sld xmlns:a="http://schemas.openxmlformats.org/drawingml/2006/main" xmlns:r="http://schemas.openxmlformats.org/officeDocument/2006/relationships" xmlns:p="http://schemas.openxmlformats.org/presentationml/2006/main">
   <p:cSld>
     <p:spTree>
       <p:nvGrpSpPr>
@@ -4019,7 +4075,9 @@
       <p:sp>
         <p:nvSpPr>
           <p:cNvPr id="127" name="Rules"/>
-          <p:cNvSpPr txBox="1"/>
+          <p:cNvSpPr txBox="1">
+            <a:spLocks noGrp="1"/>
+          </p:cNvSpPr>
           <p:nvPr>
             <p:ph type="title"/>
           </p:nvPr>
@@ -4033,7 +4091,6 @@
           <a:bodyPr/>
           <a:lstStyle/>
           <a:p>
-            <a:pPr/>
             <a:r>
               <a:t>Rules</a:t>
             </a:r>
@@ -4043,7 +4100,9 @@
       <p:sp>
         <p:nvSpPr>
           <p:cNvPr id="128" name="All participants must abide by our code of conduct…"/>
-          <p:cNvSpPr txBox="1"/>
+          <p:cNvSpPr txBox="1">
+            <a:spLocks noGrp="1"/>
+          </p:cNvSpPr>
           <p:nvPr>
             <p:ph type="body" idx="1"/>
           </p:nvPr>
@@ -4061,26 +4120,23 @@
           <a:bodyPr anchor="t"/>
           <a:lstStyle/>
           <a:p>
-            <a:pPr/>
             <a:r>
               <a:t>All participants must abide by our code of conduct</a:t>
             </a:r>
             <a:br/>
-          </a:p>
-          <a:p>
-            <a:pPr/>
+            <a:endParaRPr/>
+          </a:p>
+          <a:p>
             <a:r>
               <a:t>All work presented by the teams must be based upon work performed at the hackathon</a:t>
             </a:r>
           </a:p>
           <a:p>
-            <a:pPr/>
             <a:r>
               <a:t>Feel free to help others, even across teams</a:t>
             </a:r>
           </a:p>
           <a:p>
-            <a:pPr/>
             <a:r>
               <a:t>Please be courteous of the facilities, handle your trash, etc.</a:t>
             </a:r>
@@ -4095,8 +4151,8 @@
         </p:nvSpPr>
         <p:spPr>
           <a:xfrm>
-            <a:off x="1391818" y="3166567"/>
-            <a:ext cx="10983164" cy="461366"/>
+            <a:off x="1149460" y="3161288"/>
+            <a:ext cx="11467884" cy="471924"/>
           </a:xfrm>
           <a:prstGeom prst="rect">
             <a:avLst/>
@@ -4106,7 +4162,7 @@
           </a:ln>
           <a:extLst>
             <a:ext uri="{C572A759-6A51-4108-AA02-DFA0A04FC94B}">
-              <ma14:wrappingTextBoxFlag xmlns:ma14="http://schemas.microsoft.com/office/mac/drawingml/2011/main" val="1"/>
+              <ma14:wrappingTextBoxFlag xmlns:ma14="http://schemas.microsoft.com/office/mac/drawingml/2011/main" xmlns:a14="http://schemas.microsoft.com/office/drawing/2010/main" xmlns:m="http://schemas.openxmlformats.org/officeDocument/2006/math" xmlns="" val="1"/>
             </a:ext>
           </a:extLst>
         </p:spPr>
@@ -4124,9 +4180,38 @@
               <a:defRPr u="none"/>
             </a:pPr>
             <a:r>
-              <a:rPr u="sng"/>
-              <a:t>https://github.com/ocrug/hackathon-2019-11/blob/master/code-of-conduct.md</a:t>
-            </a:r>
+              <a:rPr u="sng" dirty="0"/>
+              <a:t>https://</a:t>
+            </a:r>
+            <a:r>
+              <a:rPr u="sng" dirty="0" err="1"/>
+              <a:t>github.com</a:t>
+            </a:r>
+            <a:r>
+              <a:rPr u="sng" dirty="0"/>
+              <a:t>/</a:t>
+            </a:r>
+            <a:r>
+              <a:rPr lang="en-US" u="sng" dirty="0" err="1"/>
+              <a:t>socalrug</a:t>
+            </a:r>
+            <a:r>
+              <a:rPr u="sng" dirty="0"/>
+              <a:t>/hackathon-20</a:t>
+            </a:r>
+            <a:r>
+              <a:rPr lang="en-US" u="sng" dirty="0"/>
+              <a:t>22-04</a:t>
+            </a:r>
+            <a:r>
+              <a:rPr u="sng" dirty="0"/>
+              <a:t>/blob/master/code-of-</a:t>
+            </a:r>
+            <a:r>
+              <a:rPr u="sng" dirty="0" err="1"/>
+              <a:t>conduct.md</a:t>
+            </a:r>
+            <a:endParaRPr u="sng" dirty="0"/>
           </a:p>
         </p:txBody>
       </p:sp>
@@ -4135,12 +4220,12 @@
   <p:clrMapOvr>
     <a:masterClrMapping/>
   </p:clrMapOvr>
-  <p:transition xmlns:p14="http://schemas.microsoft.com/office/powerpoint/2010/main" spd="med" advClick="1"/>
+  <p:transition spd="med"/>
 </p:sld>
 </file>
 
 <file path=ppt/slides/slide4.xml><?xml version="1.0" encoding="utf-8"?>
-<p:sld xmlns:a="http://schemas.openxmlformats.org/drawingml/2006/main" xmlns:r="http://schemas.openxmlformats.org/officeDocument/2006/relationships" xmlns:p="http://schemas.openxmlformats.org/presentationml/2006/main" xmlns:m="http://schemas.openxmlformats.org/officeDocument/2006/math" xmlns:a14="http://schemas.microsoft.com/office/drawing/2010/main" showMasterSp="1" showMasterPhAnim="1">
+<p:sld xmlns:a="http://schemas.openxmlformats.org/drawingml/2006/main" xmlns:r="http://schemas.openxmlformats.org/officeDocument/2006/relationships" xmlns:p="http://schemas.openxmlformats.org/presentationml/2006/main">
   <p:cSld>
     <p:spTree>
       <p:nvGrpSpPr>
@@ -4159,7 +4244,9 @@
       <p:sp>
         <p:nvSpPr>
           <p:cNvPr id="131" name="Schedule"/>
-          <p:cNvSpPr txBox="1"/>
+          <p:cNvSpPr txBox="1">
+            <a:spLocks noGrp="1"/>
+          </p:cNvSpPr>
           <p:nvPr>
             <p:ph type="title"/>
           </p:nvPr>
@@ -4173,53 +4260,23 @@
           <a:bodyPr/>
           <a:lstStyle/>
           <a:p>
-            <a:pPr/>
             <a:r>
               <a:t>Schedule</a:t>
             </a:r>
           </a:p>
         </p:txBody>
       </p:sp>
-      <p:pic>
-        <p:nvPicPr>
-          <p:cNvPr id="132" name="saturday.png" descr="saturday.png"/>
-          <p:cNvPicPr>
-            <a:picLocks noChangeAspect="1"/>
-          </p:cNvPicPr>
-          <p:nvPr/>
-        </p:nvPicPr>
-        <p:blipFill>
-          <a:blip r:embed="rId2">
-            <a:extLst/>
-          </a:blip>
-          <a:stretch>
-            <a:fillRect/>
-          </a:stretch>
-        </p:blipFill>
-        <p:spPr>
-          <a:xfrm>
-            <a:off x="3260918" y="2376348"/>
-            <a:ext cx="6482964" cy="6987869"/>
-          </a:xfrm>
-          <a:prstGeom prst="rect">
-            <a:avLst/>
-          </a:prstGeom>
-          <a:ln w="12700">
-            <a:miter lim="400000"/>
-          </a:ln>
-        </p:spPr>
-      </p:pic>
     </p:spTree>
   </p:cSld>
   <p:clrMapOvr>
     <a:masterClrMapping/>
   </p:clrMapOvr>
-  <p:transition xmlns:p14="http://schemas.microsoft.com/office/powerpoint/2010/main" spd="med" advClick="1"/>
+  <p:transition spd="med"/>
 </p:sld>
 </file>
 
 <file path=ppt/slides/slide5.xml><?xml version="1.0" encoding="utf-8"?>
-<p:sld xmlns:a="http://schemas.openxmlformats.org/drawingml/2006/main" xmlns:r="http://schemas.openxmlformats.org/officeDocument/2006/relationships" xmlns:p="http://schemas.openxmlformats.org/presentationml/2006/main" xmlns:m="http://schemas.openxmlformats.org/officeDocument/2006/math" xmlns:a14="http://schemas.microsoft.com/office/drawing/2010/main" showMasterSp="1" showMasterPhAnim="1">
+<p:sld xmlns:a="http://schemas.openxmlformats.org/drawingml/2006/main" xmlns:r="http://schemas.openxmlformats.org/officeDocument/2006/relationships" xmlns:p="http://schemas.openxmlformats.org/presentationml/2006/main">
   <p:cSld>
     <p:spTree>
       <p:nvGrpSpPr>
@@ -4238,7 +4295,9 @@
       <p:sp>
         <p:nvSpPr>
           <p:cNvPr id="134" name="Schedule"/>
-          <p:cNvSpPr txBox="1"/>
+          <p:cNvSpPr txBox="1">
+            <a:spLocks noGrp="1"/>
+          </p:cNvSpPr>
           <p:nvPr>
             <p:ph type="title"/>
           </p:nvPr>
@@ -4252,53 +4311,23 @@
           <a:bodyPr/>
           <a:lstStyle/>
           <a:p>
-            <a:pPr/>
             <a:r>
               <a:t>Schedule</a:t>
             </a:r>
           </a:p>
         </p:txBody>
       </p:sp>
-      <p:pic>
-        <p:nvPicPr>
-          <p:cNvPr id="135" name="sunday.png" descr="sunday.png"/>
-          <p:cNvPicPr>
-            <a:picLocks noChangeAspect="1"/>
-          </p:cNvPicPr>
-          <p:nvPr/>
-        </p:nvPicPr>
-        <p:blipFill>
-          <a:blip r:embed="rId2">
-            <a:extLst/>
-          </a:blip>
-          <a:stretch>
-            <a:fillRect/>
-          </a:stretch>
-        </p:blipFill>
-        <p:spPr>
-          <a:xfrm>
-            <a:off x="2832100" y="2640310"/>
-            <a:ext cx="7340600" cy="5626101"/>
-          </a:xfrm>
-          <a:prstGeom prst="rect">
-            <a:avLst/>
-          </a:prstGeom>
-          <a:ln w="12700">
-            <a:miter lim="400000"/>
-          </a:ln>
-        </p:spPr>
-      </p:pic>
     </p:spTree>
   </p:cSld>
   <p:clrMapOvr>
     <a:masterClrMapping/>
   </p:clrMapOvr>
-  <p:transition xmlns:p14="http://schemas.microsoft.com/office/powerpoint/2010/main" spd="med" advClick="1"/>
+  <p:transition spd="med"/>
 </p:sld>
 </file>
 
 <file path=ppt/slides/slide6.xml><?xml version="1.0" encoding="utf-8"?>
-<p:sld xmlns:a="http://schemas.openxmlformats.org/drawingml/2006/main" xmlns:r="http://schemas.openxmlformats.org/officeDocument/2006/relationships" xmlns:p="http://schemas.openxmlformats.org/presentationml/2006/main" xmlns:m="http://schemas.openxmlformats.org/officeDocument/2006/math" xmlns:a14="http://schemas.microsoft.com/office/drawing/2010/main" showMasterSp="1" showMasterPhAnim="1">
+<p:sld xmlns:a="http://schemas.openxmlformats.org/drawingml/2006/main" xmlns:r="http://schemas.openxmlformats.org/officeDocument/2006/relationships" xmlns:p="http://schemas.openxmlformats.org/presentationml/2006/main">
   <p:cSld>
     <p:spTree>
       <p:nvGrpSpPr>
@@ -4317,7 +4346,9 @@
       <p:sp>
         <p:nvSpPr>
           <p:cNvPr id="137" name="Awards Categories"/>
-          <p:cNvSpPr txBox="1"/>
+          <p:cNvSpPr txBox="1">
+            <a:spLocks noGrp="1"/>
+          </p:cNvSpPr>
           <p:nvPr>
             <p:ph type="title"/>
           </p:nvPr>
@@ -4331,7 +4362,6 @@
           <a:bodyPr/>
           <a:lstStyle/>
           <a:p>
-            <a:pPr/>
             <a:r>
               <a:t>Awards Categories</a:t>
             </a:r>
@@ -4341,7 +4371,9 @@
       <p:sp>
         <p:nvSpPr>
           <p:cNvPr id="138" name="Best Insight…"/>
-          <p:cNvSpPr txBox="1"/>
+          <p:cNvSpPr txBox="1">
+            <a:spLocks noGrp="1"/>
+          </p:cNvSpPr>
           <p:nvPr>
             <p:ph type="body" idx="1"/>
           </p:nvPr>
@@ -4361,6 +4393,7 @@
               </a:spcBef>
             </a:pPr>
             <a:r>
+              <a:rPr dirty="0"/>
               <a:t>Best Insight</a:t>
             </a:r>
           </a:p>
@@ -4371,6 +4404,7 @@
               </a:spcBef>
             </a:pPr>
             <a:r>
+              <a:rPr dirty="0"/>
               <a:t>Best Visualization</a:t>
             </a:r>
           </a:p>
@@ -4381,17 +4415,8 @@
               </a:spcBef>
             </a:pPr>
             <a:r>
+              <a:rPr dirty="0"/>
               <a:t>Best Model</a:t>
-            </a:r>
-          </a:p>
-          <a:p>
-            <a:pPr>
-              <a:spcBef>
-                <a:spcPts val="2300"/>
-              </a:spcBef>
-            </a:pPr>
-            <a:r>
-              <a:t>Most Helpful Person</a:t>
             </a:r>
           </a:p>
         </p:txBody>
@@ -4404,8 +4429,8 @@
         </p:nvSpPr>
         <p:spPr>
           <a:xfrm>
-            <a:off x="423621" y="7141667"/>
-            <a:ext cx="12157558" cy="461366"/>
+            <a:off x="172945" y="7136388"/>
+            <a:ext cx="12658915" cy="471924"/>
           </a:xfrm>
           <a:prstGeom prst="rect">
             <a:avLst/>
@@ -4415,7 +4440,7 @@
           </a:ln>
           <a:extLst>
             <a:ext uri="{C572A759-6A51-4108-AA02-DFA0A04FC94B}">
-              <ma14:wrappingTextBoxFlag xmlns:ma14="http://schemas.microsoft.com/office/mac/drawingml/2011/main" val="1"/>
+              <ma14:wrappingTextBoxFlag xmlns:ma14="http://schemas.microsoft.com/office/mac/drawingml/2011/main" xmlns:a14="http://schemas.microsoft.com/office/drawing/2010/main" xmlns:m="http://schemas.openxmlformats.org/officeDocument/2006/math" xmlns="" val="1"/>
             </a:ext>
           </a:extLst>
         </p:spPr>
@@ -4433,9 +4458,38 @@
               <a:defRPr u="none"/>
             </a:pPr>
             <a:r>
-              <a:rPr u="sng"/>
-              <a:t>https://github.com/ocrug/hackathon-2019-11/blob/master/admin/judging_guidelines.md</a:t>
-            </a:r>
+              <a:rPr u="sng" dirty="0"/>
+              <a:t>https://</a:t>
+            </a:r>
+            <a:r>
+              <a:rPr u="sng" dirty="0" err="1"/>
+              <a:t>github.com</a:t>
+            </a:r>
+            <a:r>
+              <a:rPr u="sng" dirty="0"/>
+              <a:t>/</a:t>
+            </a:r>
+            <a:r>
+              <a:rPr lang="en-US" dirty="0" err="1"/>
+              <a:t>socalrug</a:t>
+            </a:r>
+            <a:r>
+              <a:rPr u="sng" dirty="0"/>
+              <a:t>/hackathon-20</a:t>
+            </a:r>
+            <a:r>
+              <a:rPr lang="en-US" u="sng" dirty="0"/>
+              <a:t>22-04</a:t>
+            </a:r>
+            <a:r>
+              <a:rPr u="sng" dirty="0"/>
+              <a:t>/blob/master/admin/</a:t>
+            </a:r>
+            <a:r>
+              <a:rPr u="sng" dirty="0" err="1"/>
+              <a:t>judging_guidelines.md</a:t>
+            </a:r>
+            <a:endParaRPr u="sng" dirty="0"/>
           </a:p>
         </p:txBody>
       </p:sp>
@@ -4458,7 +4512,7 @@
           </a:ln>
           <a:extLst>
             <a:ext uri="{C572A759-6A51-4108-AA02-DFA0A04FC94B}">
-              <ma14:wrappingTextBoxFlag xmlns:ma14="http://schemas.microsoft.com/office/mac/drawingml/2011/main" val="1"/>
+              <ma14:wrappingTextBoxFlag xmlns:ma14="http://schemas.microsoft.com/office/mac/drawingml/2011/main" xmlns:a14="http://schemas.microsoft.com/office/drawing/2010/main" xmlns:m="http://schemas.openxmlformats.org/officeDocument/2006/math" xmlns="" val="1"/>
             </a:ext>
           </a:extLst>
         </p:spPr>
@@ -4468,7 +4522,6 @@
           </a:bodyPr>
           <a:lstStyle/>
           <a:p>
-            <a:pPr/>
             <a:r>
               <a:t>More info on the judging guidelines:</a:t>
             </a:r>
@@ -4480,12 +4533,12 @@
   <p:clrMapOvr>
     <a:masterClrMapping/>
   </p:clrMapOvr>
-  <p:transition xmlns:p14="http://schemas.microsoft.com/office/powerpoint/2010/main" spd="med" advClick="1"/>
+  <p:transition spd="med"/>
 </p:sld>
 </file>
 
 <file path=ppt/slides/slide7.xml><?xml version="1.0" encoding="utf-8"?>
-<p:sld xmlns:a="http://schemas.openxmlformats.org/drawingml/2006/main" xmlns:r="http://schemas.openxmlformats.org/officeDocument/2006/relationships" xmlns:p="http://schemas.openxmlformats.org/presentationml/2006/main" xmlns:m="http://schemas.openxmlformats.org/officeDocument/2006/math" xmlns:a14="http://schemas.microsoft.com/office/drawing/2010/main" showMasterSp="1" showMasterPhAnim="1">
+<p:sld xmlns:a="http://schemas.openxmlformats.org/drawingml/2006/main" xmlns:r="http://schemas.openxmlformats.org/officeDocument/2006/relationships" xmlns:p="http://schemas.openxmlformats.org/presentationml/2006/main">
   <p:cSld>
     <p:spTree>
       <p:nvGrpSpPr>
@@ -4504,7 +4557,9 @@
       <p:sp>
         <p:nvSpPr>
           <p:cNvPr id="142" name="Team Formation"/>
-          <p:cNvSpPr txBox="1"/>
+          <p:cNvSpPr txBox="1">
+            <a:spLocks noGrp="1"/>
+          </p:cNvSpPr>
           <p:nvPr>
             <p:ph type="title"/>
           </p:nvPr>
@@ -4518,7 +4573,6 @@
           <a:bodyPr/>
           <a:lstStyle/>
           <a:p>
-            <a:pPr/>
             <a:r>
               <a:t>Team Formation</a:t>
             </a:r>
@@ -4528,7 +4582,9 @@
       <p:sp>
         <p:nvSpPr>
           <p:cNvPr id="143" name="Everyone needs to be on a team with 2 — 5 people…"/>
-          <p:cNvSpPr txBox="1"/>
+          <p:cNvSpPr txBox="1">
+            <a:spLocks noGrp="1"/>
+          </p:cNvSpPr>
           <p:nvPr>
             <p:ph type="body" idx="1"/>
           </p:nvPr>
@@ -4584,6 +4640,7 @@
               </a:buClr>
               <a:defRPr sz="3000"/>
             </a:pPr>
+            <a:endParaRPr/>
           </a:p>
           <a:p>
             <a:pPr>
@@ -4595,6 +4652,7 @@
               </a:buClr>
               <a:defRPr sz="3000"/>
             </a:pPr>
+            <a:endParaRPr/>
           </a:p>
           <a:p>
             <a:pPr>
@@ -4663,7 +4721,7 @@
           </a:ln>
           <a:extLst>
             <a:ext uri="{C572A759-6A51-4108-AA02-DFA0A04FC94B}">
-              <ma14:wrappingTextBoxFlag xmlns:ma14="http://schemas.microsoft.com/office/mac/drawingml/2011/main" val="1"/>
+              <ma14:wrappingTextBoxFlag xmlns:ma14="http://schemas.microsoft.com/office/mac/drawingml/2011/main" xmlns:a14="http://schemas.microsoft.com/office/drawing/2010/main" xmlns:m="http://schemas.openxmlformats.org/officeDocument/2006/math" xmlns="" val="1"/>
             </a:ext>
           </a:extLst>
         </p:spPr>
@@ -4677,7 +4735,6 @@
             </a:lvl1pPr>
           </a:lstStyle>
           <a:p>
-            <a:pPr/>
             <a:r>
               <a:t>For Participants that need a team &amp; existing teams that need more members</a:t>
             </a:r>
@@ -4689,12 +4746,12 @@
   <p:clrMapOvr>
     <a:masterClrMapping/>
   </p:clrMapOvr>
-  <p:transition xmlns:p14="http://schemas.microsoft.com/office/powerpoint/2010/main" spd="med" advClick="1"/>
+  <p:transition spd="med"/>
 </p:sld>
 </file>
 
 <file path=ppt/slides/slide8.xml><?xml version="1.0" encoding="utf-8"?>
-<p:sld xmlns:a="http://schemas.openxmlformats.org/drawingml/2006/main" xmlns:r="http://schemas.openxmlformats.org/officeDocument/2006/relationships" xmlns:p="http://schemas.openxmlformats.org/presentationml/2006/main" xmlns:m="http://schemas.openxmlformats.org/officeDocument/2006/math" xmlns:a14="http://schemas.microsoft.com/office/drawing/2010/main" showMasterSp="1" showMasterPhAnim="1">
+<p:sld xmlns:a="http://schemas.openxmlformats.org/drawingml/2006/main" xmlns:r="http://schemas.openxmlformats.org/officeDocument/2006/relationships" xmlns:p="http://schemas.openxmlformats.org/presentationml/2006/main">
   <p:cSld>
     <p:spTree>
       <p:nvGrpSpPr>
@@ -4713,7 +4770,9 @@
       <p:sp>
         <p:nvSpPr>
           <p:cNvPr id="146" name="Presentations"/>
-          <p:cNvSpPr txBox="1"/>
+          <p:cNvSpPr txBox="1">
+            <a:spLocks noGrp="1"/>
+          </p:cNvSpPr>
           <p:nvPr>
             <p:ph type="title"/>
           </p:nvPr>
@@ -4727,7 +4786,6 @@
           <a:bodyPr/>
           <a:lstStyle/>
           <a:p>
-            <a:pPr/>
             <a:r>
               <a:t>Presentations</a:t>
             </a:r>
@@ -4737,7 +4795,9 @@
       <p:sp>
         <p:nvSpPr>
           <p:cNvPr id="147" name="All teams will submit a short 2 - 3 page PDF summary of their findings…"/>
-          <p:cNvSpPr txBox="1"/>
+          <p:cNvSpPr txBox="1">
+            <a:spLocks noGrp="1"/>
+          </p:cNvSpPr>
           <p:nvPr>
             <p:ph type="body" idx="1"/>
           </p:nvPr>
@@ -4751,7 +4811,6 @@
           <a:bodyPr anchor="t"/>
           <a:lstStyle/>
           <a:p>
-            <a:pPr/>
             <a:r>
               <a:t>All teams will submit a </a:t>
             </a:r>
@@ -4764,7 +4823,6 @@
             </a:r>
           </a:p>
           <a:p>
-            <a:pPr/>
             <a:r>
               <a:t>Teams will have </a:t>
             </a:r>
@@ -4777,13 +4835,11 @@
             </a:r>
           </a:p>
           <a:p>
-            <a:pPr/>
             <a:r>
               <a:t>The panel of judges will review the work and decide on the awards</a:t>
             </a:r>
           </a:p>
           <a:p>
-            <a:pPr/>
             <a:r>
               <a:t>Try to have a good idea about what you’ll be presenting by Saturday night!</a:t>
             </a:r>
@@ -4795,12 +4851,12 @@
   <p:clrMapOvr>
     <a:masterClrMapping/>
   </p:clrMapOvr>
-  <p:transition xmlns:p14="http://schemas.microsoft.com/office/powerpoint/2010/main" spd="med" advClick="1"/>
+  <p:transition spd="med"/>
 </p:sld>
 </file>
 
 <file path=ppt/slides/slide9.xml><?xml version="1.0" encoding="utf-8"?>
-<p:sld xmlns:a="http://schemas.openxmlformats.org/drawingml/2006/main" xmlns:r="http://schemas.openxmlformats.org/officeDocument/2006/relationships" xmlns:p="http://schemas.openxmlformats.org/presentationml/2006/main" xmlns:m="http://schemas.openxmlformats.org/officeDocument/2006/math" xmlns:a14="http://schemas.microsoft.com/office/drawing/2010/main" showMasterSp="1" showMasterPhAnim="1">
+<p:sld xmlns:a="http://schemas.openxmlformats.org/drawingml/2006/main" xmlns:r="http://schemas.openxmlformats.org/officeDocument/2006/relationships" xmlns:p="http://schemas.openxmlformats.org/presentationml/2006/main">
   <p:cSld>
     <p:spTree>
       <p:nvGrpSpPr>
@@ -4819,7 +4875,9 @@
       <p:sp>
         <p:nvSpPr>
           <p:cNvPr id="149" name="Logistics"/>
-          <p:cNvSpPr txBox="1"/>
+          <p:cNvSpPr txBox="1">
+            <a:spLocks noGrp="1"/>
+          </p:cNvSpPr>
           <p:nvPr>
             <p:ph type="title"/>
           </p:nvPr>
@@ -4833,7 +4891,6 @@
           <a:bodyPr/>
           <a:lstStyle/>
           <a:p>
-            <a:pPr/>
             <a:r>
               <a:t>Logistics</a:t>
             </a:r>
@@ -4843,7 +4900,9 @@
       <p:sp>
         <p:nvSpPr>
           <p:cNvPr id="150" name="Feel free to come and go as you like.   IMPORTANT: Building door locks at 10 PM…"/>
-          <p:cNvSpPr txBox="1"/>
+          <p:cNvSpPr txBox="1">
+            <a:spLocks noGrp="1"/>
+          </p:cNvSpPr>
           <p:nvPr>
             <p:ph type="body" idx="1"/>
           </p:nvPr>
@@ -4864,10 +4923,14 @@
               <a:defRPr sz="3040"/>
             </a:pPr>
             <a:r>
+              <a:rPr dirty="0"/>
               <a:t>Feel free to come and go as you like.  </a:t>
             </a:r>
-            <a:br/>
-            <a:r>
+            <a:br>
+              <a:rPr dirty="0"/>
+            </a:br>
+            <a:r>
+              <a:rPr dirty="0"/>
               <a:t>IMPORTANT: Building door locks at 10 PM</a:t>
             </a:r>
           </a:p>
@@ -4879,6 +4942,7 @@
               <a:defRPr sz="3040"/>
             </a:pPr>
             <a:r>
+              <a:rPr dirty="0"/>
               <a:t>We have several breakout rooms if you’d like a quieter environment, the patio if you’d like some air</a:t>
             </a:r>
           </a:p>
@@ -4890,6 +4954,7 @@
               <a:defRPr sz="3040"/>
             </a:pPr>
             <a:r>
+              <a:rPr dirty="0"/>
               <a:t>Please be mindful of others in the building</a:t>
             </a:r>
           </a:p>
@@ -4901,6 +4966,7 @@
               <a:defRPr sz="3040"/>
             </a:pPr>
             <a:r>
+              <a:rPr dirty="0"/>
               <a:t>Let us know if you see anything that might need our attention</a:t>
             </a:r>
           </a:p>
@@ -4912,17 +4978,26 @@
               <a:defRPr sz="3040"/>
             </a:pPr>
             <a:r>
+              <a:rPr dirty="0"/>
               <a:t>The Slack channel </a:t>
             </a:r>
             <a:r>
-              <a:rPr b="1"/>
-              <a:t>#hackathon-2019</a:t>
-            </a:r>
-            <a:r>
+              <a:rPr b="1" dirty="0"/>
+              <a:t>#hackathon-20</a:t>
+            </a:r>
+            <a:r>
+              <a:rPr lang="en-US" b="1" dirty="0"/>
+              <a:t>22-04</a:t>
+            </a:r>
+            <a:r>
+              <a:rPr dirty="0"/>
               <a:t> will be used for announcements and you are encouraged to post </a:t>
             </a:r>
-            <a:br/>
-            <a:r>
+            <a:br>
+              <a:rPr dirty="0"/>
+            </a:br>
+            <a:r>
+              <a:rPr dirty="0"/>
               <a:t>questions / comments</a:t>
             </a:r>
           </a:p>
@@ -4933,12 +5008,12 @@
   <p:clrMapOvr>
     <a:masterClrMapping/>
   </p:clrMapOvr>
-  <p:transition xmlns:p14="http://schemas.microsoft.com/office/powerpoint/2010/main" spd="med" advClick="1"/>
+  <p:transition spd="med"/>
 </p:sld>
 </file>
 
 <file path=ppt/theme/theme1.xml><?xml version="1.0" encoding="utf-8"?>
-<a:theme xmlns:a="http://schemas.openxmlformats.org/drawingml/2006/main" xmlns:r="http://schemas.openxmlformats.org/officeDocument/2006/relationships" name="White">
+<a:theme xmlns:a="http://schemas.openxmlformats.org/drawingml/2006/main" name="White">
   <a:themeElements>
     <a:clrScheme name="White">
       <a:dk1>
@@ -5137,7 +5212,7 @@
         <a:effectLst/>
         <a:sp3d/>
       </a:spPr>
-      <a:bodyPr rot="0" spcFirstLastPara="1" vertOverflow="overflow" horzOverflow="overflow" vert="horz" wrap="square" lIns="50800" tIns="50800" rIns="50800" bIns="50800" numCol="1" spcCol="38100" rtlCol="0" anchor="ctr" upright="0">
+      <a:bodyPr rot="0" spcFirstLastPara="1" vertOverflow="overflow" horzOverflow="overflow" vert="horz" wrap="square" lIns="50800" tIns="50800" rIns="50800" bIns="50800" numCol="1" spcCol="38100" rtlCol="0" anchor="ctr">
         <a:spAutoFit/>
       </a:bodyPr>
       <a:lstStyle>
@@ -5156,7 +5231,7 @@
           <a:buFontTx/>
           <a:buNone/>
           <a:tabLst/>
-          <a:defRPr b="0" baseline="0" cap="none" i="0" spc="0" strike="noStrike" sz="2200" u="none" kumimoji="0" normalizeH="0">
+          <a:defRPr kumimoji="0" sz="2200" b="0" i="0" u="none" strike="noStrike" cap="none" spc="0" normalizeH="0" baseline="0">
             <a:ln>
               <a:noFill/>
             </a:ln>
@@ -5186,7 +5261,7 @@
           <a:buFontTx/>
           <a:buNone/>
           <a:tabLst/>
-          <a:defRPr b="0" baseline="0" cap="none" i="0" spc="0" strike="noStrike" sz="1800" u="none" kumimoji="0" normalizeH="0">
+          <a:defRPr kumimoji="0" sz="1800" b="0" i="0" u="none" strike="noStrike" cap="none" spc="0" normalizeH="0" baseline="0">
             <a:ln>
               <a:noFill/>
             </a:ln>
@@ -5212,7 +5287,7 @@
           <a:buFontTx/>
           <a:buNone/>
           <a:tabLst/>
-          <a:defRPr b="0" baseline="0" cap="none" i="0" spc="0" strike="noStrike" sz="1800" u="none" kumimoji="0" normalizeH="0">
+          <a:defRPr kumimoji="0" sz="1800" b="0" i="0" u="none" strike="noStrike" cap="none" spc="0" normalizeH="0" baseline="0">
             <a:ln>
               <a:noFill/>
             </a:ln>
@@ -5238,7 +5313,7 @@
           <a:buFontTx/>
           <a:buNone/>
           <a:tabLst/>
-          <a:defRPr b="0" baseline="0" cap="none" i="0" spc="0" strike="noStrike" sz="1800" u="none" kumimoji="0" normalizeH="0">
+          <a:defRPr kumimoji="0" sz="1800" b="0" i="0" u="none" strike="noStrike" cap="none" spc="0" normalizeH="0" baseline="0">
             <a:ln>
               <a:noFill/>
             </a:ln>
@@ -5264,7 +5339,7 @@
           <a:buFontTx/>
           <a:buNone/>
           <a:tabLst/>
-          <a:defRPr b="0" baseline="0" cap="none" i="0" spc="0" strike="noStrike" sz="1800" u="none" kumimoji="0" normalizeH="0">
+          <a:defRPr kumimoji="0" sz="1800" b="0" i="0" u="none" strike="noStrike" cap="none" spc="0" normalizeH="0" baseline="0">
             <a:ln>
               <a:noFill/>
             </a:ln>
@@ -5290,7 +5365,7 @@
           <a:buFontTx/>
           <a:buNone/>
           <a:tabLst/>
-          <a:defRPr b="0" baseline="0" cap="none" i="0" spc="0" strike="noStrike" sz="1800" u="none" kumimoji="0" normalizeH="0">
+          <a:defRPr kumimoji="0" sz="1800" b="0" i="0" u="none" strike="noStrike" cap="none" spc="0" normalizeH="0" baseline="0">
             <a:ln>
               <a:noFill/>
             </a:ln>
@@ -5316,7 +5391,7 @@
           <a:buFontTx/>
           <a:buNone/>
           <a:tabLst/>
-          <a:defRPr b="0" baseline="0" cap="none" i="0" spc="0" strike="noStrike" sz="1800" u="none" kumimoji="0" normalizeH="0">
+          <a:defRPr kumimoji="0" sz="1800" b="0" i="0" u="none" strike="noStrike" cap="none" spc="0" normalizeH="0" baseline="0">
             <a:ln>
               <a:noFill/>
             </a:ln>
@@ -5342,7 +5417,7 @@
           <a:buFontTx/>
           <a:buNone/>
           <a:tabLst/>
-          <a:defRPr b="0" baseline="0" cap="none" i="0" spc="0" strike="noStrike" sz="1800" u="none" kumimoji="0" normalizeH="0">
+          <a:defRPr kumimoji="0" sz="1800" b="0" i="0" u="none" strike="noStrike" cap="none" spc="0" normalizeH="0" baseline="0">
             <a:ln>
               <a:noFill/>
             </a:ln>
@@ -5368,7 +5443,7 @@
           <a:buFontTx/>
           <a:buNone/>
           <a:tabLst/>
-          <a:defRPr b="0" baseline="0" cap="none" i="0" spc="0" strike="noStrike" sz="1800" u="none" kumimoji="0" normalizeH="0">
+          <a:defRPr kumimoji="0" sz="1800" b="0" i="0" u="none" strike="noStrike" cap="none" spc="0" normalizeH="0" baseline="0">
             <a:ln>
               <a:noFill/>
             </a:ln>
@@ -5394,7 +5469,7 @@
           <a:buFontTx/>
           <a:buNone/>
           <a:tabLst/>
-          <a:defRPr b="0" baseline="0" cap="none" i="0" spc="0" strike="noStrike" sz="1800" u="none" kumimoji="0" normalizeH="0">
+          <a:defRPr kumimoji="0" sz="1800" b="0" i="0" u="none" strike="noStrike" cap="none" spc="0" normalizeH="0" baseline="0">
             <a:ln>
               <a:noFill/>
             </a:ln>
@@ -5407,9 +5482,15 @@
         </a:lvl9pPr>
       </a:lstStyle>
       <a:style>
-        <a:lnRef idx="0"/>
-        <a:fillRef idx="0"/>
-        <a:effectRef idx="0"/>
+        <a:lnRef idx="0">
+          <a:scrgbClr r="0" g="0" b="0"/>
+        </a:lnRef>
+        <a:fillRef idx="0">
+          <a:scrgbClr r="0" g="0" b="0"/>
+        </a:fillRef>
+        <a:effectRef idx="0">
+          <a:scrgbClr r="0" g="0" b="0"/>
+        </a:effectRef>
         <a:fontRef idx="none"/>
       </a:style>
     </a:spDef>
@@ -5426,7 +5507,7 @@
         <a:effectLst/>
         <a:sp3d/>
       </a:spPr>
-      <a:bodyPr rot="0" spcFirstLastPara="1" vertOverflow="overflow" horzOverflow="overflow" vert="horz" wrap="square" lIns="91439" tIns="45719" rIns="91439" bIns="45719" numCol="1" spcCol="38100" rtlCol="0" anchor="t" upright="0">
+      <a:bodyPr rot="0" spcFirstLastPara="1" vertOverflow="overflow" horzOverflow="overflow" vert="horz" wrap="square" lIns="91439" tIns="45719" rIns="91439" bIns="45719" numCol="1" spcCol="38100" rtlCol="0" anchor="t">
         <a:noAutofit/>
       </a:bodyPr>
       <a:lstStyle>
@@ -5445,7 +5526,7 @@
           <a:buFontTx/>
           <a:buNone/>
           <a:tabLst/>
-          <a:defRPr b="0" baseline="0" cap="none" i="0" spc="0" strike="noStrike" sz="1800" u="none" kumimoji="0" normalizeH="0">
+          <a:defRPr kumimoji="0" sz="1800" b="0" i="0" u="none" strike="noStrike" cap="none" spc="0" normalizeH="0" baseline="0">
             <a:ln>
               <a:noFill/>
             </a:ln>
@@ -5471,7 +5552,7 @@
           <a:buFontTx/>
           <a:buNone/>
           <a:tabLst/>
-          <a:defRPr b="0" baseline="0" cap="none" i="0" spc="0" strike="noStrike" sz="1800" u="none" kumimoji="0" normalizeH="0">
+          <a:defRPr kumimoji="0" sz="1800" b="0" i="0" u="none" strike="noStrike" cap="none" spc="0" normalizeH="0" baseline="0">
             <a:ln>
               <a:noFill/>
             </a:ln>
@@ -5497,7 +5578,7 @@
           <a:buFontTx/>
           <a:buNone/>
           <a:tabLst/>
-          <a:defRPr b="0" baseline="0" cap="none" i="0" spc="0" strike="noStrike" sz="1800" u="none" kumimoji="0" normalizeH="0">
+          <a:defRPr kumimoji="0" sz="1800" b="0" i="0" u="none" strike="noStrike" cap="none" spc="0" normalizeH="0" baseline="0">
             <a:ln>
               <a:noFill/>
             </a:ln>
@@ -5523,7 +5604,7 @@
           <a:buFontTx/>
           <a:buNone/>
           <a:tabLst/>
-          <a:defRPr b="0" baseline="0" cap="none" i="0" spc="0" strike="noStrike" sz="1800" u="none" kumimoji="0" normalizeH="0">
+          <a:defRPr kumimoji="0" sz="1800" b="0" i="0" u="none" strike="noStrike" cap="none" spc="0" normalizeH="0" baseline="0">
             <a:ln>
               <a:noFill/>
             </a:ln>
@@ -5549,7 +5630,7 @@
           <a:buFontTx/>
           <a:buNone/>
           <a:tabLst/>
-          <a:defRPr b="0" baseline="0" cap="none" i="0" spc="0" strike="noStrike" sz="1800" u="none" kumimoji="0" normalizeH="0">
+          <a:defRPr kumimoji="0" sz="1800" b="0" i="0" u="none" strike="noStrike" cap="none" spc="0" normalizeH="0" baseline="0">
             <a:ln>
               <a:noFill/>
             </a:ln>
@@ -5575,7 +5656,7 @@
           <a:buFontTx/>
           <a:buNone/>
           <a:tabLst/>
-          <a:defRPr b="0" baseline="0" cap="none" i="0" spc="0" strike="noStrike" sz="1800" u="none" kumimoji="0" normalizeH="0">
+          <a:defRPr kumimoji="0" sz="1800" b="0" i="0" u="none" strike="noStrike" cap="none" spc="0" normalizeH="0" baseline="0">
             <a:ln>
               <a:noFill/>
             </a:ln>
@@ -5601,7 +5682,7 @@
           <a:buFontTx/>
           <a:buNone/>
           <a:tabLst/>
-          <a:defRPr b="0" baseline="0" cap="none" i="0" spc="0" strike="noStrike" sz="1800" u="none" kumimoji="0" normalizeH="0">
+          <a:defRPr kumimoji="0" sz="1800" b="0" i="0" u="none" strike="noStrike" cap="none" spc="0" normalizeH="0" baseline="0">
             <a:ln>
               <a:noFill/>
             </a:ln>
@@ -5627,7 +5708,7 @@
           <a:buFontTx/>
           <a:buNone/>
           <a:tabLst/>
-          <a:defRPr b="0" baseline="0" cap="none" i="0" spc="0" strike="noStrike" sz="1800" u="none" kumimoji="0" normalizeH="0">
+          <a:defRPr kumimoji="0" sz="1800" b="0" i="0" u="none" strike="noStrike" cap="none" spc="0" normalizeH="0" baseline="0">
             <a:ln>
               <a:noFill/>
             </a:ln>
@@ -5653,7 +5734,7 @@
           <a:buFontTx/>
           <a:buNone/>
           <a:tabLst/>
-          <a:defRPr b="0" baseline="0" cap="none" i="0" spc="0" strike="noStrike" sz="1800" u="none" kumimoji="0" normalizeH="0">
+          <a:defRPr kumimoji="0" sz="1800" b="0" i="0" u="none" strike="noStrike" cap="none" spc="0" normalizeH="0" baseline="0">
             <a:ln>
               <a:noFill/>
             </a:ln>
@@ -5679,7 +5760,7 @@
           <a:buFontTx/>
           <a:buNone/>
           <a:tabLst/>
-          <a:defRPr b="0" baseline="0" cap="none" i="0" spc="0" strike="noStrike" sz="1800" u="none" kumimoji="0" normalizeH="0">
+          <a:defRPr kumimoji="0" sz="1800" b="0" i="0" u="none" strike="noStrike" cap="none" spc="0" normalizeH="0" baseline="0">
             <a:ln>
               <a:noFill/>
             </a:ln>
@@ -5692,9 +5773,15 @@
         </a:lvl9pPr>
       </a:lstStyle>
       <a:style>
-        <a:lnRef idx="0"/>
-        <a:fillRef idx="0"/>
-        <a:effectRef idx="0"/>
+        <a:lnRef idx="0">
+          <a:scrgbClr r="0" g="0" b="0"/>
+        </a:lnRef>
+        <a:fillRef idx="0">
+          <a:scrgbClr r="0" g="0" b="0"/>
+        </a:fillRef>
+        <a:effectRef idx="0">
+          <a:scrgbClr r="0" g="0" b="0"/>
+        </a:effectRef>
         <a:fontRef idx="none"/>
       </a:style>
     </a:lnDef>
@@ -5708,7 +5795,7 @@
         <a:effectLst/>
         <a:sp3d/>
       </a:spPr>
-      <a:bodyPr rot="0" spcFirstLastPara="1" vertOverflow="overflow" horzOverflow="overflow" vert="horz" wrap="square" lIns="50800" tIns="50800" rIns="50800" bIns="50800" numCol="1" spcCol="38100" rtlCol="0" anchor="ctr" upright="0">
+      <a:bodyPr rot="0" spcFirstLastPara="1" vertOverflow="overflow" horzOverflow="overflow" vert="horz" wrap="square" lIns="50800" tIns="50800" rIns="50800" bIns="50800" numCol="1" spcCol="38100" rtlCol="0" anchor="ctr">
         <a:spAutoFit/>
       </a:bodyPr>
       <a:lstStyle>
@@ -5727,7 +5814,7 @@
           <a:buFontTx/>
           <a:buNone/>
           <a:tabLst/>
-          <a:defRPr b="1" baseline="0" cap="none" i="0" spc="0" strike="noStrike" sz="2400" u="none" kumimoji="0" normalizeH="0">
+          <a:defRPr kumimoji="0" sz="2400" b="1" i="0" u="none" strike="noStrike" cap="none" spc="0" normalizeH="0" baseline="0">
             <a:ln>
               <a:noFill/>
             </a:ln>
@@ -5757,7 +5844,7 @@
           <a:buFontTx/>
           <a:buNone/>
           <a:tabLst/>
-          <a:defRPr b="0" baseline="0" cap="none" i="0" spc="0" strike="noStrike" sz="1800" u="none" kumimoji="0" normalizeH="0">
+          <a:defRPr kumimoji="0" sz="1800" b="0" i="0" u="none" strike="noStrike" cap="none" spc="0" normalizeH="0" baseline="0">
             <a:ln>
               <a:noFill/>
             </a:ln>
@@ -5783,7 +5870,7 @@
           <a:buFontTx/>
           <a:buNone/>
           <a:tabLst/>
-          <a:defRPr b="0" baseline="0" cap="none" i="0" spc="0" strike="noStrike" sz="1800" u="none" kumimoji="0" normalizeH="0">
+          <a:defRPr kumimoji="0" sz="1800" b="0" i="0" u="none" strike="noStrike" cap="none" spc="0" normalizeH="0" baseline="0">
             <a:ln>
               <a:noFill/>
             </a:ln>
@@ -5809,7 +5896,7 @@
           <a:buFontTx/>
           <a:buNone/>
           <a:tabLst/>
-          <a:defRPr b="0" baseline="0" cap="none" i="0" spc="0" strike="noStrike" sz="1800" u="none" kumimoji="0" normalizeH="0">
+          <a:defRPr kumimoji="0" sz="1800" b="0" i="0" u="none" strike="noStrike" cap="none" spc="0" normalizeH="0" baseline="0">
             <a:ln>
               <a:noFill/>
             </a:ln>
@@ -5835,7 +5922,7 @@
           <a:buFontTx/>
           <a:buNone/>
           <a:tabLst/>
-          <a:defRPr b="0" baseline="0" cap="none" i="0" spc="0" strike="noStrike" sz="1800" u="none" kumimoji="0" normalizeH="0">
+          <a:defRPr kumimoji="0" sz="1800" b="0" i="0" u="none" strike="noStrike" cap="none" spc="0" normalizeH="0" baseline="0">
             <a:ln>
               <a:noFill/>
             </a:ln>
@@ -5861,7 +5948,7 @@
           <a:buFontTx/>
           <a:buNone/>
           <a:tabLst/>
-          <a:defRPr b="0" baseline="0" cap="none" i="0" spc="0" strike="noStrike" sz="1800" u="none" kumimoji="0" normalizeH="0">
+          <a:defRPr kumimoji="0" sz="1800" b="0" i="0" u="none" strike="noStrike" cap="none" spc="0" normalizeH="0" baseline="0">
             <a:ln>
               <a:noFill/>
             </a:ln>
@@ -5887,7 +5974,7 @@
           <a:buFontTx/>
           <a:buNone/>
           <a:tabLst/>
-          <a:defRPr b="0" baseline="0" cap="none" i="0" spc="0" strike="noStrike" sz="1800" u="none" kumimoji="0" normalizeH="0">
+          <a:defRPr kumimoji="0" sz="1800" b="0" i="0" u="none" strike="noStrike" cap="none" spc="0" normalizeH="0" baseline="0">
             <a:ln>
               <a:noFill/>
             </a:ln>
@@ -5913,7 +6000,7 @@
           <a:buFontTx/>
           <a:buNone/>
           <a:tabLst/>
-          <a:defRPr b="0" baseline="0" cap="none" i="0" spc="0" strike="noStrike" sz="1800" u="none" kumimoji="0" normalizeH="0">
+          <a:defRPr kumimoji="0" sz="1800" b="0" i="0" u="none" strike="noStrike" cap="none" spc="0" normalizeH="0" baseline="0">
             <a:ln>
               <a:noFill/>
             </a:ln>
@@ -5939,7 +6026,7 @@
           <a:buFontTx/>
           <a:buNone/>
           <a:tabLst/>
-          <a:defRPr b="0" baseline="0" cap="none" i="0" spc="0" strike="noStrike" sz="1800" u="none" kumimoji="0" normalizeH="0">
+          <a:defRPr kumimoji="0" sz="1800" b="0" i="0" u="none" strike="noStrike" cap="none" spc="0" normalizeH="0" baseline="0">
             <a:ln>
               <a:noFill/>
             </a:ln>
@@ -5965,7 +6052,7 @@
           <a:buFontTx/>
           <a:buNone/>
           <a:tabLst/>
-          <a:defRPr b="0" baseline="0" cap="none" i="0" spc="0" strike="noStrike" sz="1800" u="none" kumimoji="0" normalizeH="0">
+          <a:defRPr kumimoji="0" sz="1800" b="0" i="0" u="none" strike="noStrike" cap="none" spc="0" normalizeH="0" baseline="0">
             <a:ln>
               <a:noFill/>
             </a:ln>
@@ -5978,18 +6065,25 @@
         </a:lvl9pPr>
       </a:lstStyle>
       <a:style>
-        <a:lnRef idx="0"/>
-        <a:fillRef idx="0"/>
-        <a:effectRef idx="0"/>
+        <a:lnRef idx="0">
+          <a:scrgbClr r="0" g="0" b="0"/>
+        </a:lnRef>
+        <a:fillRef idx="0">
+          <a:scrgbClr r="0" g="0" b="0"/>
+        </a:fillRef>
+        <a:effectRef idx="0">
+          <a:scrgbClr r="0" g="0" b="0"/>
+        </a:effectRef>
         <a:fontRef idx="none"/>
       </a:style>
     </a:txDef>
   </a:objectDefaults>
+  <a:extraClrSchemeLst/>
 </a:theme>
 </file>
 
 <file path=ppt/theme/theme2.xml><?xml version="1.0" encoding="utf-8"?>
-<a:theme xmlns:a="http://schemas.openxmlformats.org/drawingml/2006/main" xmlns:r="http://schemas.openxmlformats.org/officeDocument/2006/relationships" name="White">
+<a:theme xmlns:a="http://schemas.openxmlformats.org/drawingml/2006/main" name="White">
   <a:themeElements>
     <a:clrScheme name="White">
       <a:dk1>
@@ -6188,7 +6282,7 @@
         <a:effectLst/>
         <a:sp3d/>
       </a:spPr>
-      <a:bodyPr rot="0" spcFirstLastPara="1" vertOverflow="overflow" horzOverflow="overflow" vert="horz" wrap="square" lIns="50800" tIns="50800" rIns="50800" bIns="50800" numCol="1" spcCol="38100" rtlCol="0" anchor="ctr" upright="0">
+      <a:bodyPr rot="0" spcFirstLastPara="1" vertOverflow="overflow" horzOverflow="overflow" vert="horz" wrap="square" lIns="50800" tIns="50800" rIns="50800" bIns="50800" numCol="1" spcCol="38100" rtlCol="0" anchor="ctr">
         <a:spAutoFit/>
       </a:bodyPr>
       <a:lstStyle>
@@ -6207,7 +6301,7 @@
           <a:buFontTx/>
           <a:buNone/>
           <a:tabLst/>
-          <a:defRPr b="0" baseline="0" cap="none" i="0" spc="0" strike="noStrike" sz="2200" u="none" kumimoji="0" normalizeH="0">
+          <a:defRPr kumimoji="0" sz="2200" b="0" i="0" u="none" strike="noStrike" cap="none" spc="0" normalizeH="0" baseline="0">
             <a:ln>
               <a:noFill/>
             </a:ln>
@@ -6237,7 +6331,7 @@
           <a:buFontTx/>
           <a:buNone/>
           <a:tabLst/>
-          <a:defRPr b="0" baseline="0" cap="none" i="0" spc="0" strike="noStrike" sz="1800" u="none" kumimoji="0" normalizeH="0">
+          <a:defRPr kumimoji="0" sz="1800" b="0" i="0" u="none" strike="noStrike" cap="none" spc="0" normalizeH="0" baseline="0">
             <a:ln>
               <a:noFill/>
             </a:ln>
@@ -6263,7 +6357,7 @@
           <a:buFontTx/>
           <a:buNone/>
           <a:tabLst/>
-          <a:defRPr b="0" baseline="0" cap="none" i="0" spc="0" strike="noStrike" sz="1800" u="none" kumimoji="0" normalizeH="0">
+          <a:defRPr kumimoji="0" sz="1800" b="0" i="0" u="none" strike="noStrike" cap="none" spc="0" normalizeH="0" baseline="0">
             <a:ln>
               <a:noFill/>
             </a:ln>
@@ -6289,7 +6383,7 @@
           <a:buFontTx/>
           <a:buNone/>
           <a:tabLst/>
-          <a:defRPr b="0" baseline="0" cap="none" i="0" spc="0" strike="noStrike" sz="1800" u="none" kumimoji="0" normalizeH="0">
+          <a:defRPr kumimoji="0" sz="1800" b="0" i="0" u="none" strike="noStrike" cap="none" spc="0" normalizeH="0" baseline="0">
             <a:ln>
               <a:noFill/>
             </a:ln>
@@ -6315,7 +6409,7 @@
           <a:buFontTx/>
           <a:buNone/>
           <a:tabLst/>
-          <a:defRPr b="0" baseline="0" cap="none" i="0" spc="0" strike="noStrike" sz="1800" u="none" kumimoji="0" normalizeH="0">
+          <a:defRPr kumimoji="0" sz="1800" b="0" i="0" u="none" strike="noStrike" cap="none" spc="0" normalizeH="0" baseline="0">
             <a:ln>
               <a:noFill/>
             </a:ln>
@@ -6341,7 +6435,7 @@
           <a:buFontTx/>
           <a:buNone/>
           <a:tabLst/>
-          <a:defRPr b="0" baseline="0" cap="none" i="0" spc="0" strike="noStrike" sz="1800" u="none" kumimoji="0" normalizeH="0">
+          <a:defRPr kumimoji="0" sz="1800" b="0" i="0" u="none" strike="noStrike" cap="none" spc="0" normalizeH="0" baseline="0">
             <a:ln>
               <a:noFill/>
             </a:ln>
@@ -6367,7 +6461,7 @@
           <a:buFontTx/>
           <a:buNone/>
           <a:tabLst/>
-          <a:defRPr b="0" baseline="0" cap="none" i="0" spc="0" strike="noStrike" sz="1800" u="none" kumimoji="0" normalizeH="0">
+          <a:defRPr kumimoji="0" sz="1800" b="0" i="0" u="none" strike="noStrike" cap="none" spc="0" normalizeH="0" baseline="0">
             <a:ln>
               <a:noFill/>
             </a:ln>
@@ -6393,7 +6487,7 @@
           <a:buFontTx/>
           <a:buNone/>
           <a:tabLst/>
-          <a:defRPr b="0" baseline="0" cap="none" i="0" spc="0" strike="noStrike" sz="1800" u="none" kumimoji="0" normalizeH="0">
+          <a:defRPr kumimoji="0" sz="1800" b="0" i="0" u="none" strike="noStrike" cap="none" spc="0" normalizeH="0" baseline="0">
             <a:ln>
               <a:noFill/>
             </a:ln>
@@ -6419,7 +6513,7 @@
           <a:buFontTx/>
           <a:buNone/>
           <a:tabLst/>
-          <a:defRPr b="0" baseline="0" cap="none" i="0" spc="0" strike="noStrike" sz="1800" u="none" kumimoji="0" normalizeH="0">
+          <a:defRPr kumimoji="0" sz="1800" b="0" i="0" u="none" strike="noStrike" cap="none" spc="0" normalizeH="0" baseline="0">
             <a:ln>
               <a:noFill/>
             </a:ln>
@@ -6445,7 +6539,7 @@
           <a:buFontTx/>
           <a:buNone/>
           <a:tabLst/>
-          <a:defRPr b="0" baseline="0" cap="none" i="0" spc="0" strike="noStrike" sz="1800" u="none" kumimoji="0" normalizeH="0">
+          <a:defRPr kumimoji="0" sz="1800" b="0" i="0" u="none" strike="noStrike" cap="none" spc="0" normalizeH="0" baseline="0">
             <a:ln>
               <a:noFill/>
             </a:ln>
@@ -6458,9 +6552,15 @@
         </a:lvl9pPr>
       </a:lstStyle>
       <a:style>
-        <a:lnRef idx="0"/>
-        <a:fillRef idx="0"/>
-        <a:effectRef idx="0"/>
+        <a:lnRef idx="0">
+          <a:scrgbClr r="0" g="0" b="0"/>
+        </a:lnRef>
+        <a:fillRef idx="0">
+          <a:scrgbClr r="0" g="0" b="0"/>
+        </a:fillRef>
+        <a:effectRef idx="0">
+          <a:scrgbClr r="0" g="0" b="0"/>
+        </a:effectRef>
         <a:fontRef idx="none"/>
       </a:style>
     </a:spDef>
@@ -6477,7 +6577,7 @@
         <a:effectLst/>
         <a:sp3d/>
       </a:spPr>
-      <a:bodyPr rot="0" spcFirstLastPara="1" vertOverflow="overflow" horzOverflow="overflow" vert="horz" wrap="square" lIns="91439" tIns="45719" rIns="91439" bIns="45719" numCol="1" spcCol="38100" rtlCol="0" anchor="t" upright="0">
+      <a:bodyPr rot="0" spcFirstLastPara="1" vertOverflow="overflow" horzOverflow="overflow" vert="horz" wrap="square" lIns="91439" tIns="45719" rIns="91439" bIns="45719" numCol="1" spcCol="38100" rtlCol="0" anchor="t">
         <a:noAutofit/>
       </a:bodyPr>
       <a:lstStyle>
@@ -6496,7 +6596,7 @@
           <a:buFontTx/>
           <a:buNone/>
           <a:tabLst/>
-          <a:defRPr b="0" baseline="0" cap="none" i="0" spc="0" strike="noStrike" sz="1800" u="none" kumimoji="0" normalizeH="0">
+          <a:defRPr kumimoji="0" sz="1800" b="0" i="0" u="none" strike="noStrike" cap="none" spc="0" normalizeH="0" baseline="0">
             <a:ln>
               <a:noFill/>
             </a:ln>
@@ -6522,7 +6622,7 @@
           <a:buFontTx/>
           <a:buNone/>
           <a:tabLst/>
-          <a:defRPr b="0" baseline="0" cap="none" i="0" spc="0" strike="noStrike" sz="1800" u="none" kumimoji="0" normalizeH="0">
+          <a:defRPr kumimoji="0" sz="1800" b="0" i="0" u="none" strike="noStrike" cap="none" spc="0" normalizeH="0" baseline="0">
             <a:ln>
               <a:noFill/>
             </a:ln>
@@ -6548,7 +6648,7 @@
           <a:buFontTx/>
           <a:buNone/>
           <a:tabLst/>
-          <a:defRPr b="0" baseline="0" cap="none" i="0" spc="0" strike="noStrike" sz="1800" u="none" kumimoji="0" normalizeH="0">
+          <a:defRPr kumimoji="0" sz="1800" b="0" i="0" u="none" strike="noStrike" cap="none" spc="0" normalizeH="0" baseline="0">
             <a:ln>
               <a:noFill/>
             </a:ln>
@@ -6574,7 +6674,7 @@
           <a:buFontTx/>
           <a:buNone/>
           <a:tabLst/>
-          <a:defRPr b="0" baseline="0" cap="none" i="0" spc="0" strike="noStrike" sz="1800" u="none" kumimoji="0" normalizeH="0">
+          <a:defRPr kumimoji="0" sz="1800" b="0" i="0" u="none" strike="noStrike" cap="none" spc="0" normalizeH="0" baseline="0">
             <a:ln>
               <a:noFill/>
             </a:ln>
@@ -6600,7 +6700,7 @@
           <a:buFontTx/>
           <a:buNone/>
           <a:tabLst/>
-          <a:defRPr b="0" baseline="0" cap="none" i="0" spc="0" strike="noStrike" sz="1800" u="none" kumimoji="0" normalizeH="0">
+          <a:defRPr kumimoji="0" sz="1800" b="0" i="0" u="none" strike="noStrike" cap="none" spc="0" normalizeH="0" baseline="0">
             <a:ln>
               <a:noFill/>
             </a:ln>
@@ -6626,7 +6726,7 @@
           <a:buFontTx/>
           <a:buNone/>
           <a:tabLst/>
-          <a:defRPr b="0" baseline="0" cap="none" i="0" spc="0" strike="noStrike" sz="1800" u="none" kumimoji="0" normalizeH="0">
+          <a:defRPr kumimoji="0" sz="1800" b="0" i="0" u="none" strike="noStrike" cap="none" spc="0" normalizeH="0" baseline="0">
             <a:ln>
               <a:noFill/>
             </a:ln>
@@ -6652,7 +6752,7 @@
           <a:buFontTx/>
           <a:buNone/>
           <a:tabLst/>
-          <a:defRPr b="0" baseline="0" cap="none" i="0" spc="0" strike="noStrike" sz="1800" u="none" kumimoji="0" normalizeH="0">
+          <a:defRPr kumimoji="0" sz="1800" b="0" i="0" u="none" strike="noStrike" cap="none" spc="0" normalizeH="0" baseline="0">
             <a:ln>
               <a:noFill/>
             </a:ln>
@@ -6678,7 +6778,7 @@
           <a:buFontTx/>
           <a:buNone/>
           <a:tabLst/>
-          <a:defRPr b="0" baseline="0" cap="none" i="0" spc="0" strike="noStrike" sz="1800" u="none" kumimoji="0" normalizeH="0">
+          <a:defRPr kumimoji="0" sz="1800" b="0" i="0" u="none" strike="noStrike" cap="none" spc="0" normalizeH="0" baseline="0">
             <a:ln>
               <a:noFill/>
             </a:ln>
@@ -6704,7 +6804,7 @@
           <a:buFontTx/>
           <a:buNone/>
           <a:tabLst/>
-          <a:defRPr b="0" baseline="0" cap="none" i="0" spc="0" strike="noStrike" sz="1800" u="none" kumimoji="0" normalizeH="0">
+          <a:defRPr kumimoji="0" sz="1800" b="0" i="0" u="none" strike="noStrike" cap="none" spc="0" normalizeH="0" baseline="0">
             <a:ln>
               <a:noFill/>
             </a:ln>
@@ -6730,7 +6830,7 @@
           <a:buFontTx/>
           <a:buNone/>
           <a:tabLst/>
-          <a:defRPr b="0" baseline="0" cap="none" i="0" spc="0" strike="noStrike" sz="1800" u="none" kumimoji="0" normalizeH="0">
+          <a:defRPr kumimoji="0" sz="1800" b="0" i="0" u="none" strike="noStrike" cap="none" spc="0" normalizeH="0" baseline="0">
             <a:ln>
               <a:noFill/>
             </a:ln>
@@ -6743,9 +6843,15 @@
         </a:lvl9pPr>
       </a:lstStyle>
       <a:style>
-        <a:lnRef idx="0"/>
-        <a:fillRef idx="0"/>
-        <a:effectRef idx="0"/>
+        <a:lnRef idx="0">
+          <a:scrgbClr r="0" g="0" b="0"/>
+        </a:lnRef>
+        <a:fillRef idx="0">
+          <a:scrgbClr r="0" g="0" b="0"/>
+        </a:fillRef>
+        <a:effectRef idx="0">
+          <a:scrgbClr r="0" g="0" b="0"/>
+        </a:effectRef>
         <a:fontRef idx="none"/>
       </a:style>
     </a:lnDef>
@@ -6759,7 +6865,7 @@
         <a:effectLst/>
         <a:sp3d/>
       </a:spPr>
-      <a:bodyPr rot="0" spcFirstLastPara="1" vertOverflow="overflow" horzOverflow="overflow" vert="horz" wrap="square" lIns="50800" tIns="50800" rIns="50800" bIns="50800" numCol="1" spcCol="38100" rtlCol="0" anchor="ctr" upright="0">
+      <a:bodyPr rot="0" spcFirstLastPara="1" vertOverflow="overflow" horzOverflow="overflow" vert="horz" wrap="square" lIns="50800" tIns="50800" rIns="50800" bIns="50800" numCol="1" spcCol="38100" rtlCol="0" anchor="ctr">
         <a:spAutoFit/>
       </a:bodyPr>
       <a:lstStyle>
@@ -6778,7 +6884,7 @@
           <a:buFontTx/>
           <a:buNone/>
           <a:tabLst/>
-          <a:defRPr b="1" baseline="0" cap="none" i="0" spc="0" strike="noStrike" sz="2400" u="none" kumimoji="0" normalizeH="0">
+          <a:defRPr kumimoji="0" sz="2400" b="1" i="0" u="none" strike="noStrike" cap="none" spc="0" normalizeH="0" baseline="0">
             <a:ln>
               <a:noFill/>
             </a:ln>
@@ -6808,7 +6914,7 @@
           <a:buFontTx/>
           <a:buNone/>
           <a:tabLst/>
-          <a:defRPr b="0" baseline="0" cap="none" i="0" spc="0" strike="noStrike" sz="1800" u="none" kumimoji="0" normalizeH="0">
+          <a:defRPr kumimoji="0" sz="1800" b="0" i="0" u="none" strike="noStrike" cap="none" spc="0" normalizeH="0" baseline="0">
             <a:ln>
               <a:noFill/>
             </a:ln>
@@ -6834,7 +6940,7 @@
           <a:buFontTx/>
           <a:buNone/>
           <a:tabLst/>
-          <a:defRPr b="0" baseline="0" cap="none" i="0" spc="0" strike="noStrike" sz="1800" u="none" kumimoji="0" normalizeH="0">
+          <a:defRPr kumimoji="0" sz="1800" b="0" i="0" u="none" strike="noStrike" cap="none" spc="0" normalizeH="0" baseline="0">
             <a:ln>
               <a:noFill/>
             </a:ln>
@@ -6860,7 +6966,7 @@
           <a:buFontTx/>
           <a:buNone/>
           <a:tabLst/>
-          <a:defRPr b="0" baseline="0" cap="none" i="0" spc="0" strike="noStrike" sz="1800" u="none" kumimoji="0" normalizeH="0">
+          <a:defRPr kumimoji="0" sz="1800" b="0" i="0" u="none" strike="noStrike" cap="none" spc="0" normalizeH="0" baseline="0">
             <a:ln>
               <a:noFill/>
             </a:ln>
@@ -6886,7 +6992,7 @@
           <a:buFontTx/>
           <a:buNone/>
           <a:tabLst/>
-          <a:defRPr b="0" baseline="0" cap="none" i="0" spc="0" strike="noStrike" sz="1800" u="none" kumimoji="0" normalizeH="0">
+          <a:defRPr kumimoji="0" sz="1800" b="0" i="0" u="none" strike="noStrike" cap="none" spc="0" normalizeH="0" baseline="0">
             <a:ln>
               <a:noFill/>
             </a:ln>
@@ -6912,7 +7018,7 @@
           <a:buFontTx/>
           <a:buNone/>
           <a:tabLst/>
-          <a:defRPr b="0" baseline="0" cap="none" i="0" spc="0" strike="noStrike" sz="1800" u="none" kumimoji="0" normalizeH="0">
+          <a:defRPr kumimoji="0" sz="1800" b="0" i="0" u="none" strike="noStrike" cap="none" spc="0" normalizeH="0" baseline="0">
             <a:ln>
               <a:noFill/>
             </a:ln>
@@ -6938,7 +7044,7 @@
           <a:buFontTx/>
           <a:buNone/>
           <a:tabLst/>
-          <a:defRPr b="0" baseline="0" cap="none" i="0" spc="0" strike="noStrike" sz="1800" u="none" kumimoji="0" normalizeH="0">
+          <a:defRPr kumimoji="0" sz="1800" b="0" i="0" u="none" strike="noStrike" cap="none" spc="0" normalizeH="0" baseline="0">
             <a:ln>
               <a:noFill/>
             </a:ln>
@@ -6964,7 +7070,7 @@
           <a:buFontTx/>
           <a:buNone/>
           <a:tabLst/>
-          <a:defRPr b="0" baseline="0" cap="none" i="0" spc="0" strike="noStrike" sz="1800" u="none" kumimoji="0" normalizeH="0">
+          <a:defRPr kumimoji="0" sz="1800" b="0" i="0" u="none" strike="noStrike" cap="none" spc="0" normalizeH="0" baseline="0">
             <a:ln>
               <a:noFill/>
             </a:ln>
@@ -6990,7 +7096,7 @@
           <a:buFontTx/>
           <a:buNone/>
           <a:tabLst/>
-          <a:defRPr b="0" baseline="0" cap="none" i="0" spc="0" strike="noStrike" sz="1800" u="none" kumimoji="0" normalizeH="0">
+          <a:defRPr kumimoji="0" sz="1800" b="0" i="0" u="none" strike="noStrike" cap="none" spc="0" normalizeH="0" baseline="0">
             <a:ln>
               <a:noFill/>
             </a:ln>
@@ -7016,7 +7122,7 @@
           <a:buFontTx/>
           <a:buNone/>
           <a:tabLst/>
-          <a:defRPr b="0" baseline="0" cap="none" i="0" spc="0" strike="noStrike" sz="1800" u="none" kumimoji="0" normalizeH="0">
+          <a:defRPr kumimoji="0" sz="1800" b="0" i="0" u="none" strike="noStrike" cap="none" spc="0" normalizeH="0" baseline="0">
             <a:ln>
               <a:noFill/>
             </a:ln>
@@ -7029,12 +7135,19 @@
         </a:lvl9pPr>
       </a:lstStyle>
       <a:style>
-        <a:lnRef idx="0"/>
-        <a:fillRef idx="0"/>
-        <a:effectRef idx="0"/>
+        <a:lnRef idx="0">
+          <a:scrgbClr r="0" g="0" b="0"/>
+        </a:lnRef>
+        <a:fillRef idx="0">
+          <a:scrgbClr r="0" g="0" b="0"/>
+        </a:fillRef>
+        <a:effectRef idx="0">
+          <a:scrgbClr r="0" g="0" b="0"/>
+        </a:effectRef>
         <a:fontRef idx="none"/>
       </a:style>
     </a:txDef>
   </a:objectDefaults>
+  <a:extraClrSchemeLst/>
 </a:theme>
 </file>
</xml_diff>

<commit_message>
Added SaturnCloud to the sponsor list
</commit_message>
<xml_diff>
--- a/admin/intro_slides/hackathon_intro_slides.pptx
+++ b/admin/intro_slides/hackathon_intro_slides.pptx
@@ -323,6 +323,11 @@
       </a:defRPr>
     </a:lvl9pPr>
   </p:defaultTextStyle>
+  <p:extLst>
+    <p:ext uri="{EFAFB233-063F-42B5-8137-9DF3F51BA10A}">
+      <p15:sldGuideLst xmlns:p15="http://schemas.microsoft.com/office/powerpoint/2012/main"/>
+    </p:ext>
+  </p:extLst>
 </p:presentation>
 </file>
 
@@ -2154,7 +2159,7 @@
           </a:ln>
           <a:extLst>
             <a:ext uri="{C572A759-6A51-4108-AA02-DFA0A04FC94B}">
-              <ma14:wrappingTextBoxFlag xmlns:ma14="http://schemas.microsoft.com/office/mac/drawingml/2011/main" xmlns:a14="http://schemas.microsoft.com/office/drawing/2010/main" xmlns:m="http://schemas.openxmlformats.org/officeDocument/2006/math" xmlns="" val="1"/>
+              <ma14:wrappingTextBoxFlag xmlns="" xmlns:m="http://schemas.openxmlformats.org/officeDocument/2006/math" xmlns:a14="http://schemas.microsoft.com/office/drawing/2010/main" xmlns:ma14="http://schemas.microsoft.com/office/mac/drawingml/2011/main" val="1"/>
             </a:ext>
           </a:extLst>
         </p:spPr>
@@ -2193,7 +2198,7 @@
           </a:ln>
           <a:extLst>
             <a:ext uri="{C572A759-6A51-4108-AA02-DFA0A04FC94B}">
-              <ma14:wrappingTextBoxFlag xmlns:ma14="http://schemas.microsoft.com/office/mac/drawingml/2011/main" xmlns:a14="http://schemas.microsoft.com/office/drawing/2010/main" xmlns:m="http://schemas.openxmlformats.org/officeDocument/2006/math" xmlns="" val="1"/>
+              <ma14:wrappingTextBoxFlag xmlns="" xmlns:m="http://schemas.openxmlformats.org/officeDocument/2006/math" xmlns:a14="http://schemas.microsoft.com/office/drawing/2010/main" xmlns:ma14="http://schemas.microsoft.com/office/mac/drawingml/2011/main" val="1"/>
             </a:ext>
           </a:extLst>
         </p:spPr>
@@ -3405,7 +3410,7 @@
           </a:ln>
           <a:extLst>
             <a:ext uri="{C572A759-6A51-4108-AA02-DFA0A04FC94B}">
-              <ma14:wrappingTextBoxFlag xmlns:ma14="http://schemas.microsoft.com/office/mac/drawingml/2011/main" xmlns:a14="http://schemas.microsoft.com/office/drawing/2010/main" xmlns:m="http://schemas.openxmlformats.org/officeDocument/2006/math" xmlns="" val="1"/>
+              <ma14:wrappingTextBoxFlag xmlns="" xmlns:m="http://schemas.openxmlformats.org/officeDocument/2006/math" xmlns:a14="http://schemas.microsoft.com/office/drawing/2010/main" xmlns:ma14="http://schemas.microsoft.com/office/mac/drawingml/2011/main" val="1"/>
             </a:ext>
           </a:extLst>
         </p:spPr>
@@ -3444,7 +3449,7 @@
           </a:ln>
           <a:extLst>
             <a:ext uri="{C572A759-6A51-4108-AA02-DFA0A04FC94B}">
-              <ma14:wrappingTextBoxFlag xmlns:ma14="http://schemas.microsoft.com/office/mac/drawingml/2011/main" xmlns:a14="http://schemas.microsoft.com/office/drawing/2010/main" xmlns:m="http://schemas.openxmlformats.org/officeDocument/2006/math" xmlns="" val="1"/>
+              <ma14:wrappingTextBoxFlag xmlns="" xmlns:m="http://schemas.openxmlformats.org/officeDocument/2006/math" xmlns:a14="http://schemas.microsoft.com/office/drawing/2010/main" xmlns:ma14="http://schemas.microsoft.com/office/mac/drawingml/2011/main" val="1"/>
             </a:ext>
           </a:extLst>
         </p:spPr>
@@ -3668,6 +3673,42 @@
           </a:ln>
         </p:spPr>
       </p:pic>
+      <p:pic>
+        <p:nvPicPr>
+          <p:cNvPr id="3" name="Picture 2" descr="A picture containing logo&#10;&#10;Description automatically generated">
+            <a:extLst>
+              <a:ext uri="{FF2B5EF4-FFF2-40B4-BE49-F238E27FC236}">
+                <a16:creationId xmlns:a16="http://schemas.microsoft.com/office/drawing/2014/main" id="{30DC4FE6-56AD-E446-B8BF-A67A0A1DBCB2}"/>
+              </a:ext>
+            </a:extLst>
+          </p:cNvPr>
+          <p:cNvPicPr>
+            <a:picLocks noChangeAspect="1"/>
+          </p:cNvPicPr>
+          <p:nvPr/>
+        </p:nvPicPr>
+        <p:blipFill>
+          <a:blip r:embed="rId6">
+            <a:extLst>
+              <a:ext uri="{28A0092B-C50C-407E-A947-70E740481C1C}">
+                <a14:useLocalDpi xmlns:a14="http://schemas.microsoft.com/office/drawing/2010/main" val="0"/>
+              </a:ext>
+            </a:extLst>
+          </a:blip>
+          <a:stretch>
+            <a:fillRect/>
+          </a:stretch>
+        </p:blipFill>
+        <p:spPr>
+          <a:xfrm>
+            <a:off x="742950" y="7376673"/>
+            <a:ext cx="4834953" cy="1538394"/>
+          </a:xfrm>
+          <a:prstGeom prst="rect">
+            <a:avLst/>
+          </a:prstGeom>
+        </p:spPr>
+      </p:pic>
     </p:spTree>
   </p:cSld>
   <p:clrMapOvr>
@@ -3742,7 +3783,7 @@
           </a:ln>
           <a:extLst>
             <a:ext uri="{C572A759-6A51-4108-AA02-DFA0A04FC94B}">
-              <ma14:wrappingTextBoxFlag xmlns:ma14="http://schemas.microsoft.com/office/mac/drawingml/2011/main" xmlns:a14="http://schemas.microsoft.com/office/drawing/2010/main" xmlns:m="http://schemas.openxmlformats.org/officeDocument/2006/math" xmlns="" val="1"/>
+              <ma14:wrappingTextBoxFlag xmlns="" xmlns:m="http://schemas.openxmlformats.org/officeDocument/2006/math" xmlns:a14="http://schemas.microsoft.com/office/drawing/2010/main" xmlns:ma14="http://schemas.microsoft.com/office/mac/drawingml/2011/main" val="1"/>
             </a:ext>
           </a:extLst>
         </p:spPr>
@@ -3832,7 +3873,7 @@
           </a:ln>
           <a:extLst>
             <a:ext uri="{C572A759-6A51-4108-AA02-DFA0A04FC94B}">
-              <ma14:wrappingTextBoxFlag xmlns:ma14="http://schemas.microsoft.com/office/mac/drawingml/2011/main" xmlns:a14="http://schemas.microsoft.com/office/drawing/2010/main" xmlns:m="http://schemas.openxmlformats.org/officeDocument/2006/math" xmlns="" val="1"/>
+              <ma14:wrappingTextBoxFlag xmlns="" xmlns:m="http://schemas.openxmlformats.org/officeDocument/2006/math" xmlns:a14="http://schemas.microsoft.com/office/drawing/2010/main" xmlns:ma14="http://schemas.microsoft.com/office/mac/drawingml/2011/main" val="1"/>
             </a:ext>
           </a:extLst>
         </p:spPr>
@@ -3865,7 +3906,7 @@
           </a:ln>
           <a:extLst>
             <a:ext uri="{C572A759-6A51-4108-AA02-DFA0A04FC94B}">
-              <ma14:wrappingTextBoxFlag xmlns:ma14="http://schemas.microsoft.com/office/mac/drawingml/2011/main" xmlns:a14="http://schemas.microsoft.com/office/drawing/2010/main" xmlns:m="http://schemas.openxmlformats.org/officeDocument/2006/math" xmlns="" val="1"/>
+              <ma14:wrappingTextBoxFlag xmlns="" xmlns:m="http://schemas.openxmlformats.org/officeDocument/2006/math" xmlns:a14="http://schemas.microsoft.com/office/drawing/2010/main" xmlns:ma14="http://schemas.microsoft.com/office/mac/drawingml/2011/main" val="1"/>
             </a:ext>
           </a:extLst>
         </p:spPr>
@@ -4162,7 +4203,7 @@
           </a:ln>
           <a:extLst>
             <a:ext uri="{C572A759-6A51-4108-AA02-DFA0A04FC94B}">
-              <ma14:wrappingTextBoxFlag xmlns:ma14="http://schemas.microsoft.com/office/mac/drawingml/2011/main" xmlns:a14="http://schemas.microsoft.com/office/drawing/2010/main" xmlns:m="http://schemas.openxmlformats.org/officeDocument/2006/math" xmlns="" val="1"/>
+              <ma14:wrappingTextBoxFlag xmlns="" xmlns:m="http://schemas.openxmlformats.org/officeDocument/2006/math" xmlns:a14="http://schemas.microsoft.com/office/drawing/2010/main" xmlns:ma14="http://schemas.microsoft.com/office/mac/drawingml/2011/main" val="1"/>
             </a:ext>
           </a:extLst>
         </p:spPr>
@@ -4440,7 +4481,7 @@
           </a:ln>
           <a:extLst>
             <a:ext uri="{C572A759-6A51-4108-AA02-DFA0A04FC94B}">
-              <ma14:wrappingTextBoxFlag xmlns:ma14="http://schemas.microsoft.com/office/mac/drawingml/2011/main" xmlns:a14="http://schemas.microsoft.com/office/drawing/2010/main" xmlns:m="http://schemas.openxmlformats.org/officeDocument/2006/math" xmlns="" val="1"/>
+              <ma14:wrappingTextBoxFlag xmlns="" xmlns:m="http://schemas.openxmlformats.org/officeDocument/2006/math" xmlns:a14="http://schemas.microsoft.com/office/drawing/2010/main" xmlns:ma14="http://schemas.microsoft.com/office/mac/drawingml/2011/main" val="1"/>
             </a:ext>
           </a:extLst>
         </p:spPr>
@@ -4512,7 +4553,7 @@
           </a:ln>
           <a:extLst>
             <a:ext uri="{C572A759-6A51-4108-AA02-DFA0A04FC94B}">
-              <ma14:wrappingTextBoxFlag xmlns:ma14="http://schemas.microsoft.com/office/mac/drawingml/2011/main" xmlns:a14="http://schemas.microsoft.com/office/drawing/2010/main" xmlns:m="http://schemas.openxmlformats.org/officeDocument/2006/math" xmlns="" val="1"/>
+              <ma14:wrappingTextBoxFlag xmlns="" xmlns:m="http://schemas.openxmlformats.org/officeDocument/2006/math" xmlns:a14="http://schemas.microsoft.com/office/drawing/2010/main" xmlns:ma14="http://schemas.microsoft.com/office/mac/drawingml/2011/main" val="1"/>
             </a:ext>
           </a:extLst>
         </p:spPr>
@@ -4721,7 +4762,7 @@
           </a:ln>
           <a:extLst>
             <a:ext uri="{C572A759-6A51-4108-AA02-DFA0A04FC94B}">
-              <ma14:wrappingTextBoxFlag xmlns:ma14="http://schemas.microsoft.com/office/mac/drawingml/2011/main" xmlns:a14="http://schemas.microsoft.com/office/drawing/2010/main" xmlns:m="http://schemas.openxmlformats.org/officeDocument/2006/math" xmlns="" val="1"/>
+              <ma14:wrappingTextBoxFlag xmlns="" xmlns:m="http://schemas.openxmlformats.org/officeDocument/2006/math" xmlns:a14="http://schemas.microsoft.com/office/drawing/2010/main" xmlns:ma14="http://schemas.microsoft.com/office/mac/drawingml/2011/main" val="1"/>
             </a:ext>
           </a:extLst>
         </p:spPr>

</xml_diff>

<commit_message>
Added slack and other info
</commit_message>
<xml_diff>
--- a/admin/intro_slides/hackathon_intro_slides.pptx
+++ b/admin/intro_slides/hackathon_intro_slides.pptx
@@ -5,7 +5,7 @@
     <p:sldMasterId id="2147483648" r:id="rId1"/>
   </p:sldMasterIdLst>
   <p:notesMasterIdLst>
-    <p:notesMasterId r:id="rId16"/>
+    <p:notesMasterId r:id="rId18"/>
   </p:notesMasterIdLst>
   <p:sldIdLst>
     <p:sldId id="256" r:id="rId2"/>
@@ -18,10 +18,12 @@
     <p:sldId id="263" r:id="rId9"/>
     <p:sldId id="264" r:id="rId10"/>
     <p:sldId id="265" r:id="rId11"/>
-    <p:sldId id="266" r:id="rId12"/>
-    <p:sldId id="267" r:id="rId13"/>
-    <p:sldId id="268" r:id="rId14"/>
-    <p:sldId id="269" r:id="rId15"/>
+    <p:sldId id="271" r:id="rId12"/>
+    <p:sldId id="270" r:id="rId13"/>
+    <p:sldId id="266" r:id="rId14"/>
+    <p:sldId id="267" r:id="rId15"/>
+    <p:sldId id="268" r:id="rId16"/>
+    <p:sldId id="269" r:id="rId17"/>
   </p:sldIdLst>
   <p:sldSz cx="13004800" cy="9753600"/>
   <p:notesSz cx="6858000" cy="9144000"/>
@@ -2159,7 +2161,7 @@
           </a:ln>
           <a:extLst>
             <a:ext uri="{C572A759-6A51-4108-AA02-DFA0A04FC94B}">
-              <ma14:wrappingTextBoxFlag xmlns:ma14="http://schemas.microsoft.com/office/mac/drawingml/2011/main" xmlns:a14="http://schemas.microsoft.com/office/drawing/2010/main" xmlns:m="http://schemas.openxmlformats.org/officeDocument/2006/math" xmlns="" val="1"/>
+              <ma14:wrappingTextBoxFlag xmlns="" xmlns:m="http://schemas.openxmlformats.org/officeDocument/2006/math" xmlns:a14="http://schemas.microsoft.com/office/drawing/2010/main" xmlns:ma14="http://schemas.microsoft.com/office/mac/drawingml/2011/main" val="1"/>
             </a:ext>
           </a:extLst>
         </p:spPr>
@@ -2198,7 +2200,7 @@
           </a:ln>
           <a:extLst>
             <a:ext uri="{C572A759-6A51-4108-AA02-DFA0A04FC94B}">
-              <ma14:wrappingTextBoxFlag xmlns:ma14="http://schemas.microsoft.com/office/mac/drawingml/2011/main" xmlns:a14="http://schemas.microsoft.com/office/drawing/2010/main" xmlns:m="http://schemas.openxmlformats.org/officeDocument/2006/math" xmlns="" val="1"/>
+              <ma14:wrappingTextBoxFlag xmlns="" xmlns:m="http://schemas.openxmlformats.org/officeDocument/2006/math" xmlns:a14="http://schemas.microsoft.com/office/drawing/2010/main" xmlns:ma14="http://schemas.microsoft.com/office/mac/drawingml/2011/main" val="1"/>
             </a:ext>
           </a:extLst>
         </p:spPr>
@@ -3301,11 +3303,27 @@
             </a:pPr>
             <a:r>
               <a:rPr dirty="0"/>
-              <a:t>There is a ton of information about the Hackathon.  Check out the README</a:t>
+              <a:t>There is a ton of information about the </a:t>
             </a:r>
             <a:r>
               <a:rPr lang="en-US" dirty="0"/>
-              <a:t>.</a:t>
+              <a:t>h</a:t>
+            </a:r>
+            <a:r>
+              <a:rPr dirty="0"/>
+              <a:t>ackathon</a:t>
+            </a:r>
+            <a:r>
+              <a:rPr lang="en-US" dirty="0"/>
+              <a:t> in the</a:t>
+            </a:r>
+            <a:r>
+              <a:rPr dirty="0"/>
+              <a:t> README</a:t>
+            </a:r>
+            <a:r>
+              <a:rPr lang="en-US" dirty="0"/>
+              <a:t> file.</a:t>
             </a:r>
             <a:endParaRPr dirty="0"/>
           </a:p>
@@ -3410,7 +3428,7 @@
       </p:grpSpPr>
       <p:sp>
         <p:nvSpPr>
-          <p:cNvPr id="155" name="The PacMan Rule"/>
+          <p:cNvPr id="152" name="Logistics"/>
           <p:cNvSpPr txBox="1">
             <a:spLocks noGrp="1"/>
           </p:cNvSpPr>
@@ -3428,154 +3446,96 @@
           <a:lstStyle/>
           <a:p>
             <a:r>
-              <a:t>The PacMan Rule</a:t>
-            </a:r>
-          </a:p>
-        </p:txBody>
-      </p:sp>
-      <p:pic>
-        <p:nvPicPr>
-          <p:cNvPr id="156" name="pacman.png" descr="pacman.png"/>
-          <p:cNvPicPr>
-            <a:picLocks noChangeAspect="1"/>
-          </p:cNvPicPr>
-          <p:nvPr/>
-        </p:nvPicPr>
-        <p:blipFill>
-          <a:blip r:embed="rId2"/>
-          <a:stretch>
-            <a:fillRect/>
-          </a:stretch>
-        </p:blipFill>
-        <p:spPr>
-          <a:xfrm>
-            <a:off x="4176509" y="4135651"/>
-            <a:ext cx="4651782" cy="4902979"/>
-          </a:xfrm>
-          <a:prstGeom prst="rect">
-            <a:avLst/>
-          </a:prstGeom>
-          <a:ln w="12700">
-            <a:miter lim="400000"/>
-          </a:ln>
-        </p:spPr>
-      </p:pic>
-      <p:sp>
-        <p:nvSpPr>
-          <p:cNvPr id="157" name="When standing as a group of people, always leave room for 1 person to join your group."/>
-          <p:cNvSpPr txBox="1"/>
-          <p:nvPr/>
-        </p:nvSpPr>
-        <p:spPr>
-          <a:xfrm>
-            <a:off x="2628394" y="2456078"/>
-            <a:ext cx="7748012" cy="955244"/>
-          </a:xfrm>
-          <a:prstGeom prst="rect">
-            <a:avLst/>
-          </a:prstGeom>
-          <a:ln w="12700">
-            <a:miter lim="400000"/>
-          </a:ln>
-          <a:extLst>
-            <a:ext uri="{C572A759-6A51-4108-AA02-DFA0A04FC94B}">
-              <ma14:wrappingTextBoxFlag xmlns:ma14="http://schemas.microsoft.com/office/mac/drawingml/2011/main" xmlns:a14="http://schemas.microsoft.com/office/drawing/2010/main" xmlns:m="http://schemas.openxmlformats.org/officeDocument/2006/math" xmlns="" val="1"/>
-            </a:ext>
-          </a:extLst>
-        </p:spPr>
-        <p:txBody>
-          <a:bodyPr lIns="50800" tIns="50800" rIns="50800" bIns="50800" anchor="ctr">
-            <a:spAutoFit/>
-          </a:bodyPr>
-          <a:lstStyle>
-            <a:lvl1pPr>
-              <a:defRPr sz="2800" b="0" i="1"/>
-            </a:lvl1pPr>
-          </a:lstStyle>
-          <a:p>
-            <a:r>
-              <a:t>When standing as a group of people, always leave room for 1 person to join your group.</a:t>
-            </a:r>
+              <a:rPr lang="en-US" dirty="0" err="1"/>
+              <a:t>WiFi</a:t>
+            </a:r>
+            <a:r>
+              <a:rPr lang="en-US" dirty="0"/>
+              <a:t> Setup</a:t>
+            </a:r>
+            <a:endParaRPr dirty="0"/>
           </a:p>
         </p:txBody>
       </p:sp>
       <p:sp>
         <p:nvSpPr>
-          <p:cNvPr id="158" name="Leave some space here"/>
-          <p:cNvSpPr txBox="1"/>
-          <p:nvPr/>
+          <p:cNvPr id="153" name="Pull the latest Hackathon GIT repo before starting.…"/>
+          <p:cNvSpPr txBox="1">
+            <a:spLocks noGrp="1"/>
+          </p:cNvSpPr>
+          <p:nvPr>
+            <p:ph type="body" idx="1"/>
+          </p:nvPr>
         </p:nvSpPr>
         <p:spPr>
-          <a:xfrm>
-            <a:off x="9171330" y="6172307"/>
-            <a:ext cx="2507962" cy="829667"/>
-          </a:xfrm>
-          <a:prstGeom prst="rect">
-            <a:avLst/>
-          </a:prstGeom>
-          <a:ln w="12700">
-            <a:miter lim="400000"/>
-          </a:ln>
-          <a:extLst>
-            <a:ext uri="{C572A759-6A51-4108-AA02-DFA0A04FC94B}">
-              <ma14:wrappingTextBoxFlag xmlns:ma14="http://schemas.microsoft.com/office/mac/drawingml/2011/main" xmlns:a14="http://schemas.microsoft.com/office/drawing/2010/main" xmlns:m="http://schemas.openxmlformats.org/officeDocument/2006/math" xmlns="" val="1"/>
-            </a:ext>
-          </a:extLst>
+          <a:prstGeom prst="rect">
+            <a:avLst/>
+          </a:prstGeom>
         </p:spPr>
         <p:txBody>
-          <a:bodyPr lIns="50800" tIns="50800" rIns="50800" bIns="50800" anchor="ctr">
-            <a:spAutoFit/>
-          </a:bodyPr>
-          <a:lstStyle>
-            <a:lvl1pPr>
-              <a:defRPr b="0"/>
-            </a:lvl1pPr>
-          </a:lstStyle>
-          <a:p>
-            <a:r>
-              <a:t>Leave some space here</a:t>
-            </a:r>
-          </a:p>
-        </p:txBody>
-      </p:sp>
-      <p:sp>
-        <p:nvSpPr>
-          <p:cNvPr id="159" name="Line"/>
-          <p:cNvSpPr/>
-          <p:nvPr/>
-        </p:nvSpPr>
-        <p:spPr>
-          <a:xfrm flipH="1">
-            <a:off x="8775699" y="6587140"/>
-            <a:ext cx="619955" cy="1"/>
-          </a:xfrm>
-          <a:prstGeom prst="line">
-            <a:avLst/>
-          </a:prstGeom>
-          <a:ln w="63500">
-            <a:solidFill>
-              <a:srgbClr val="000000"/>
-            </a:solidFill>
-            <a:miter lim="400000"/>
-            <a:tailEnd type="triangle"/>
-          </a:ln>
-        </p:spPr>
-        <p:txBody>
-          <a:bodyPr lIns="50800" tIns="50800" rIns="50800" bIns="50800" anchor="ctr"/>
+          <a:bodyPr/>
           <a:lstStyle/>
           <a:p>
-            <a:pPr>
-              <a:defRPr sz="2200" b="0">
-                <a:solidFill>
-                  <a:srgbClr val="FFFFFF"/>
-                </a:solidFill>
-                <a:latin typeface="+mn-lt"/>
-                <a:ea typeface="+mn-ea"/>
-                <a:cs typeface="+mn-cs"/>
-                <a:sym typeface="Helvetica Neue Medium"/>
-              </a:defRPr>
+            <a:r>
+              <a:rPr lang="en-US" dirty="0"/>
+              <a:t>Connect to SSID: </a:t>
+            </a:r>
+            <a:r>
+              <a:rPr lang="en-US" dirty="0" err="1"/>
+              <a:t>UCInet</a:t>
+            </a:r>
+            <a:r>
+              <a:rPr lang="en-US" dirty="0"/>
+              <a:t> Mobile</a:t>
+            </a:r>
+          </a:p>
+          <a:p>
+            <a:r>
+              <a:rPr lang="en-US" dirty="0"/>
+              <a:t>Go to </a:t>
+            </a:r>
+            <a:r>
+              <a:rPr lang="en-US" dirty="0">
+                <a:hlinkClick r:id="rId2"/>
+              </a:rPr>
+              <a:t>https://oit.uci.edu/reg</a:t>
+            </a:r>
+            <a:endParaRPr lang="en-US" dirty="0"/>
+          </a:p>
+          <a:p>
+            <a:r>
+              <a:rPr lang="en-US" dirty="0"/>
+              <a:t>Register your device as a guest</a:t>
+            </a:r>
+          </a:p>
+          <a:p>
+            <a:r>
+              <a:rPr lang="en-US" dirty="0"/>
+              <a:t>If you have problems:</a:t>
+            </a:r>
+            <a:br>
+              <a:rPr lang="en-US" dirty="0"/>
+            </a:br>
+            <a:r>
+              <a:rPr lang="en-US" dirty="0"/>
+              <a:t>	OIT support line at (949) 824-2222 option 3</a:t>
+            </a:r>
+            <a:br>
+              <a:rPr lang="en-US" dirty="0"/>
+            </a:br>
+            <a:r>
+              <a:rPr lang="en-US" dirty="0"/>
+              <a:t> Merage IT support line at (949)824-0852</a:t>
+            </a:r>
+          </a:p>
+          <a:p>
+            <a:pPr marL="351155" indent="-351155" defTabSz="461518">
+              <a:spcBef>
+                <a:spcPts val="3300"/>
+              </a:spcBef>
+              <a:defRPr sz="2528"/>
             </a:pPr>
-            <a:endParaRPr/>
+            <a:endParaRPr dirty="0"/>
           </a:p>
         </p:txBody>
       </p:sp>
@@ -3607,7 +3567,7 @@
       </p:grpSpPr>
       <p:sp>
         <p:nvSpPr>
-          <p:cNvPr id="161" name="Thanks to our Sponsors!"/>
+          <p:cNvPr id="152" name="Logistics"/>
           <p:cNvSpPr txBox="1">
             <a:spLocks noGrp="1"/>
           </p:cNvSpPr>
@@ -3622,275 +3582,94 @@
         </p:spPr>
         <p:txBody>
           <a:bodyPr/>
-          <a:lstStyle>
-            <a:lvl1pPr defTabSz="554990">
-              <a:defRPr sz="7600"/>
-            </a:lvl1pPr>
-          </a:lstStyle>
-          <a:p>
-            <a:r>
-              <a:t>Thanks to our Sponsors!</a:t>
-            </a:r>
+          <a:lstStyle/>
+          <a:p>
+            <a:r>
+              <a:rPr lang="en-US" dirty="0"/>
+              <a:t>Slack Setup</a:t>
+            </a:r>
+            <a:endParaRPr dirty="0"/>
           </a:p>
         </p:txBody>
       </p:sp>
-      <p:pic>
-        <p:nvPicPr>
-          <p:cNvPr id="162" name="Image" descr="Image"/>
-          <p:cNvPicPr>
-            <a:picLocks noChangeAspect="1"/>
-          </p:cNvPicPr>
-          <p:nvPr/>
-        </p:nvPicPr>
-        <p:blipFill>
-          <a:blip r:embed="rId2"/>
-          <a:stretch>
-            <a:fillRect/>
-          </a:stretch>
-        </p:blipFill>
-        <p:spPr>
-          <a:xfrm>
-            <a:off x="742950" y="2975548"/>
-            <a:ext cx="5276849" cy="1867751"/>
-          </a:xfrm>
-          <a:prstGeom prst="rect">
-            <a:avLst/>
-          </a:prstGeom>
-          <a:ln w="12700">
-            <a:miter lim="400000"/>
-          </a:ln>
-        </p:spPr>
-      </p:pic>
-      <p:pic>
-        <p:nvPicPr>
-          <p:cNvPr id="163" name="RConsortium_Horizontal_Pantone.png" descr="RConsortium_Horizontal_Pantone.png"/>
-          <p:cNvPicPr>
-            <a:picLocks noChangeAspect="1"/>
-          </p:cNvPicPr>
-          <p:nvPr/>
-        </p:nvPicPr>
-        <p:blipFill>
-          <a:blip r:embed="rId3"/>
-          <a:stretch>
-            <a:fillRect/>
-          </a:stretch>
-        </p:blipFill>
-        <p:spPr>
-          <a:xfrm>
-            <a:off x="6589555" y="2975548"/>
-            <a:ext cx="5916671" cy="1332342"/>
-          </a:xfrm>
-          <a:prstGeom prst="rect">
-            <a:avLst/>
-          </a:prstGeom>
-          <a:ln w="12700">
-            <a:miter lim="400000"/>
-          </a:ln>
-        </p:spPr>
-      </p:pic>
-      <p:pic>
-        <p:nvPicPr>
-          <p:cNvPr id="164" name="RStudio-Logo-Blue-Gray-250.png" descr="RStudio-Logo-Blue-Gray-250.png"/>
-          <p:cNvPicPr>
-            <a:picLocks noChangeAspect="1"/>
-          </p:cNvPicPr>
-          <p:nvPr/>
-        </p:nvPicPr>
-        <p:blipFill>
-          <a:blip r:embed="rId4"/>
-          <a:stretch>
-            <a:fillRect/>
-          </a:stretch>
-        </p:blipFill>
-        <p:spPr>
-          <a:xfrm>
-            <a:off x="7523209" y="4322158"/>
-            <a:ext cx="4049361" cy="1425376"/>
-          </a:xfrm>
-          <a:prstGeom prst="rect">
-            <a:avLst/>
-          </a:prstGeom>
-          <a:ln w="12700">
-            <a:miter lim="400000"/>
-          </a:ln>
-        </p:spPr>
-      </p:pic>
-      <p:pic>
-        <p:nvPicPr>
-          <p:cNvPr id="166" name="taylorf.pdf" descr="taylorf.pdf"/>
-          <p:cNvPicPr>
-            <a:picLocks noChangeAspect="1"/>
-          </p:cNvPicPr>
-          <p:nvPr/>
-        </p:nvPicPr>
-        <p:blipFill>
-          <a:blip r:embed="rId5"/>
-          <a:stretch>
-            <a:fillRect/>
-          </a:stretch>
-        </p:blipFill>
-        <p:spPr>
-          <a:xfrm>
-            <a:off x="730227" y="4953281"/>
-            <a:ext cx="6471792" cy="1727889"/>
-          </a:xfrm>
-          <a:prstGeom prst="rect">
-            <a:avLst/>
-          </a:prstGeom>
-          <a:ln w="12700">
-            <a:miter lim="400000"/>
-          </a:ln>
-        </p:spPr>
-      </p:pic>
-      <p:pic>
-        <p:nvPicPr>
-          <p:cNvPr id="3" name="Picture 2" descr="A picture containing logo&#10;&#10;Description automatically generated">
-            <a:extLst>
-              <a:ext uri="{FF2B5EF4-FFF2-40B4-BE49-F238E27FC236}">
-                <a16:creationId xmlns:a16="http://schemas.microsoft.com/office/drawing/2014/main" id="{30DC4FE6-56AD-E446-B8BF-A67A0A1DBCB2}"/>
-              </a:ext>
-            </a:extLst>
-          </p:cNvPr>
-          <p:cNvPicPr>
-            <a:picLocks noChangeAspect="1"/>
-          </p:cNvPicPr>
-          <p:nvPr/>
-        </p:nvPicPr>
-        <p:blipFill>
-          <a:blip r:embed="rId6">
-            <a:extLst>
-              <a:ext uri="{28A0092B-C50C-407E-A947-70E740481C1C}">
-                <a14:useLocalDpi xmlns:a14="http://schemas.microsoft.com/office/drawing/2010/main" val="0"/>
-              </a:ext>
-            </a:extLst>
-          </a:blip>
-          <a:stretch>
-            <a:fillRect/>
-          </a:stretch>
-        </p:blipFill>
-        <p:spPr>
-          <a:xfrm>
-            <a:off x="742950" y="6302073"/>
-            <a:ext cx="4834953" cy="1538394"/>
-          </a:xfrm>
-          <a:prstGeom prst="rect">
-            <a:avLst/>
-          </a:prstGeom>
-        </p:spPr>
-      </p:pic>
-      <p:pic>
-        <p:nvPicPr>
-          <p:cNvPr id="4" name="Graphic 3">
-            <a:extLst>
-              <a:ext uri="{FF2B5EF4-FFF2-40B4-BE49-F238E27FC236}">
-                <a16:creationId xmlns:a16="http://schemas.microsoft.com/office/drawing/2014/main" id="{DCDE672B-56E3-F94B-8B27-3D9629926CC5}"/>
-              </a:ext>
-            </a:extLst>
-          </p:cNvPr>
-          <p:cNvPicPr>
-            <a:picLocks noChangeAspect="1"/>
-          </p:cNvPicPr>
-          <p:nvPr/>
-        </p:nvPicPr>
-        <p:blipFill>
-          <a:blip r:embed="rId7">
-            <a:extLst>
-              <a:ext uri="{28A0092B-C50C-407E-A947-70E740481C1C}">
-                <a14:useLocalDpi xmlns:a14="http://schemas.microsoft.com/office/drawing/2010/main" val="0"/>
-              </a:ext>
-              <a:ext uri="{96DAC541-7B7A-43D3-8B79-37D633B846F1}">
-                <asvg:svgBlip xmlns:asvg="http://schemas.microsoft.com/office/drawing/2016/SVG/main" r:embed="rId8"/>
-              </a:ext>
-            </a:extLst>
-          </a:blip>
-          <a:stretch>
-            <a:fillRect/>
-          </a:stretch>
-        </p:blipFill>
-        <p:spPr>
-          <a:xfrm>
-            <a:off x="7202019" y="5959171"/>
-            <a:ext cx="3162300" cy="1778000"/>
-          </a:xfrm>
-          <a:prstGeom prst="rect">
-            <a:avLst/>
-          </a:prstGeom>
-        </p:spPr>
-      </p:pic>
       <p:sp>
         <p:nvSpPr>
-          <p:cNvPr id="5" name="TextBox 4">
-            <a:extLst>
-              <a:ext uri="{FF2B5EF4-FFF2-40B4-BE49-F238E27FC236}">
-                <a16:creationId xmlns:a16="http://schemas.microsoft.com/office/drawing/2014/main" id="{35AA9657-D298-F342-80AD-725F217F57D5}"/>
-              </a:ext>
-            </a:extLst>
-          </p:cNvPr>
-          <p:cNvSpPr txBox="1"/>
-          <p:nvPr/>
+          <p:cNvPr id="153" name="Pull the latest Hackathon GIT repo before starting.…"/>
+          <p:cNvSpPr txBox="1">
+            <a:spLocks noGrp="1"/>
+          </p:cNvSpPr>
+          <p:nvPr>
+            <p:ph type="body" idx="1"/>
+          </p:nvPr>
         </p:nvSpPr>
         <p:spPr>
           <a:xfrm>
-            <a:off x="10364320" y="6230014"/>
-            <a:ext cx="1685376" cy="841256"/>
+            <a:off x="352894" y="2605790"/>
+            <a:ext cx="12283814" cy="6286500"/>
           </a:xfrm>
           <a:prstGeom prst="rect">
             <a:avLst/>
           </a:prstGeom>
-          <a:noFill/>
-          <a:ln w="12700" cap="flat">
-            <a:noFill/>
-            <a:miter lim="400000"/>
-          </a:ln>
-          <a:effectLst/>
-          <a:sp3d/>
-        </p:spPr>
-        <p:style>
-          <a:lnRef idx="0">
-            <a:scrgbClr r="0" g="0" b="0"/>
-          </a:lnRef>
-          <a:fillRef idx="0">
-            <a:scrgbClr r="0" g="0" b="0"/>
-          </a:fillRef>
-          <a:effectRef idx="0">
-            <a:scrgbClr r="0" g="0" b="0"/>
-          </a:effectRef>
-          <a:fontRef idx="none"/>
-        </p:style>
+        </p:spPr>
         <p:txBody>
-          <a:bodyPr rot="0" spcFirstLastPara="1" vertOverflow="overflow" horzOverflow="overflow" vert="horz" wrap="square" lIns="50800" tIns="50800" rIns="50800" bIns="50800" numCol="1" spcCol="38100" rtlCol="0" anchor="ctr">
-            <a:spAutoFit/>
-          </a:bodyPr>
+          <a:bodyPr/>
           <a:lstStyle/>
           <a:p>
             <a:r>
               <a:rPr lang="en-US" dirty="0"/>
-              <a:t>Anaheim </a:t>
-            </a:r>
-          </a:p>
-          <a:p>
+              <a:t>Slack Group Sign-up: https://</a:t>
+            </a:r>
+            <a:r>
+              <a:rPr lang="en-US" dirty="0" err="1"/>
+              <a:t>tinyurl.com</a:t>
+            </a:r>
             <a:r>
               <a:rPr lang="en-US" dirty="0"/>
-              <a:t>Ducks</a:t>
-            </a:r>
-            <a:endParaRPr kumimoji="0" lang="en-US" sz="2400" b="1" i="0" u="none" strike="noStrike" cap="none" spc="0" normalizeH="0" baseline="0" dirty="0">
-              <a:ln>
-                <a:noFill/>
-              </a:ln>
-              <a:solidFill>
-                <a:srgbClr val="000000"/>
-              </a:solidFill>
-              <a:effectLst/>
-              <a:uFillTx/>
-              <a:latin typeface="Helvetica Neue"/>
-              <a:ea typeface="Helvetica Neue"/>
-              <a:cs typeface="Helvetica Neue"/>
-              <a:sym typeface="Helvetica Neue"/>
-            </a:endParaRPr>
+              <a:t>/</a:t>
+            </a:r>
+            <a:r>
+              <a:rPr lang="en-US" dirty="0" err="1"/>
+              <a:t>socalrug</a:t>
+            </a:r>
+            <a:r>
+              <a:rPr lang="en-US" dirty="0"/>
+              <a:t>-slack-signup</a:t>
+            </a:r>
+          </a:p>
+          <a:p>
+            <a:r>
+              <a:rPr lang="en-US" dirty="0"/>
+              <a:t>Slack channel: https://</a:t>
+            </a:r>
+            <a:r>
+              <a:rPr lang="en-US" dirty="0" err="1"/>
+              <a:t>socalrug.slack.com</a:t>
+            </a:r>
+            <a:endParaRPr lang="en-US" dirty="0"/>
+          </a:p>
+          <a:p>
+            <a:r>
+              <a:rPr lang="en-US" dirty="0"/>
+              <a:t>Join: hackathon-2022-04</a:t>
+            </a:r>
+          </a:p>
+          <a:p>
+            <a:pPr marL="351155" indent="-351155" defTabSz="461518">
+              <a:spcBef>
+                <a:spcPts val="3300"/>
+              </a:spcBef>
+              <a:defRPr sz="2528"/>
+            </a:pPr>
+            <a:endParaRPr dirty="0"/>
           </a:p>
         </p:txBody>
       </p:sp>
     </p:spTree>
+    <p:extLst>
+      <p:ext uri="{BB962C8B-B14F-4D97-AF65-F5344CB8AC3E}">
+        <p14:creationId xmlns:p14="http://schemas.microsoft.com/office/powerpoint/2010/main" val="4255132614"/>
+      </p:ext>
+    </p:extLst>
   </p:cSld>
   <p:clrMapOvr>
     <a:masterClrMapping/>
@@ -3918,6 +3697,550 @@
       </p:grpSpPr>
       <p:sp>
         <p:nvSpPr>
+          <p:cNvPr id="155" name="The PacMan Rule"/>
+          <p:cNvSpPr txBox="1">
+            <a:spLocks noGrp="1"/>
+          </p:cNvSpPr>
+          <p:nvPr>
+            <p:ph type="title"/>
+          </p:nvPr>
+        </p:nvSpPr>
+        <p:spPr>
+          <a:prstGeom prst="rect">
+            <a:avLst/>
+          </a:prstGeom>
+        </p:spPr>
+        <p:txBody>
+          <a:bodyPr/>
+          <a:lstStyle/>
+          <a:p>
+            <a:r>
+              <a:t>The PacMan Rule</a:t>
+            </a:r>
+          </a:p>
+        </p:txBody>
+      </p:sp>
+      <p:pic>
+        <p:nvPicPr>
+          <p:cNvPr id="156" name="pacman.png" descr="pacman.png"/>
+          <p:cNvPicPr>
+            <a:picLocks noChangeAspect="1"/>
+          </p:cNvPicPr>
+          <p:nvPr/>
+        </p:nvPicPr>
+        <p:blipFill>
+          <a:blip r:embed="rId2"/>
+          <a:stretch>
+            <a:fillRect/>
+          </a:stretch>
+        </p:blipFill>
+        <p:spPr>
+          <a:xfrm>
+            <a:off x="4176509" y="4135651"/>
+            <a:ext cx="4651782" cy="4902979"/>
+          </a:xfrm>
+          <a:prstGeom prst="rect">
+            <a:avLst/>
+          </a:prstGeom>
+          <a:ln w="12700">
+            <a:miter lim="400000"/>
+          </a:ln>
+        </p:spPr>
+      </p:pic>
+      <p:sp>
+        <p:nvSpPr>
+          <p:cNvPr id="157" name="When standing as a group of people, always leave room for 1 person to join your group."/>
+          <p:cNvSpPr txBox="1"/>
+          <p:nvPr/>
+        </p:nvSpPr>
+        <p:spPr>
+          <a:xfrm>
+            <a:off x="2628394" y="2456078"/>
+            <a:ext cx="7748012" cy="955244"/>
+          </a:xfrm>
+          <a:prstGeom prst="rect">
+            <a:avLst/>
+          </a:prstGeom>
+          <a:ln w="12700">
+            <a:miter lim="400000"/>
+          </a:ln>
+          <a:extLst>
+            <a:ext uri="{C572A759-6A51-4108-AA02-DFA0A04FC94B}">
+              <ma14:wrappingTextBoxFlag xmlns="" xmlns:m="http://schemas.openxmlformats.org/officeDocument/2006/math" xmlns:a14="http://schemas.microsoft.com/office/drawing/2010/main" xmlns:ma14="http://schemas.microsoft.com/office/mac/drawingml/2011/main" val="1"/>
+            </a:ext>
+          </a:extLst>
+        </p:spPr>
+        <p:txBody>
+          <a:bodyPr lIns="50800" tIns="50800" rIns="50800" bIns="50800" anchor="ctr">
+            <a:spAutoFit/>
+          </a:bodyPr>
+          <a:lstStyle>
+            <a:lvl1pPr>
+              <a:defRPr sz="2800" b="0" i="1"/>
+            </a:lvl1pPr>
+          </a:lstStyle>
+          <a:p>
+            <a:r>
+              <a:t>When standing as a group of people, always leave room for 1 person to join your group.</a:t>
+            </a:r>
+          </a:p>
+        </p:txBody>
+      </p:sp>
+      <p:sp>
+        <p:nvSpPr>
+          <p:cNvPr id="158" name="Leave some space here"/>
+          <p:cNvSpPr txBox="1"/>
+          <p:nvPr/>
+        </p:nvSpPr>
+        <p:spPr>
+          <a:xfrm>
+            <a:off x="9171330" y="6172307"/>
+            <a:ext cx="2507962" cy="829667"/>
+          </a:xfrm>
+          <a:prstGeom prst="rect">
+            <a:avLst/>
+          </a:prstGeom>
+          <a:ln w="12700">
+            <a:miter lim="400000"/>
+          </a:ln>
+          <a:extLst>
+            <a:ext uri="{C572A759-6A51-4108-AA02-DFA0A04FC94B}">
+              <ma14:wrappingTextBoxFlag xmlns="" xmlns:m="http://schemas.openxmlformats.org/officeDocument/2006/math" xmlns:a14="http://schemas.microsoft.com/office/drawing/2010/main" xmlns:ma14="http://schemas.microsoft.com/office/mac/drawingml/2011/main" val="1"/>
+            </a:ext>
+          </a:extLst>
+        </p:spPr>
+        <p:txBody>
+          <a:bodyPr lIns="50800" tIns="50800" rIns="50800" bIns="50800" anchor="ctr">
+            <a:spAutoFit/>
+          </a:bodyPr>
+          <a:lstStyle>
+            <a:lvl1pPr>
+              <a:defRPr b="0"/>
+            </a:lvl1pPr>
+          </a:lstStyle>
+          <a:p>
+            <a:r>
+              <a:t>Leave some space here</a:t>
+            </a:r>
+          </a:p>
+        </p:txBody>
+      </p:sp>
+      <p:sp>
+        <p:nvSpPr>
+          <p:cNvPr id="159" name="Line"/>
+          <p:cNvSpPr/>
+          <p:nvPr/>
+        </p:nvSpPr>
+        <p:spPr>
+          <a:xfrm flipH="1">
+            <a:off x="8775699" y="6587140"/>
+            <a:ext cx="619955" cy="1"/>
+          </a:xfrm>
+          <a:prstGeom prst="line">
+            <a:avLst/>
+          </a:prstGeom>
+          <a:ln w="63500">
+            <a:solidFill>
+              <a:srgbClr val="000000"/>
+            </a:solidFill>
+            <a:miter lim="400000"/>
+            <a:tailEnd type="triangle"/>
+          </a:ln>
+        </p:spPr>
+        <p:txBody>
+          <a:bodyPr lIns="50800" tIns="50800" rIns="50800" bIns="50800" anchor="ctr"/>
+          <a:lstStyle/>
+          <a:p>
+            <a:pPr>
+              <a:defRPr sz="2200" b="0">
+                <a:solidFill>
+                  <a:srgbClr val="FFFFFF"/>
+                </a:solidFill>
+                <a:latin typeface="+mn-lt"/>
+                <a:ea typeface="+mn-ea"/>
+                <a:cs typeface="+mn-cs"/>
+                <a:sym typeface="Helvetica Neue Medium"/>
+              </a:defRPr>
+            </a:pPr>
+            <a:endParaRPr/>
+          </a:p>
+        </p:txBody>
+      </p:sp>
+    </p:spTree>
+  </p:cSld>
+  <p:clrMapOvr>
+    <a:masterClrMapping/>
+  </p:clrMapOvr>
+  <p:transition spd="med"/>
+</p:sld>
+</file>
+
+<file path=ppt/slides/slide14.xml><?xml version="1.0" encoding="utf-8"?>
+<p:sld xmlns:a="http://schemas.openxmlformats.org/drawingml/2006/main" xmlns:r="http://schemas.openxmlformats.org/officeDocument/2006/relationships" xmlns:p="http://schemas.openxmlformats.org/presentationml/2006/main">
+  <p:cSld>
+    <p:spTree>
+      <p:nvGrpSpPr>
+        <p:cNvPr id="1" name=""/>
+        <p:cNvGrpSpPr/>
+        <p:nvPr/>
+      </p:nvGrpSpPr>
+      <p:grpSpPr>
+        <a:xfrm>
+          <a:off x="0" y="0"/>
+          <a:ext cx="0" cy="0"/>
+          <a:chOff x="0" y="0"/>
+          <a:chExt cx="0" cy="0"/>
+        </a:xfrm>
+      </p:grpSpPr>
+      <p:pic>
+        <p:nvPicPr>
+          <p:cNvPr id="10" name="Picture 9" descr="Logo, company name&#10;&#10;Description automatically generated">
+            <a:extLst>
+              <a:ext uri="{FF2B5EF4-FFF2-40B4-BE49-F238E27FC236}">
+                <a16:creationId xmlns:a16="http://schemas.microsoft.com/office/drawing/2014/main" id="{2F053CC2-8286-FF47-B924-B15B839AE981}"/>
+              </a:ext>
+            </a:extLst>
+          </p:cNvPr>
+          <p:cNvPicPr>
+            <a:picLocks noChangeAspect="1"/>
+          </p:cNvPicPr>
+          <p:nvPr/>
+        </p:nvPicPr>
+        <p:blipFill>
+          <a:blip r:embed="rId2">
+            <a:extLst>
+              <a:ext uri="{28A0092B-C50C-407E-A947-70E740481C1C}">
+                <a14:useLocalDpi xmlns:a14="http://schemas.microsoft.com/office/drawing/2010/main" val="0"/>
+              </a:ext>
+            </a:extLst>
+          </a:blip>
+          <a:stretch>
+            <a:fillRect/>
+          </a:stretch>
+        </p:blipFill>
+        <p:spPr>
+          <a:xfrm>
+            <a:off x="4618494" y="6375603"/>
+            <a:ext cx="3542935" cy="3424491"/>
+          </a:xfrm>
+          <a:prstGeom prst="rect">
+            <a:avLst/>
+          </a:prstGeom>
+        </p:spPr>
+      </p:pic>
+      <p:sp>
+        <p:nvSpPr>
+          <p:cNvPr id="161" name="Thanks to our Sponsors!"/>
+          <p:cNvSpPr txBox="1">
+            <a:spLocks noGrp="1"/>
+          </p:cNvSpPr>
+          <p:nvPr>
+            <p:ph type="title"/>
+          </p:nvPr>
+        </p:nvSpPr>
+        <p:spPr>
+          <a:prstGeom prst="rect">
+            <a:avLst/>
+          </a:prstGeom>
+        </p:spPr>
+        <p:txBody>
+          <a:bodyPr/>
+          <a:lstStyle>
+            <a:lvl1pPr defTabSz="554990">
+              <a:defRPr sz="7600"/>
+            </a:lvl1pPr>
+          </a:lstStyle>
+          <a:p>
+            <a:r>
+              <a:t>Thanks to our Sponsors!</a:t>
+            </a:r>
+          </a:p>
+        </p:txBody>
+      </p:sp>
+      <p:pic>
+        <p:nvPicPr>
+          <p:cNvPr id="162" name="Image" descr="Image"/>
+          <p:cNvPicPr>
+            <a:picLocks noChangeAspect="1"/>
+          </p:cNvPicPr>
+          <p:nvPr/>
+        </p:nvPicPr>
+        <p:blipFill>
+          <a:blip r:embed="rId3"/>
+          <a:stretch>
+            <a:fillRect/>
+          </a:stretch>
+        </p:blipFill>
+        <p:spPr>
+          <a:xfrm>
+            <a:off x="742950" y="2975548"/>
+            <a:ext cx="5276849" cy="1867751"/>
+          </a:xfrm>
+          <a:prstGeom prst="rect">
+            <a:avLst/>
+          </a:prstGeom>
+          <a:ln w="12700">
+            <a:miter lim="400000"/>
+          </a:ln>
+        </p:spPr>
+      </p:pic>
+      <p:pic>
+        <p:nvPicPr>
+          <p:cNvPr id="163" name="RConsortium_Horizontal_Pantone.png" descr="RConsortium_Horizontal_Pantone.png"/>
+          <p:cNvPicPr>
+            <a:picLocks noChangeAspect="1"/>
+          </p:cNvPicPr>
+          <p:nvPr/>
+        </p:nvPicPr>
+        <p:blipFill>
+          <a:blip r:embed="rId4"/>
+          <a:stretch>
+            <a:fillRect/>
+          </a:stretch>
+        </p:blipFill>
+        <p:spPr>
+          <a:xfrm>
+            <a:off x="6589555" y="2975548"/>
+            <a:ext cx="5916671" cy="1332342"/>
+          </a:xfrm>
+          <a:prstGeom prst="rect">
+            <a:avLst/>
+          </a:prstGeom>
+          <a:ln w="12700">
+            <a:miter lim="400000"/>
+          </a:ln>
+        </p:spPr>
+      </p:pic>
+      <p:pic>
+        <p:nvPicPr>
+          <p:cNvPr id="164" name="RStudio-Logo-Blue-Gray-250.png" descr="RStudio-Logo-Blue-Gray-250.png"/>
+          <p:cNvPicPr>
+            <a:picLocks noChangeAspect="1"/>
+          </p:cNvPicPr>
+          <p:nvPr/>
+        </p:nvPicPr>
+        <p:blipFill>
+          <a:blip r:embed="rId5"/>
+          <a:stretch>
+            <a:fillRect/>
+          </a:stretch>
+        </p:blipFill>
+        <p:spPr>
+          <a:xfrm>
+            <a:off x="7523209" y="4322158"/>
+            <a:ext cx="4049361" cy="1425376"/>
+          </a:xfrm>
+          <a:prstGeom prst="rect">
+            <a:avLst/>
+          </a:prstGeom>
+          <a:ln w="12700">
+            <a:miter lim="400000"/>
+          </a:ln>
+        </p:spPr>
+      </p:pic>
+      <p:pic>
+        <p:nvPicPr>
+          <p:cNvPr id="166" name="taylorf.pdf" descr="taylorf.pdf"/>
+          <p:cNvPicPr>
+            <a:picLocks noChangeAspect="1"/>
+          </p:cNvPicPr>
+          <p:nvPr/>
+        </p:nvPicPr>
+        <p:blipFill>
+          <a:blip r:embed="rId6"/>
+          <a:stretch>
+            <a:fillRect/>
+          </a:stretch>
+        </p:blipFill>
+        <p:spPr>
+          <a:xfrm>
+            <a:off x="730227" y="4953281"/>
+            <a:ext cx="6471792" cy="1727889"/>
+          </a:xfrm>
+          <a:prstGeom prst="rect">
+            <a:avLst/>
+          </a:prstGeom>
+          <a:ln w="12700">
+            <a:miter lim="400000"/>
+          </a:ln>
+        </p:spPr>
+      </p:pic>
+      <p:pic>
+        <p:nvPicPr>
+          <p:cNvPr id="3" name="Picture 2" descr="A picture containing logo&#10;&#10;Description automatically generated">
+            <a:extLst>
+              <a:ext uri="{FF2B5EF4-FFF2-40B4-BE49-F238E27FC236}">
+                <a16:creationId xmlns:a16="http://schemas.microsoft.com/office/drawing/2014/main" id="{30DC4FE6-56AD-E446-B8BF-A67A0A1DBCB2}"/>
+              </a:ext>
+            </a:extLst>
+          </p:cNvPr>
+          <p:cNvPicPr>
+            <a:picLocks noChangeAspect="1"/>
+          </p:cNvPicPr>
+          <p:nvPr/>
+        </p:nvPicPr>
+        <p:blipFill>
+          <a:blip r:embed="rId7">
+            <a:extLst>
+              <a:ext uri="{28A0092B-C50C-407E-A947-70E740481C1C}">
+                <a14:useLocalDpi xmlns:a14="http://schemas.microsoft.com/office/drawing/2010/main" val="0"/>
+              </a:ext>
+            </a:extLst>
+          </a:blip>
+          <a:stretch>
+            <a:fillRect/>
+          </a:stretch>
+        </p:blipFill>
+        <p:spPr>
+          <a:xfrm>
+            <a:off x="742950" y="6302073"/>
+            <a:ext cx="4834953" cy="1538394"/>
+          </a:xfrm>
+          <a:prstGeom prst="rect">
+            <a:avLst/>
+          </a:prstGeom>
+        </p:spPr>
+      </p:pic>
+      <p:pic>
+        <p:nvPicPr>
+          <p:cNvPr id="4" name="Graphic 3">
+            <a:extLst>
+              <a:ext uri="{FF2B5EF4-FFF2-40B4-BE49-F238E27FC236}">
+                <a16:creationId xmlns:a16="http://schemas.microsoft.com/office/drawing/2014/main" id="{DCDE672B-56E3-F94B-8B27-3D9629926CC5}"/>
+              </a:ext>
+            </a:extLst>
+          </p:cNvPr>
+          <p:cNvPicPr>
+            <a:picLocks noChangeAspect="1"/>
+          </p:cNvPicPr>
+          <p:nvPr/>
+        </p:nvPicPr>
+        <p:blipFill>
+          <a:blip r:embed="rId8">
+            <a:extLst>
+              <a:ext uri="{28A0092B-C50C-407E-A947-70E740481C1C}">
+                <a14:useLocalDpi xmlns:a14="http://schemas.microsoft.com/office/drawing/2010/main" val="0"/>
+              </a:ext>
+              <a:ext uri="{96DAC541-7B7A-43D3-8B79-37D633B846F1}">
+                <asvg:svgBlip xmlns:asvg="http://schemas.microsoft.com/office/drawing/2016/SVG/main" r:embed="rId9"/>
+              </a:ext>
+            </a:extLst>
+          </a:blip>
+          <a:stretch>
+            <a:fillRect/>
+          </a:stretch>
+        </p:blipFill>
+        <p:spPr>
+          <a:xfrm>
+            <a:off x="7202019" y="5959171"/>
+            <a:ext cx="3162300" cy="1778000"/>
+          </a:xfrm>
+          <a:prstGeom prst="rect">
+            <a:avLst/>
+          </a:prstGeom>
+        </p:spPr>
+      </p:pic>
+      <p:sp>
+        <p:nvSpPr>
+          <p:cNvPr id="5" name="TextBox 4">
+            <a:extLst>
+              <a:ext uri="{FF2B5EF4-FFF2-40B4-BE49-F238E27FC236}">
+                <a16:creationId xmlns:a16="http://schemas.microsoft.com/office/drawing/2014/main" id="{35AA9657-D298-F342-80AD-725F217F57D5}"/>
+              </a:ext>
+            </a:extLst>
+          </p:cNvPr>
+          <p:cNvSpPr txBox="1"/>
+          <p:nvPr/>
+        </p:nvSpPr>
+        <p:spPr>
+          <a:xfrm>
+            <a:off x="10364320" y="6230014"/>
+            <a:ext cx="1685376" cy="841256"/>
+          </a:xfrm>
+          <a:prstGeom prst="rect">
+            <a:avLst/>
+          </a:prstGeom>
+          <a:noFill/>
+          <a:ln w="12700" cap="flat">
+            <a:noFill/>
+            <a:miter lim="400000"/>
+          </a:ln>
+          <a:effectLst/>
+          <a:sp3d/>
+        </p:spPr>
+        <p:style>
+          <a:lnRef idx="0">
+            <a:scrgbClr r="0" g="0" b="0"/>
+          </a:lnRef>
+          <a:fillRef idx="0">
+            <a:scrgbClr r="0" g="0" b="0"/>
+          </a:fillRef>
+          <a:effectRef idx="0">
+            <a:scrgbClr r="0" g="0" b="0"/>
+          </a:effectRef>
+          <a:fontRef idx="none"/>
+        </p:style>
+        <p:txBody>
+          <a:bodyPr rot="0" spcFirstLastPara="1" vertOverflow="overflow" horzOverflow="overflow" vert="horz" wrap="square" lIns="50800" tIns="50800" rIns="50800" bIns="50800" numCol="1" spcCol="38100" rtlCol="0" anchor="ctr">
+            <a:spAutoFit/>
+          </a:bodyPr>
+          <a:lstStyle/>
+          <a:p>
+            <a:r>
+              <a:rPr lang="en-US" dirty="0"/>
+              <a:t>Anaheim </a:t>
+            </a:r>
+          </a:p>
+          <a:p>
+            <a:r>
+              <a:rPr lang="en-US" dirty="0"/>
+              <a:t>Ducks</a:t>
+            </a:r>
+            <a:endParaRPr kumimoji="0" lang="en-US" sz="2400" b="1" i="0" u="none" strike="noStrike" cap="none" spc="0" normalizeH="0" baseline="0" dirty="0">
+              <a:ln>
+                <a:noFill/>
+              </a:ln>
+              <a:solidFill>
+                <a:srgbClr val="000000"/>
+              </a:solidFill>
+              <a:effectLst/>
+              <a:uFillTx/>
+              <a:latin typeface="Helvetica Neue"/>
+              <a:ea typeface="Helvetica Neue"/>
+              <a:cs typeface="Helvetica Neue"/>
+              <a:sym typeface="Helvetica Neue"/>
+            </a:endParaRPr>
+          </a:p>
+        </p:txBody>
+      </p:sp>
+    </p:spTree>
+  </p:cSld>
+  <p:clrMapOvr>
+    <a:masterClrMapping/>
+  </p:clrMapOvr>
+  <p:transition spd="med"/>
+</p:sld>
+</file>
+
+<file path=ppt/slides/slide15.xml><?xml version="1.0" encoding="utf-8"?>
+<p:sld xmlns:a="http://schemas.openxmlformats.org/drawingml/2006/main" xmlns:r="http://schemas.openxmlformats.org/officeDocument/2006/relationships" xmlns:p="http://schemas.openxmlformats.org/presentationml/2006/main">
+  <p:cSld>
+    <p:spTree>
+      <p:nvGrpSpPr>
+        <p:cNvPr id="1" name=""/>
+        <p:cNvGrpSpPr/>
+        <p:nvPr/>
+      </p:nvGrpSpPr>
+      <p:grpSpPr>
+        <a:xfrm>
+          <a:off x="0" y="0"/>
+          <a:ext cx="0" cy="0"/>
+          <a:chOff x="0" y="0"/>
+          <a:chExt cx="0" cy="0"/>
+        </a:xfrm>
+      </p:grpSpPr>
+      <p:sp>
+        <p:nvSpPr>
           <p:cNvPr id="168" name="Thanks to our Volunteers!!!"/>
           <p:cNvSpPr txBox="1">
             <a:spLocks noGrp="1"/>
@@ -3964,7 +4287,7 @@
           </a:ln>
           <a:extLst>
             <a:ext uri="{C572A759-6A51-4108-AA02-DFA0A04FC94B}">
-              <ma14:wrappingTextBoxFlag xmlns:ma14="http://schemas.microsoft.com/office/mac/drawingml/2011/main" xmlns:a14="http://schemas.microsoft.com/office/drawing/2010/main" xmlns:m="http://schemas.openxmlformats.org/officeDocument/2006/math" xmlns="" val="1"/>
+              <ma14:wrappingTextBoxFlag xmlns="" xmlns:m="http://schemas.openxmlformats.org/officeDocument/2006/math" xmlns:a14="http://schemas.microsoft.com/office/drawing/2010/main" xmlns:ma14="http://schemas.microsoft.com/office/mac/drawingml/2011/main" val="1"/>
             </a:ext>
           </a:extLst>
         </p:spPr>
@@ -4010,7 +4333,7 @@
         </p:blipFill>
         <p:spPr>
           <a:xfrm>
-            <a:off x="952500" y="2696704"/>
+            <a:off x="952500" y="2321143"/>
             <a:ext cx="3162826" cy="3930865"/>
           </a:xfrm>
           <a:prstGeom prst="rect">
@@ -4405,6 +4728,333 @@
           </a:p>
         </p:txBody>
       </p:sp>
+      <p:sp>
+        <p:nvSpPr>
+          <p:cNvPr id="7" name="Feel free to come and go as you like.   IMPORTANT: Building door locks at 10 PM…">
+            <a:extLst>
+              <a:ext uri="{FF2B5EF4-FFF2-40B4-BE49-F238E27FC236}">
+                <a16:creationId xmlns:a16="http://schemas.microsoft.com/office/drawing/2014/main" id="{0936E45E-D5C0-3B45-B329-F510213AA119}"/>
+              </a:ext>
+            </a:extLst>
+          </p:cNvPr>
+          <p:cNvSpPr txBox="1">
+            <a:spLocks/>
+          </p:cNvSpPr>
+          <p:nvPr/>
+        </p:nvSpPr>
+        <p:spPr>
+          <a:xfrm>
+            <a:off x="952501" y="6433457"/>
+            <a:ext cx="2705099" cy="3066143"/>
+          </a:xfrm>
+          <a:prstGeom prst="rect">
+            <a:avLst/>
+          </a:prstGeom>
+        </p:spPr>
+        <p:txBody>
+          <a:bodyPr anchor="t">
+            <a:normAutofit/>
+          </a:bodyPr>
+          <a:lstStyle>
+            <a:lvl1pPr marL="444500" marR="0" indent="-444500" algn="l" defTabSz="584200" rtl="0" latinLnBrk="0">
+              <a:lnSpc>
+                <a:spcPct val="100000"/>
+              </a:lnSpc>
+              <a:spcBef>
+                <a:spcPts val="4200"/>
+              </a:spcBef>
+              <a:spcAft>
+                <a:spcPts val="0"/>
+              </a:spcAft>
+              <a:buClrTx/>
+              <a:buSzPct val="145000"/>
+              <a:buFontTx/>
+              <a:buChar char="•"/>
+              <a:tabLst/>
+              <a:defRPr sz="3200" b="0" i="0" u="none" strike="noStrike" cap="none" spc="0" baseline="0">
+                <a:solidFill>
+                  <a:srgbClr val="000000"/>
+                </a:solidFill>
+                <a:uFillTx/>
+                <a:latin typeface="Helvetica Neue"/>
+                <a:ea typeface="Helvetica Neue"/>
+                <a:cs typeface="Helvetica Neue"/>
+                <a:sym typeface="Helvetica Neue"/>
+              </a:defRPr>
+            </a:lvl1pPr>
+            <a:lvl2pPr marL="889000" marR="0" indent="-444500" algn="l" defTabSz="584200" rtl="0" latinLnBrk="0">
+              <a:lnSpc>
+                <a:spcPct val="100000"/>
+              </a:lnSpc>
+              <a:spcBef>
+                <a:spcPts val="4200"/>
+              </a:spcBef>
+              <a:spcAft>
+                <a:spcPts val="0"/>
+              </a:spcAft>
+              <a:buClrTx/>
+              <a:buSzPct val="145000"/>
+              <a:buFontTx/>
+              <a:buChar char="•"/>
+              <a:tabLst/>
+              <a:defRPr sz="3200" b="0" i="0" u="none" strike="noStrike" cap="none" spc="0" baseline="0">
+                <a:solidFill>
+                  <a:srgbClr val="000000"/>
+                </a:solidFill>
+                <a:uFillTx/>
+                <a:latin typeface="Helvetica Neue"/>
+                <a:ea typeface="Helvetica Neue"/>
+                <a:cs typeface="Helvetica Neue"/>
+                <a:sym typeface="Helvetica Neue"/>
+              </a:defRPr>
+            </a:lvl2pPr>
+            <a:lvl3pPr marL="1333500" marR="0" indent="-444500" algn="l" defTabSz="584200" rtl="0" latinLnBrk="0">
+              <a:lnSpc>
+                <a:spcPct val="100000"/>
+              </a:lnSpc>
+              <a:spcBef>
+                <a:spcPts val="4200"/>
+              </a:spcBef>
+              <a:spcAft>
+                <a:spcPts val="0"/>
+              </a:spcAft>
+              <a:buClrTx/>
+              <a:buSzPct val="145000"/>
+              <a:buFontTx/>
+              <a:buChar char="•"/>
+              <a:tabLst/>
+              <a:defRPr sz="3200" b="0" i="0" u="none" strike="noStrike" cap="none" spc="0" baseline="0">
+                <a:solidFill>
+                  <a:srgbClr val="000000"/>
+                </a:solidFill>
+                <a:uFillTx/>
+                <a:latin typeface="Helvetica Neue"/>
+                <a:ea typeface="Helvetica Neue"/>
+                <a:cs typeface="Helvetica Neue"/>
+                <a:sym typeface="Helvetica Neue"/>
+              </a:defRPr>
+            </a:lvl3pPr>
+            <a:lvl4pPr marL="1778000" marR="0" indent="-444500" algn="l" defTabSz="584200" rtl="0" latinLnBrk="0">
+              <a:lnSpc>
+                <a:spcPct val="100000"/>
+              </a:lnSpc>
+              <a:spcBef>
+                <a:spcPts val="4200"/>
+              </a:spcBef>
+              <a:spcAft>
+                <a:spcPts val="0"/>
+              </a:spcAft>
+              <a:buClrTx/>
+              <a:buSzPct val="145000"/>
+              <a:buFontTx/>
+              <a:buChar char="•"/>
+              <a:tabLst/>
+              <a:defRPr sz="3200" b="0" i="0" u="none" strike="noStrike" cap="none" spc="0" baseline="0">
+                <a:solidFill>
+                  <a:srgbClr val="000000"/>
+                </a:solidFill>
+                <a:uFillTx/>
+                <a:latin typeface="Helvetica Neue"/>
+                <a:ea typeface="Helvetica Neue"/>
+                <a:cs typeface="Helvetica Neue"/>
+                <a:sym typeface="Helvetica Neue"/>
+              </a:defRPr>
+            </a:lvl4pPr>
+            <a:lvl5pPr marL="2222500" marR="0" indent="-444500" algn="l" defTabSz="584200" rtl="0" latinLnBrk="0">
+              <a:lnSpc>
+                <a:spcPct val="100000"/>
+              </a:lnSpc>
+              <a:spcBef>
+                <a:spcPts val="4200"/>
+              </a:spcBef>
+              <a:spcAft>
+                <a:spcPts val="0"/>
+              </a:spcAft>
+              <a:buClrTx/>
+              <a:buSzPct val="145000"/>
+              <a:buFontTx/>
+              <a:buChar char="•"/>
+              <a:tabLst/>
+              <a:defRPr sz="3200" b="0" i="0" u="none" strike="noStrike" cap="none" spc="0" baseline="0">
+                <a:solidFill>
+                  <a:srgbClr val="000000"/>
+                </a:solidFill>
+                <a:uFillTx/>
+                <a:latin typeface="Helvetica Neue"/>
+                <a:ea typeface="Helvetica Neue"/>
+                <a:cs typeface="Helvetica Neue"/>
+                <a:sym typeface="Helvetica Neue"/>
+              </a:defRPr>
+            </a:lvl5pPr>
+            <a:lvl6pPr marL="2667000" marR="0" indent="-444500" algn="l" defTabSz="584200" rtl="0" latinLnBrk="0">
+              <a:lnSpc>
+                <a:spcPct val="100000"/>
+              </a:lnSpc>
+              <a:spcBef>
+                <a:spcPts val="4200"/>
+              </a:spcBef>
+              <a:spcAft>
+                <a:spcPts val="0"/>
+              </a:spcAft>
+              <a:buClrTx/>
+              <a:buSzPct val="145000"/>
+              <a:buFontTx/>
+              <a:buChar char="•"/>
+              <a:tabLst/>
+              <a:defRPr sz="3200" b="0" i="0" u="none" strike="noStrike" cap="none" spc="0" baseline="0">
+                <a:solidFill>
+                  <a:srgbClr val="000000"/>
+                </a:solidFill>
+                <a:uFillTx/>
+                <a:latin typeface="Helvetica Neue"/>
+                <a:ea typeface="Helvetica Neue"/>
+                <a:cs typeface="Helvetica Neue"/>
+                <a:sym typeface="Helvetica Neue"/>
+              </a:defRPr>
+            </a:lvl6pPr>
+            <a:lvl7pPr marL="3111500" marR="0" indent="-444500" algn="l" defTabSz="584200" rtl="0" latinLnBrk="0">
+              <a:lnSpc>
+                <a:spcPct val="100000"/>
+              </a:lnSpc>
+              <a:spcBef>
+                <a:spcPts val="4200"/>
+              </a:spcBef>
+              <a:spcAft>
+                <a:spcPts val="0"/>
+              </a:spcAft>
+              <a:buClrTx/>
+              <a:buSzPct val="145000"/>
+              <a:buFontTx/>
+              <a:buChar char="•"/>
+              <a:tabLst/>
+              <a:defRPr sz="3200" b="0" i="0" u="none" strike="noStrike" cap="none" spc="0" baseline="0">
+                <a:solidFill>
+                  <a:srgbClr val="000000"/>
+                </a:solidFill>
+                <a:uFillTx/>
+                <a:latin typeface="Helvetica Neue"/>
+                <a:ea typeface="Helvetica Neue"/>
+                <a:cs typeface="Helvetica Neue"/>
+                <a:sym typeface="Helvetica Neue"/>
+              </a:defRPr>
+            </a:lvl7pPr>
+            <a:lvl8pPr marL="3556000" marR="0" indent="-444500" algn="l" defTabSz="584200" rtl="0" latinLnBrk="0">
+              <a:lnSpc>
+                <a:spcPct val="100000"/>
+              </a:lnSpc>
+              <a:spcBef>
+                <a:spcPts val="4200"/>
+              </a:spcBef>
+              <a:spcAft>
+                <a:spcPts val="0"/>
+              </a:spcAft>
+              <a:buClrTx/>
+              <a:buSzPct val="145000"/>
+              <a:buFontTx/>
+              <a:buChar char="•"/>
+              <a:tabLst/>
+              <a:defRPr sz="3200" b="0" i="0" u="none" strike="noStrike" cap="none" spc="0" baseline="0">
+                <a:solidFill>
+                  <a:srgbClr val="000000"/>
+                </a:solidFill>
+                <a:uFillTx/>
+                <a:latin typeface="Helvetica Neue"/>
+                <a:ea typeface="Helvetica Neue"/>
+                <a:cs typeface="Helvetica Neue"/>
+                <a:sym typeface="Helvetica Neue"/>
+              </a:defRPr>
+            </a:lvl8pPr>
+            <a:lvl9pPr marL="4000500" marR="0" indent="-444500" algn="l" defTabSz="584200" rtl="0" latinLnBrk="0">
+              <a:lnSpc>
+                <a:spcPct val="100000"/>
+              </a:lnSpc>
+              <a:spcBef>
+                <a:spcPts val="4200"/>
+              </a:spcBef>
+              <a:spcAft>
+                <a:spcPts val="0"/>
+              </a:spcAft>
+              <a:buClrTx/>
+              <a:buSzPct val="145000"/>
+              <a:buFontTx/>
+              <a:buChar char="•"/>
+              <a:tabLst/>
+              <a:defRPr sz="3200" b="0" i="0" u="none" strike="noStrike" cap="none" spc="0" baseline="0">
+                <a:solidFill>
+                  <a:srgbClr val="000000"/>
+                </a:solidFill>
+                <a:uFillTx/>
+                <a:latin typeface="Helvetica Neue"/>
+                <a:ea typeface="Helvetica Neue"/>
+                <a:cs typeface="Helvetica Neue"/>
+                <a:sym typeface="Helvetica Neue"/>
+              </a:defRPr>
+            </a:lvl9pPr>
+          </a:lstStyle>
+          <a:p>
+            <a:pPr marL="0" indent="0" defTabSz="554990" hangingPunct="1">
+              <a:spcBef>
+                <a:spcPts val="3900"/>
+              </a:spcBef>
+              <a:buNone/>
+              <a:defRPr sz="3040"/>
+            </a:pPr>
+            <a:r>
+              <a:rPr lang="en-US" sz="2400" dirty="0"/>
+              <a:t>Sally </a:t>
+            </a:r>
+            <a:br>
+              <a:rPr lang="en-US" sz="2400" dirty="0"/>
+            </a:br>
+            <a:r>
+              <a:rPr lang="en-US" sz="2400" dirty="0"/>
+              <a:t>Han</a:t>
+            </a:r>
+            <a:br>
+              <a:rPr lang="en-US" sz="2400" dirty="0"/>
+            </a:br>
+            <a:r>
+              <a:rPr lang="en-US" sz="2400" dirty="0"/>
+              <a:t>Andrew </a:t>
+            </a:r>
+            <a:br>
+              <a:rPr lang="en-US" sz="2400" dirty="0"/>
+            </a:br>
+            <a:r>
+              <a:rPr lang="en-US" sz="2400" dirty="0"/>
+              <a:t>Samson </a:t>
+            </a:r>
+            <a:br>
+              <a:rPr lang="en-US" sz="2400" dirty="0"/>
+            </a:br>
+            <a:r>
+              <a:rPr lang="en-US" sz="2400" dirty="0" err="1"/>
+              <a:t>Akshay</a:t>
+            </a:r>
+            <a:br>
+              <a:rPr lang="en-US" sz="2400" dirty="0"/>
+            </a:br>
+            <a:r>
+              <a:rPr lang="en-US" sz="2400" dirty="0"/>
+              <a:t>Garret</a:t>
+            </a:r>
+            <a:br>
+              <a:rPr lang="en-US" sz="2400" dirty="0"/>
+            </a:br>
+            <a:r>
+              <a:rPr lang="en-US" sz="2400" dirty="0"/>
+              <a:t>Brian</a:t>
+            </a:r>
+            <a:br>
+              <a:rPr lang="en-US" sz="2400" dirty="0"/>
+            </a:br>
+            <a:r>
+              <a:rPr lang="en-US" sz="2400" dirty="0"/>
+              <a:t>Alex</a:t>
+            </a:r>
+          </a:p>
+        </p:txBody>
+      </p:sp>
     </p:spTree>
   </p:cSld>
   <p:clrMapOvr>
@@ -4414,7 +5064,7 @@
 </p:sld>
 </file>
 
-<file path=ppt/slides/slide14.xml><?xml version="1.0" encoding="utf-8"?>
+<file path=ppt/slides/slide16.xml><?xml version="1.0" encoding="utf-8"?>
 <p:sld xmlns:a="http://schemas.openxmlformats.org/drawingml/2006/main" xmlns:r="http://schemas.openxmlformats.org/officeDocument/2006/relationships" xmlns:p="http://schemas.openxmlformats.org/presentationml/2006/main">
   <p:cSld>
     <p:spTree>
@@ -4475,7 +5125,7 @@
           </a:ln>
           <a:extLst>
             <a:ext uri="{C572A759-6A51-4108-AA02-DFA0A04FC94B}">
-              <ma14:wrappingTextBoxFlag xmlns:ma14="http://schemas.microsoft.com/office/mac/drawingml/2011/main" xmlns:a14="http://schemas.microsoft.com/office/drawing/2010/main" xmlns:m="http://schemas.openxmlformats.org/officeDocument/2006/math" xmlns="" val="1"/>
+              <ma14:wrappingTextBoxFlag xmlns="" xmlns:m="http://schemas.openxmlformats.org/officeDocument/2006/math" xmlns:a14="http://schemas.microsoft.com/office/drawing/2010/main" xmlns:ma14="http://schemas.microsoft.com/office/mac/drawingml/2011/main" val="1"/>
             </a:ext>
           </a:extLst>
         </p:spPr>
@@ -4508,7 +5158,7 @@
           </a:ln>
           <a:extLst>
             <a:ext uri="{C572A759-6A51-4108-AA02-DFA0A04FC94B}">
-              <ma14:wrappingTextBoxFlag xmlns:ma14="http://schemas.microsoft.com/office/mac/drawingml/2011/main" xmlns:a14="http://schemas.microsoft.com/office/drawing/2010/main" xmlns:m="http://schemas.openxmlformats.org/officeDocument/2006/math" xmlns="" val="1"/>
+              <ma14:wrappingTextBoxFlag xmlns="" xmlns:m="http://schemas.openxmlformats.org/officeDocument/2006/math" xmlns:a14="http://schemas.microsoft.com/office/drawing/2010/main" xmlns:ma14="http://schemas.microsoft.com/office/mac/drawingml/2011/main" val="1"/>
             </a:ext>
           </a:extLst>
         </p:spPr>
@@ -4805,7 +5455,7 @@
           </a:ln>
           <a:extLst>
             <a:ext uri="{C572A759-6A51-4108-AA02-DFA0A04FC94B}">
-              <ma14:wrappingTextBoxFlag xmlns:ma14="http://schemas.microsoft.com/office/mac/drawingml/2011/main" xmlns:a14="http://schemas.microsoft.com/office/drawing/2010/main" xmlns:m="http://schemas.openxmlformats.org/officeDocument/2006/math" xmlns="" val="1"/>
+              <ma14:wrappingTextBoxFlag xmlns="" xmlns:m="http://schemas.openxmlformats.org/officeDocument/2006/math" xmlns:a14="http://schemas.microsoft.com/office/drawing/2010/main" xmlns:ma14="http://schemas.microsoft.com/office/mac/drawingml/2011/main" val="1"/>
             </a:ext>
           </a:extLst>
         </p:spPr>
@@ -5183,7 +5833,7 @@
           </a:ln>
           <a:extLst>
             <a:ext uri="{C572A759-6A51-4108-AA02-DFA0A04FC94B}">
-              <ma14:wrappingTextBoxFlag xmlns:ma14="http://schemas.microsoft.com/office/mac/drawingml/2011/main" xmlns:a14="http://schemas.microsoft.com/office/drawing/2010/main" xmlns:m="http://schemas.openxmlformats.org/officeDocument/2006/math" xmlns="" val="1"/>
+              <ma14:wrappingTextBoxFlag xmlns="" xmlns:m="http://schemas.openxmlformats.org/officeDocument/2006/math" xmlns:a14="http://schemas.microsoft.com/office/drawing/2010/main" xmlns:ma14="http://schemas.microsoft.com/office/mac/drawingml/2011/main" val="1"/>
             </a:ext>
           </a:extLst>
         </p:spPr>
@@ -5255,7 +5905,7 @@
           </a:ln>
           <a:extLst>
             <a:ext uri="{C572A759-6A51-4108-AA02-DFA0A04FC94B}">
-              <ma14:wrappingTextBoxFlag xmlns:ma14="http://schemas.microsoft.com/office/mac/drawingml/2011/main" xmlns:a14="http://schemas.microsoft.com/office/drawing/2010/main" xmlns:m="http://schemas.openxmlformats.org/officeDocument/2006/math" xmlns="" val="1"/>
+              <ma14:wrappingTextBoxFlag xmlns="" xmlns:m="http://schemas.openxmlformats.org/officeDocument/2006/math" xmlns:a14="http://schemas.microsoft.com/office/drawing/2010/main" xmlns:ma14="http://schemas.microsoft.com/office/mac/drawingml/2011/main" val="1"/>
             </a:ext>
           </a:extLst>
         </p:spPr>
@@ -5438,7 +6088,7 @@
           </a:ln>
           <a:extLst>
             <a:ext uri="{C572A759-6A51-4108-AA02-DFA0A04FC94B}">
-              <ma14:wrappingTextBoxFlag xmlns:ma14="http://schemas.microsoft.com/office/mac/drawingml/2011/main" xmlns:a14="http://schemas.microsoft.com/office/drawing/2010/main" xmlns:m="http://schemas.openxmlformats.org/officeDocument/2006/math" xmlns="" val="1"/>
+              <ma14:wrappingTextBoxFlag xmlns="" xmlns:m="http://schemas.openxmlformats.org/officeDocument/2006/math" xmlns:a14="http://schemas.microsoft.com/office/drawing/2010/main" xmlns:ma14="http://schemas.microsoft.com/office/mac/drawingml/2011/main" val="1"/>
             </a:ext>
           </a:extLst>
         </p:spPr>
@@ -5652,7 +6302,7 @@
             </a:pPr>
             <a:r>
               <a:rPr dirty="0"/>
-              <a:t>Feel free to come and go as you like. Building door locks at 10 PM</a:t>
+              <a:t>Building door locks at 10 PM</a:t>
             </a:r>
             <a:r>
               <a:rPr lang="en-US" dirty="0"/>
@@ -5668,7 +6318,19 @@
             </a:pPr>
             <a:r>
               <a:rPr lang="en-US" dirty="0"/>
-              <a:t>Sunday the building is locked. We will have the doors open between 8:30-9:00. If you leave, please arrange to have someone from your team let you in.</a:t>
+              <a:t>Sunday the building is locked. Doors are open between 8:30-9:00. </a:t>
+            </a:r>
+          </a:p>
+          <a:p>
+            <a:pPr marL="866775" lvl="1" indent="-422275" defTabSz="554990">
+              <a:spcBef>
+                <a:spcPts val="3900"/>
+              </a:spcBef>
+              <a:defRPr sz="3040"/>
+            </a:pPr>
+            <a:r>
+              <a:rPr lang="en-US" dirty="0"/>
+              <a:t>If you leave, please arrange to have someone from your team let you in.</a:t>
             </a:r>
             <a:endParaRPr dirty="0"/>
           </a:p>

</xml_diff>